<commit_message>
Adds speaker notes to module 04
</commit_message>
<xml_diff>
--- a/04-refactoring_custom_resources.pptx
+++ b/04-refactoring_custom_resources.pptx
@@ -306,7 +306,7 @@
               <a:pPr>
                 <a:defRPr/>
               </a:pPr>
-              <a:t>2016-06-14</a:t>
+              <a:t>2016-09-18</a:t>
             </a:fld>
             <a:endParaRPr lang="en-US" dirty="0"/>
           </a:p>
@@ -489,7 +489,7 @@
               <a:pPr>
                 <a:defRPr/>
               </a:pPr>
-              <a:t>2016-06-14</a:t>
+              <a:t>2016-09-18</a:t>
             </a:fld>
             <a:endParaRPr lang="en-US" dirty="0"/>
           </a:p>
@@ -890,6 +890,4615 @@
 </p:notesMaster>
 </file>
 
+<file path=ppt/notesSlides/notesSlide1.xml><?xml version="1.0" encoding="utf-8"?>
+<p:notes xmlns:a="http://schemas.openxmlformats.org/drawingml/2006/main" xmlns:r="http://schemas.openxmlformats.org/officeDocument/2006/relationships" xmlns:p="http://schemas.openxmlformats.org/presentationml/2006/main">
+  <p:cSld>
+    <p:spTree>
+      <p:nvGrpSpPr>
+        <p:cNvPr id="1" name=""/>
+        <p:cNvGrpSpPr/>
+        <p:nvPr/>
+      </p:nvGrpSpPr>
+      <p:grpSpPr>
+        <a:xfrm>
+          <a:off x="0" y="0"/>
+          <a:ext cx="0" cy="0"/>
+          <a:chOff x="0" y="0"/>
+          <a:chExt cx="0" cy="0"/>
+        </a:xfrm>
+      </p:grpSpPr>
+      <p:sp>
+        <p:nvSpPr>
+          <p:cNvPr id="2" name="Slide Image Placeholder 1"/>
+          <p:cNvSpPr>
+            <a:spLocks noGrp="1" noRot="1" noChangeAspect="1"/>
+          </p:cNvSpPr>
+          <p:nvPr>
+            <p:ph type="sldImg"/>
+          </p:nvPr>
+        </p:nvSpPr>
+        <p:spPr/>
+      </p:sp>
+      <p:sp>
+        <p:nvSpPr>
+          <p:cNvPr id="3" name="Notes Placeholder 2"/>
+          <p:cNvSpPr>
+            <a:spLocks noGrp="1"/>
+          </p:cNvSpPr>
+          <p:nvPr>
+            <p:ph type="body" idx="1"/>
+          </p:nvPr>
+        </p:nvSpPr>
+        <p:spPr/>
+        <p:txBody>
+          <a:bodyPr/>
+          <a:lstStyle/>
+          <a:p>
+            <a:r>
+              <a:rPr lang="en-US" dirty="0" smtClean="0"/>
+              <a:t>After completing</a:t>
+            </a:r>
+            <a:r>
+              <a:rPr lang="en-US" baseline="0" dirty="0" smtClean="0"/>
+              <a:t> this module you should be able to set a custom resource's name to a property, set a default value if the property is not provided, and define notifications correctly within the custom resource.</a:t>
+            </a:r>
+            <a:endParaRPr lang="en-US" dirty="0"/>
+          </a:p>
+        </p:txBody>
+      </p:sp>
+      <p:sp>
+        <p:nvSpPr>
+          <p:cNvPr id="4" name="Slide Number Placeholder 3"/>
+          <p:cNvSpPr>
+            <a:spLocks noGrp="1"/>
+          </p:cNvSpPr>
+          <p:nvPr>
+            <p:ph type="sldNum" sz="quarter" idx="10"/>
+          </p:nvPr>
+        </p:nvSpPr>
+        <p:spPr/>
+        <p:txBody>
+          <a:bodyPr/>
+          <a:lstStyle/>
+          <a:p>
+            <a:pPr>
+              <a:defRPr/>
+            </a:pPr>
+            <a:fld id="{DC3734AA-3150-D947-AC52-2F5DF48BFCD5}" type="slidenum">
+              <a:rPr lang="en-US" smtClean="0"/>
+              <a:pPr>
+                <a:defRPr/>
+              </a:pPr>
+              <a:t>2</a:t>
+            </a:fld>
+            <a:endParaRPr lang="en-US" dirty="0"/>
+          </a:p>
+        </p:txBody>
+      </p:sp>
+      <p:sp>
+        <p:nvSpPr>
+          <p:cNvPr id="5" name="Header Placeholder 4"/>
+          <p:cNvSpPr>
+            <a:spLocks noGrp="1"/>
+          </p:cNvSpPr>
+          <p:nvPr>
+            <p:ph type="hdr" sz="quarter" idx="11"/>
+          </p:nvPr>
+        </p:nvSpPr>
+        <p:spPr/>
+        <p:txBody>
+          <a:bodyPr/>
+          <a:lstStyle/>
+          <a:p>
+            <a:pPr>
+              <a:defRPr/>
+            </a:pPr>
+            <a:endParaRPr lang="en-US"/>
+          </a:p>
+        </p:txBody>
+      </p:sp>
+      <p:sp>
+        <p:nvSpPr>
+          <p:cNvPr id="6" name="Footer Placeholder 5"/>
+          <p:cNvSpPr>
+            <a:spLocks noGrp="1"/>
+          </p:cNvSpPr>
+          <p:nvPr>
+            <p:ph type="ftr" sz="quarter" idx="12"/>
+          </p:nvPr>
+        </p:nvSpPr>
+        <p:spPr/>
+        <p:txBody>
+          <a:bodyPr/>
+          <a:lstStyle/>
+          <a:p>
+            <a:pPr>
+              <a:defRPr/>
+            </a:pPr>
+            <a:endParaRPr lang="en-US"/>
+          </a:p>
+        </p:txBody>
+      </p:sp>
+    </p:spTree>
+    <p:extLst>
+      <p:ext uri="{BB962C8B-B14F-4D97-AF65-F5344CB8AC3E}">
+        <p14:creationId xmlns:p14="http://schemas.microsoft.com/office/powerpoint/2010/main" val="1564631812"/>
+      </p:ext>
+    </p:extLst>
+  </p:cSld>
+  <p:clrMapOvr>
+    <a:masterClrMapping/>
+  </p:clrMapOvr>
+</p:notes>
+</file>
+
+<file path=ppt/notesSlides/notesSlide10.xml><?xml version="1.0" encoding="utf-8"?>
+<p:notes xmlns:a="http://schemas.openxmlformats.org/drawingml/2006/main" xmlns:r="http://schemas.openxmlformats.org/officeDocument/2006/relationships" xmlns:p="http://schemas.openxmlformats.org/presentationml/2006/main">
+  <p:cSld>
+    <p:spTree>
+      <p:nvGrpSpPr>
+        <p:cNvPr id="1" name=""/>
+        <p:cNvGrpSpPr/>
+        <p:nvPr/>
+      </p:nvGrpSpPr>
+      <p:grpSpPr>
+        <a:xfrm>
+          <a:off x="0" y="0"/>
+          <a:ext cx="0" cy="0"/>
+          <a:chOff x="0" y="0"/>
+          <a:chExt cx="0" cy="0"/>
+        </a:xfrm>
+      </p:grpSpPr>
+      <p:sp>
+        <p:nvSpPr>
+          <p:cNvPr id="2" name="Slide Image Placeholder 1"/>
+          <p:cNvSpPr>
+            <a:spLocks noGrp="1" noRot="1" noChangeAspect="1"/>
+          </p:cNvSpPr>
+          <p:nvPr>
+            <p:ph type="sldImg"/>
+          </p:nvPr>
+        </p:nvSpPr>
+        <p:spPr/>
+      </p:sp>
+      <p:sp>
+        <p:nvSpPr>
+          <p:cNvPr id="3" name="Notes Placeholder 2"/>
+          <p:cNvSpPr>
+            <a:spLocks noGrp="1"/>
+          </p:cNvSpPr>
+          <p:nvPr>
+            <p:ph type="body" idx="1"/>
+          </p:nvPr>
+        </p:nvSpPr>
+        <p:spPr/>
+        <p:txBody>
+          <a:bodyPr/>
+          <a:lstStyle/>
+          <a:p>
+            <a:r>
+              <a:rPr lang="en-US" dirty="0" smtClean="0"/>
+              <a:t>Now we will look at tying</a:t>
+            </a:r>
+            <a:r>
+              <a:rPr lang="en-US" baseline="0" dirty="0" smtClean="0"/>
+              <a:t> the name provided to the custom resource to the </a:t>
+            </a:r>
+            <a:r>
+              <a:rPr lang="en-US" baseline="0" dirty="0" err="1" smtClean="0"/>
+              <a:t>site_name</a:t>
+            </a:r>
+            <a:r>
+              <a:rPr lang="en-US" baseline="0" dirty="0" smtClean="0"/>
+              <a:t> property.</a:t>
+            </a:r>
+            <a:endParaRPr lang="en-US" dirty="0"/>
+          </a:p>
+        </p:txBody>
+      </p:sp>
+      <p:sp>
+        <p:nvSpPr>
+          <p:cNvPr id="4" name="Slide Number Placeholder 3"/>
+          <p:cNvSpPr>
+            <a:spLocks noGrp="1"/>
+          </p:cNvSpPr>
+          <p:nvPr>
+            <p:ph type="sldNum" sz="quarter" idx="10"/>
+          </p:nvPr>
+        </p:nvSpPr>
+        <p:spPr/>
+        <p:txBody>
+          <a:bodyPr/>
+          <a:lstStyle/>
+          <a:p>
+            <a:pPr>
+              <a:defRPr/>
+            </a:pPr>
+            <a:fld id="{DC3734AA-3150-D947-AC52-2F5DF48BFCD5}" type="slidenum">
+              <a:rPr lang="en-US" smtClean="0"/>
+              <a:pPr>
+                <a:defRPr/>
+              </a:pPr>
+              <a:t>11</a:t>
+            </a:fld>
+            <a:endParaRPr lang="en-US" dirty="0"/>
+          </a:p>
+        </p:txBody>
+      </p:sp>
+      <p:sp>
+        <p:nvSpPr>
+          <p:cNvPr id="5" name="Header Placeholder 4"/>
+          <p:cNvSpPr>
+            <a:spLocks noGrp="1"/>
+          </p:cNvSpPr>
+          <p:nvPr>
+            <p:ph type="hdr" sz="quarter" idx="11"/>
+          </p:nvPr>
+        </p:nvSpPr>
+        <p:spPr/>
+        <p:txBody>
+          <a:bodyPr/>
+          <a:lstStyle/>
+          <a:p>
+            <a:pPr>
+              <a:defRPr/>
+            </a:pPr>
+            <a:endParaRPr lang="en-US"/>
+          </a:p>
+        </p:txBody>
+      </p:sp>
+      <p:sp>
+        <p:nvSpPr>
+          <p:cNvPr id="6" name="Footer Placeholder 5"/>
+          <p:cNvSpPr>
+            <a:spLocks noGrp="1"/>
+          </p:cNvSpPr>
+          <p:nvPr>
+            <p:ph type="ftr" sz="quarter" idx="12"/>
+          </p:nvPr>
+        </p:nvSpPr>
+        <p:spPr/>
+        <p:txBody>
+          <a:bodyPr/>
+          <a:lstStyle/>
+          <a:p>
+            <a:pPr>
+              <a:defRPr/>
+            </a:pPr>
+            <a:endParaRPr lang="en-US"/>
+          </a:p>
+        </p:txBody>
+      </p:sp>
+    </p:spTree>
+    <p:extLst>
+      <p:ext uri="{BB962C8B-B14F-4D97-AF65-F5344CB8AC3E}">
+        <p14:creationId xmlns:p14="http://schemas.microsoft.com/office/powerpoint/2010/main" val="854677856"/>
+      </p:ext>
+    </p:extLst>
+  </p:cSld>
+  <p:clrMapOvr>
+    <a:masterClrMapping/>
+  </p:clrMapOvr>
+</p:notes>
+</file>
+
+<file path=ppt/notesSlides/notesSlide11.xml><?xml version="1.0" encoding="utf-8"?>
+<p:notes xmlns:a="http://schemas.openxmlformats.org/drawingml/2006/main" xmlns:r="http://schemas.openxmlformats.org/officeDocument/2006/relationships" xmlns:p="http://schemas.openxmlformats.org/presentationml/2006/main">
+  <p:cSld>
+    <p:spTree>
+      <p:nvGrpSpPr>
+        <p:cNvPr id="1" name=""/>
+        <p:cNvGrpSpPr/>
+        <p:nvPr/>
+      </p:nvGrpSpPr>
+      <p:grpSpPr>
+        <a:xfrm>
+          <a:off x="0" y="0"/>
+          <a:ext cx="0" cy="0"/>
+          <a:chOff x="0" y="0"/>
+          <a:chExt cx="0" cy="0"/>
+        </a:xfrm>
+      </p:grpSpPr>
+      <p:sp>
+        <p:nvSpPr>
+          <p:cNvPr id="2" name="Slide Image Placeholder 1"/>
+          <p:cNvSpPr>
+            <a:spLocks noGrp="1" noRot="1" noChangeAspect="1"/>
+          </p:cNvSpPr>
+          <p:nvPr>
+            <p:ph type="sldImg"/>
+          </p:nvPr>
+        </p:nvSpPr>
+        <p:spPr/>
+      </p:sp>
+      <p:sp>
+        <p:nvSpPr>
+          <p:cNvPr id="3" name="Notes Placeholder 2"/>
+          <p:cNvSpPr>
+            <a:spLocks noGrp="1"/>
+          </p:cNvSpPr>
+          <p:nvPr>
+            <p:ph type="body" idx="1"/>
+          </p:nvPr>
+        </p:nvSpPr>
+        <p:spPr/>
+        <p:txBody>
+          <a:bodyPr/>
+          <a:lstStyle/>
+          <a:p>
+            <a:r>
+              <a:rPr lang="en-US" dirty="0" smtClean="0"/>
+              <a:t>We</a:t>
+            </a:r>
+            <a:r>
+              <a:rPr lang="en-US" baseline="0" dirty="0" smtClean="0"/>
+              <a:t> want to ensure our custom resource is clear and concise. At the moment when you define the resource within the recipe you specify a value as the name of the custom resource and then a property that matches that same name. This seems like a redundancy that we want to remove.</a:t>
+            </a:r>
+            <a:endParaRPr lang="en-US" dirty="0"/>
+          </a:p>
+        </p:txBody>
+      </p:sp>
+      <p:sp>
+        <p:nvSpPr>
+          <p:cNvPr id="4" name="Slide Number Placeholder 3"/>
+          <p:cNvSpPr>
+            <a:spLocks noGrp="1"/>
+          </p:cNvSpPr>
+          <p:nvPr>
+            <p:ph type="sldNum" sz="quarter" idx="10"/>
+          </p:nvPr>
+        </p:nvSpPr>
+        <p:spPr/>
+        <p:txBody>
+          <a:bodyPr/>
+          <a:lstStyle/>
+          <a:p>
+            <a:pPr>
+              <a:defRPr/>
+            </a:pPr>
+            <a:fld id="{DC3734AA-3150-D947-AC52-2F5DF48BFCD5}" type="slidenum">
+              <a:rPr lang="en-US" smtClean="0"/>
+              <a:pPr>
+                <a:defRPr/>
+              </a:pPr>
+              <a:t>12</a:t>
+            </a:fld>
+            <a:endParaRPr lang="en-US" dirty="0"/>
+          </a:p>
+        </p:txBody>
+      </p:sp>
+      <p:sp>
+        <p:nvSpPr>
+          <p:cNvPr id="5" name="Header Placeholder 4"/>
+          <p:cNvSpPr>
+            <a:spLocks noGrp="1"/>
+          </p:cNvSpPr>
+          <p:nvPr>
+            <p:ph type="hdr" sz="quarter" idx="11"/>
+          </p:nvPr>
+        </p:nvSpPr>
+        <p:spPr/>
+        <p:txBody>
+          <a:bodyPr/>
+          <a:lstStyle/>
+          <a:p>
+            <a:pPr>
+              <a:defRPr/>
+            </a:pPr>
+            <a:endParaRPr lang="en-US"/>
+          </a:p>
+        </p:txBody>
+      </p:sp>
+      <p:sp>
+        <p:nvSpPr>
+          <p:cNvPr id="6" name="Footer Placeholder 5"/>
+          <p:cNvSpPr>
+            <a:spLocks noGrp="1"/>
+          </p:cNvSpPr>
+          <p:nvPr>
+            <p:ph type="ftr" sz="quarter" idx="12"/>
+          </p:nvPr>
+        </p:nvSpPr>
+        <p:spPr/>
+        <p:txBody>
+          <a:bodyPr/>
+          <a:lstStyle/>
+          <a:p>
+            <a:pPr>
+              <a:defRPr/>
+            </a:pPr>
+            <a:endParaRPr lang="en-US"/>
+          </a:p>
+        </p:txBody>
+      </p:sp>
+    </p:spTree>
+    <p:extLst>
+      <p:ext uri="{BB962C8B-B14F-4D97-AF65-F5344CB8AC3E}">
+        <p14:creationId xmlns:p14="http://schemas.microsoft.com/office/powerpoint/2010/main" val="139164036"/>
+      </p:ext>
+    </p:extLst>
+  </p:cSld>
+  <p:clrMapOvr>
+    <a:masterClrMapping/>
+  </p:clrMapOvr>
+</p:notes>
+</file>
+
+<file path=ppt/notesSlides/notesSlide12.xml><?xml version="1.0" encoding="utf-8"?>
+<p:notes xmlns:a="http://schemas.openxmlformats.org/drawingml/2006/main" xmlns:r="http://schemas.openxmlformats.org/officeDocument/2006/relationships" xmlns:p="http://schemas.openxmlformats.org/presentationml/2006/main">
+  <p:cSld>
+    <p:spTree>
+      <p:nvGrpSpPr>
+        <p:cNvPr id="1" name=""/>
+        <p:cNvGrpSpPr/>
+        <p:nvPr/>
+      </p:nvGrpSpPr>
+      <p:grpSpPr>
+        <a:xfrm>
+          <a:off x="0" y="0"/>
+          <a:ext cx="0" cy="0"/>
+          <a:chOff x="0" y="0"/>
+          <a:chExt cx="0" cy="0"/>
+        </a:xfrm>
+      </p:grpSpPr>
+      <p:sp>
+        <p:nvSpPr>
+          <p:cNvPr id="2" name="Slide Image Placeholder 1"/>
+          <p:cNvSpPr>
+            <a:spLocks noGrp="1" noRot="1" noChangeAspect="1"/>
+          </p:cNvSpPr>
+          <p:nvPr>
+            <p:ph type="sldImg"/>
+          </p:nvPr>
+        </p:nvSpPr>
+        <p:spPr/>
+      </p:sp>
+      <p:sp>
+        <p:nvSpPr>
+          <p:cNvPr id="3" name="Notes Placeholder 2"/>
+          <p:cNvSpPr>
+            <a:spLocks noGrp="1"/>
+          </p:cNvSpPr>
+          <p:nvPr>
+            <p:ph type="body" idx="1"/>
+          </p:nvPr>
+        </p:nvSpPr>
+        <p:spPr/>
+        <p:txBody>
+          <a:bodyPr/>
+          <a:lstStyle/>
+          <a:p>
+            <a:r>
+              <a:rPr lang="en-US" dirty="0" smtClean="0"/>
+              <a:t>One</a:t>
+            </a:r>
+            <a:r>
+              <a:rPr lang="en-US" baseline="0" dirty="0" smtClean="0"/>
+              <a:t> property may have the '</a:t>
+            </a:r>
+            <a:r>
+              <a:rPr lang="en-US" baseline="0" dirty="0" err="1" smtClean="0"/>
+              <a:t>name_attribute</a:t>
+            </a:r>
+            <a:r>
+              <a:rPr lang="en-US" baseline="0" dirty="0" smtClean="0"/>
+              <a:t>' option set to true. This property will be automatically populated from the name of the resource. Using the name of the resource will allow us to remove the need to specify that property which is repeating a value within the use of the custom resource.</a:t>
+            </a:r>
+            <a:endParaRPr lang="en-US" dirty="0"/>
+          </a:p>
+        </p:txBody>
+      </p:sp>
+      <p:sp>
+        <p:nvSpPr>
+          <p:cNvPr id="4" name="Slide Number Placeholder 3"/>
+          <p:cNvSpPr>
+            <a:spLocks noGrp="1"/>
+          </p:cNvSpPr>
+          <p:nvPr>
+            <p:ph type="sldNum" sz="quarter" idx="10"/>
+          </p:nvPr>
+        </p:nvSpPr>
+        <p:spPr/>
+        <p:txBody>
+          <a:bodyPr/>
+          <a:lstStyle/>
+          <a:p>
+            <a:pPr>
+              <a:defRPr/>
+            </a:pPr>
+            <a:fld id="{DC3734AA-3150-D947-AC52-2F5DF48BFCD5}" type="slidenum">
+              <a:rPr lang="en-US" smtClean="0"/>
+              <a:pPr>
+                <a:defRPr/>
+              </a:pPr>
+              <a:t>13</a:t>
+            </a:fld>
+            <a:endParaRPr lang="en-US" dirty="0"/>
+          </a:p>
+        </p:txBody>
+      </p:sp>
+      <p:sp>
+        <p:nvSpPr>
+          <p:cNvPr id="5" name="Header Placeholder 4"/>
+          <p:cNvSpPr>
+            <a:spLocks noGrp="1"/>
+          </p:cNvSpPr>
+          <p:nvPr>
+            <p:ph type="hdr" sz="quarter" idx="11"/>
+          </p:nvPr>
+        </p:nvSpPr>
+        <p:spPr/>
+        <p:txBody>
+          <a:bodyPr/>
+          <a:lstStyle/>
+          <a:p>
+            <a:pPr>
+              <a:defRPr/>
+            </a:pPr>
+            <a:endParaRPr lang="en-US"/>
+          </a:p>
+        </p:txBody>
+      </p:sp>
+      <p:sp>
+        <p:nvSpPr>
+          <p:cNvPr id="6" name="Footer Placeholder 5"/>
+          <p:cNvSpPr>
+            <a:spLocks noGrp="1"/>
+          </p:cNvSpPr>
+          <p:nvPr>
+            <p:ph type="ftr" sz="quarter" idx="12"/>
+          </p:nvPr>
+        </p:nvSpPr>
+        <p:spPr/>
+        <p:txBody>
+          <a:bodyPr/>
+          <a:lstStyle/>
+          <a:p>
+            <a:pPr>
+              <a:defRPr/>
+            </a:pPr>
+            <a:endParaRPr lang="en-US"/>
+          </a:p>
+        </p:txBody>
+      </p:sp>
+    </p:spTree>
+    <p:extLst>
+      <p:ext uri="{BB962C8B-B14F-4D97-AF65-F5344CB8AC3E}">
+        <p14:creationId xmlns:p14="http://schemas.microsoft.com/office/powerpoint/2010/main" val="1137111863"/>
+      </p:ext>
+    </p:extLst>
+  </p:cSld>
+  <p:clrMapOvr>
+    <a:masterClrMapping/>
+  </p:clrMapOvr>
+</p:notes>
+</file>
+
+<file path=ppt/notesSlides/notesSlide13.xml><?xml version="1.0" encoding="utf-8"?>
+<p:notes xmlns:a="http://schemas.openxmlformats.org/drawingml/2006/main" xmlns:r="http://schemas.openxmlformats.org/officeDocument/2006/relationships" xmlns:p="http://schemas.openxmlformats.org/presentationml/2006/main">
+  <p:cSld>
+    <p:spTree>
+      <p:nvGrpSpPr>
+        <p:cNvPr id="1" name=""/>
+        <p:cNvGrpSpPr/>
+        <p:nvPr/>
+      </p:nvGrpSpPr>
+      <p:grpSpPr>
+        <a:xfrm>
+          <a:off x="0" y="0"/>
+          <a:ext cx="0" cy="0"/>
+          <a:chOff x="0" y="0"/>
+          <a:chExt cx="0" cy="0"/>
+        </a:xfrm>
+      </p:grpSpPr>
+      <p:sp>
+        <p:nvSpPr>
+          <p:cNvPr id="2" name="Slide Image Placeholder 1"/>
+          <p:cNvSpPr>
+            <a:spLocks noGrp="1" noRot="1" noChangeAspect="1"/>
+          </p:cNvSpPr>
+          <p:nvPr>
+            <p:ph type="sldImg"/>
+          </p:nvPr>
+        </p:nvSpPr>
+        <p:spPr/>
+      </p:sp>
+      <p:sp>
+        <p:nvSpPr>
+          <p:cNvPr id="3" name="Notes Placeholder 2"/>
+          <p:cNvSpPr>
+            <a:spLocks noGrp="1"/>
+          </p:cNvSpPr>
+          <p:nvPr>
+            <p:ph type="body" idx="1"/>
+          </p:nvPr>
+        </p:nvSpPr>
+        <p:spPr/>
+        <p:txBody>
+          <a:bodyPr/>
+          <a:lstStyle/>
+          <a:p>
+            <a:r>
+              <a:rPr lang="en-US" dirty="0" smtClean="0"/>
+              <a:t>Now that the </a:t>
+            </a:r>
+            <a:r>
+              <a:rPr lang="en-US" dirty="0" err="1" smtClean="0"/>
+              <a:t>site_name</a:t>
+            </a:r>
+            <a:r>
+              <a:rPr lang="en-US" dirty="0" smtClean="0"/>
+              <a:t> property is set</a:t>
+            </a:r>
+            <a:r>
+              <a:rPr lang="en-US" baseline="0" dirty="0" smtClean="0"/>
+              <a:t> as the name attribute we can remove the site name property from each use of the custom resource.</a:t>
+            </a:r>
+            <a:endParaRPr lang="en-US" dirty="0"/>
+          </a:p>
+        </p:txBody>
+      </p:sp>
+      <p:sp>
+        <p:nvSpPr>
+          <p:cNvPr id="4" name="Slide Number Placeholder 3"/>
+          <p:cNvSpPr>
+            <a:spLocks noGrp="1"/>
+          </p:cNvSpPr>
+          <p:nvPr>
+            <p:ph type="sldNum" sz="quarter" idx="10"/>
+          </p:nvPr>
+        </p:nvSpPr>
+        <p:spPr/>
+        <p:txBody>
+          <a:bodyPr/>
+          <a:lstStyle/>
+          <a:p>
+            <a:pPr>
+              <a:defRPr/>
+            </a:pPr>
+            <a:fld id="{DC3734AA-3150-D947-AC52-2F5DF48BFCD5}" type="slidenum">
+              <a:rPr lang="en-US" smtClean="0"/>
+              <a:pPr>
+                <a:defRPr/>
+              </a:pPr>
+              <a:t>14</a:t>
+            </a:fld>
+            <a:endParaRPr lang="en-US" dirty="0"/>
+          </a:p>
+        </p:txBody>
+      </p:sp>
+      <p:sp>
+        <p:nvSpPr>
+          <p:cNvPr id="5" name="Header Placeholder 4"/>
+          <p:cNvSpPr>
+            <a:spLocks noGrp="1"/>
+          </p:cNvSpPr>
+          <p:nvPr>
+            <p:ph type="hdr" sz="quarter" idx="11"/>
+          </p:nvPr>
+        </p:nvSpPr>
+        <p:spPr/>
+        <p:txBody>
+          <a:bodyPr/>
+          <a:lstStyle/>
+          <a:p>
+            <a:pPr>
+              <a:defRPr/>
+            </a:pPr>
+            <a:endParaRPr lang="en-US"/>
+          </a:p>
+        </p:txBody>
+      </p:sp>
+      <p:sp>
+        <p:nvSpPr>
+          <p:cNvPr id="6" name="Footer Placeholder 5"/>
+          <p:cNvSpPr>
+            <a:spLocks noGrp="1"/>
+          </p:cNvSpPr>
+          <p:nvPr>
+            <p:ph type="ftr" sz="quarter" idx="12"/>
+          </p:nvPr>
+        </p:nvSpPr>
+        <p:spPr/>
+        <p:txBody>
+          <a:bodyPr/>
+          <a:lstStyle/>
+          <a:p>
+            <a:pPr>
+              <a:defRPr/>
+            </a:pPr>
+            <a:endParaRPr lang="en-US"/>
+          </a:p>
+        </p:txBody>
+      </p:sp>
+    </p:spTree>
+    <p:extLst>
+      <p:ext uri="{BB962C8B-B14F-4D97-AF65-F5344CB8AC3E}">
+        <p14:creationId xmlns:p14="http://schemas.microsoft.com/office/powerpoint/2010/main" val="722214184"/>
+      </p:ext>
+    </p:extLst>
+  </p:cSld>
+  <p:clrMapOvr>
+    <a:masterClrMapping/>
+  </p:clrMapOvr>
+</p:notes>
+</file>
+
+<file path=ppt/notesSlides/notesSlide14.xml><?xml version="1.0" encoding="utf-8"?>
+<p:notes xmlns:a="http://schemas.openxmlformats.org/drawingml/2006/main" xmlns:r="http://schemas.openxmlformats.org/officeDocument/2006/relationships" xmlns:p="http://schemas.openxmlformats.org/presentationml/2006/main">
+  <p:cSld>
+    <p:spTree>
+      <p:nvGrpSpPr>
+        <p:cNvPr id="1" name=""/>
+        <p:cNvGrpSpPr/>
+        <p:nvPr/>
+      </p:nvGrpSpPr>
+      <p:grpSpPr>
+        <a:xfrm>
+          <a:off x="0" y="0"/>
+          <a:ext cx="0" cy="0"/>
+          <a:chOff x="0" y="0"/>
+          <a:chExt cx="0" cy="0"/>
+        </a:xfrm>
+      </p:grpSpPr>
+      <p:sp>
+        <p:nvSpPr>
+          <p:cNvPr id="2" name="Slide Image Placeholder 1"/>
+          <p:cNvSpPr>
+            <a:spLocks noGrp="1" noRot="1" noChangeAspect="1"/>
+          </p:cNvSpPr>
+          <p:nvPr>
+            <p:ph type="sldImg"/>
+          </p:nvPr>
+        </p:nvSpPr>
+        <p:spPr/>
+      </p:sp>
+      <p:sp>
+        <p:nvSpPr>
+          <p:cNvPr id="3" name="Notes Placeholder 2"/>
+          <p:cNvSpPr>
+            <a:spLocks noGrp="1"/>
+          </p:cNvSpPr>
+          <p:nvPr>
+            <p:ph type="body" idx="1"/>
+          </p:nvPr>
+        </p:nvSpPr>
+        <p:spPr/>
+        <p:txBody>
+          <a:bodyPr/>
+          <a:lstStyle/>
+          <a:p>
+            <a:pPr marL="0" marR="0" indent="0" algn="l" defTabSz="1217613" rtl="0" eaLnBrk="1" fontAlgn="base" latinLnBrk="0" hangingPunct="1">
+              <a:lnSpc>
+                <a:spcPct val="90000"/>
+              </a:lnSpc>
+              <a:spcBef>
+                <a:spcPct val="30000"/>
+              </a:spcBef>
+              <a:spcAft>
+                <a:spcPts val="450"/>
+              </a:spcAft>
+              <a:buClrTx/>
+              <a:buSzTx/>
+              <a:buFontTx/>
+              <a:buNone/>
+              <a:tabLst/>
+              <a:defRPr/>
+            </a:pPr>
+            <a:r>
+              <a:rPr lang="en-US" dirty="0" smtClean="0"/>
+              <a:t>Now that the </a:t>
+            </a:r>
+            <a:r>
+              <a:rPr lang="en-US" dirty="0" err="1" smtClean="0"/>
+              <a:t>site_name</a:t>
+            </a:r>
+            <a:r>
+              <a:rPr lang="en-US" dirty="0" smtClean="0"/>
+              <a:t> property is set</a:t>
+            </a:r>
+            <a:r>
+              <a:rPr lang="en-US" baseline="0" dirty="0" smtClean="0"/>
+              <a:t> as the name attribute we can remove the site name property from each use of the custom resource.</a:t>
+            </a:r>
+            <a:endParaRPr lang="en-US" dirty="0" smtClean="0"/>
+          </a:p>
+          <a:p>
+            <a:endParaRPr lang="en-US" dirty="0"/>
+          </a:p>
+        </p:txBody>
+      </p:sp>
+      <p:sp>
+        <p:nvSpPr>
+          <p:cNvPr id="4" name="Slide Number Placeholder 3"/>
+          <p:cNvSpPr>
+            <a:spLocks noGrp="1"/>
+          </p:cNvSpPr>
+          <p:nvPr>
+            <p:ph type="sldNum" sz="quarter" idx="10"/>
+          </p:nvPr>
+        </p:nvSpPr>
+        <p:spPr/>
+        <p:txBody>
+          <a:bodyPr/>
+          <a:lstStyle/>
+          <a:p>
+            <a:pPr>
+              <a:defRPr/>
+            </a:pPr>
+            <a:fld id="{DC3734AA-3150-D947-AC52-2F5DF48BFCD5}" type="slidenum">
+              <a:rPr lang="en-US" smtClean="0"/>
+              <a:pPr>
+                <a:defRPr/>
+              </a:pPr>
+              <a:t>15</a:t>
+            </a:fld>
+            <a:endParaRPr lang="en-US" dirty="0"/>
+          </a:p>
+        </p:txBody>
+      </p:sp>
+      <p:sp>
+        <p:nvSpPr>
+          <p:cNvPr id="5" name="Header Placeholder 4"/>
+          <p:cNvSpPr>
+            <a:spLocks noGrp="1"/>
+          </p:cNvSpPr>
+          <p:nvPr>
+            <p:ph type="hdr" sz="quarter" idx="11"/>
+          </p:nvPr>
+        </p:nvSpPr>
+        <p:spPr/>
+        <p:txBody>
+          <a:bodyPr/>
+          <a:lstStyle/>
+          <a:p>
+            <a:pPr>
+              <a:defRPr/>
+            </a:pPr>
+            <a:endParaRPr lang="en-US"/>
+          </a:p>
+        </p:txBody>
+      </p:sp>
+      <p:sp>
+        <p:nvSpPr>
+          <p:cNvPr id="6" name="Footer Placeholder 5"/>
+          <p:cNvSpPr>
+            <a:spLocks noGrp="1"/>
+          </p:cNvSpPr>
+          <p:nvPr>
+            <p:ph type="ftr" sz="quarter" idx="12"/>
+          </p:nvPr>
+        </p:nvSpPr>
+        <p:spPr/>
+        <p:txBody>
+          <a:bodyPr/>
+          <a:lstStyle/>
+          <a:p>
+            <a:pPr>
+              <a:defRPr/>
+            </a:pPr>
+            <a:endParaRPr lang="en-US"/>
+          </a:p>
+        </p:txBody>
+      </p:sp>
+    </p:spTree>
+    <p:extLst>
+      <p:ext uri="{BB962C8B-B14F-4D97-AF65-F5344CB8AC3E}">
+        <p14:creationId xmlns:p14="http://schemas.microsoft.com/office/powerpoint/2010/main" val="1412025930"/>
+      </p:ext>
+    </p:extLst>
+  </p:cSld>
+  <p:clrMapOvr>
+    <a:masterClrMapping/>
+  </p:clrMapOvr>
+</p:notes>
+</file>
+
+<file path=ppt/notesSlides/notesSlide15.xml><?xml version="1.0" encoding="utf-8"?>
+<p:notes xmlns:a="http://schemas.openxmlformats.org/drawingml/2006/main" xmlns:r="http://schemas.openxmlformats.org/officeDocument/2006/relationships" xmlns:p="http://schemas.openxmlformats.org/presentationml/2006/main">
+  <p:cSld>
+    <p:spTree>
+      <p:nvGrpSpPr>
+        <p:cNvPr id="1" name=""/>
+        <p:cNvGrpSpPr/>
+        <p:nvPr/>
+      </p:nvGrpSpPr>
+      <p:grpSpPr>
+        <a:xfrm>
+          <a:off x="0" y="0"/>
+          <a:ext cx="0" cy="0"/>
+          <a:chOff x="0" y="0"/>
+          <a:chExt cx="0" cy="0"/>
+        </a:xfrm>
+      </p:grpSpPr>
+      <p:sp>
+        <p:nvSpPr>
+          <p:cNvPr id="2" name="Slide Image Placeholder 1"/>
+          <p:cNvSpPr>
+            <a:spLocks noGrp="1" noRot="1" noChangeAspect="1"/>
+          </p:cNvSpPr>
+          <p:nvPr>
+            <p:ph type="sldImg"/>
+          </p:nvPr>
+        </p:nvSpPr>
+        <p:spPr/>
+      </p:sp>
+      <p:sp>
+        <p:nvSpPr>
+          <p:cNvPr id="3" name="Notes Placeholder 2"/>
+          <p:cNvSpPr>
+            <a:spLocks noGrp="1"/>
+          </p:cNvSpPr>
+          <p:nvPr>
+            <p:ph type="body" idx="1"/>
+          </p:nvPr>
+        </p:nvSpPr>
+        <p:spPr/>
+        <p:txBody>
+          <a:bodyPr/>
+          <a:lstStyle/>
+          <a:p>
+            <a:pPr marL="0" marR="0" indent="0" algn="l" defTabSz="1217613" rtl="0" eaLnBrk="1" fontAlgn="base" latinLnBrk="0" hangingPunct="1">
+              <a:lnSpc>
+                <a:spcPct val="90000"/>
+              </a:lnSpc>
+              <a:spcBef>
+                <a:spcPct val="30000"/>
+              </a:spcBef>
+              <a:spcAft>
+                <a:spcPts val="450"/>
+              </a:spcAft>
+              <a:buClrTx/>
+              <a:buSzTx/>
+              <a:buFontTx/>
+              <a:buNone/>
+              <a:tabLst/>
+              <a:defRPr/>
+            </a:pPr>
+            <a:r>
+              <a:rPr lang="en-US" dirty="0" smtClean="0"/>
+              <a:t>All the unit tests should pass.</a:t>
+            </a:r>
+          </a:p>
+          <a:p>
+            <a:endParaRPr lang="en-US" dirty="0"/>
+          </a:p>
+        </p:txBody>
+      </p:sp>
+      <p:sp>
+        <p:nvSpPr>
+          <p:cNvPr id="4" name="Slide Number Placeholder 3"/>
+          <p:cNvSpPr>
+            <a:spLocks noGrp="1"/>
+          </p:cNvSpPr>
+          <p:nvPr>
+            <p:ph type="sldNum" sz="quarter" idx="10"/>
+          </p:nvPr>
+        </p:nvSpPr>
+        <p:spPr/>
+        <p:txBody>
+          <a:bodyPr/>
+          <a:lstStyle/>
+          <a:p>
+            <a:pPr>
+              <a:defRPr/>
+            </a:pPr>
+            <a:fld id="{DC3734AA-3150-D947-AC52-2F5DF48BFCD5}" type="slidenum">
+              <a:rPr lang="en-US" smtClean="0"/>
+              <a:pPr>
+                <a:defRPr/>
+              </a:pPr>
+              <a:t>16</a:t>
+            </a:fld>
+            <a:endParaRPr lang="en-US" dirty="0"/>
+          </a:p>
+        </p:txBody>
+      </p:sp>
+      <p:sp>
+        <p:nvSpPr>
+          <p:cNvPr id="5" name="Header Placeholder 4"/>
+          <p:cNvSpPr>
+            <a:spLocks noGrp="1"/>
+          </p:cNvSpPr>
+          <p:nvPr>
+            <p:ph type="hdr" sz="quarter" idx="11"/>
+          </p:nvPr>
+        </p:nvSpPr>
+        <p:spPr/>
+        <p:txBody>
+          <a:bodyPr/>
+          <a:lstStyle/>
+          <a:p>
+            <a:pPr>
+              <a:defRPr/>
+            </a:pPr>
+            <a:endParaRPr lang="en-US"/>
+          </a:p>
+        </p:txBody>
+      </p:sp>
+      <p:sp>
+        <p:nvSpPr>
+          <p:cNvPr id="6" name="Footer Placeholder 5"/>
+          <p:cNvSpPr>
+            <a:spLocks noGrp="1"/>
+          </p:cNvSpPr>
+          <p:nvPr>
+            <p:ph type="ftr" sz="quarter" idx="12"/>
+          </p:nvPr>
+        </p:nvSpPr>
+        <p:spPr/>
+        <p:txBody>
+          <a:bodyPr/>
+          <a:lstStyle/>
+          <a:p>
+            <a:pPr>
+              <a:defRPr/>
+            </a:pPr>
+            <a:endParaRPr lang="en-US"/>
+          </a:p>
+        </p:txBody>
+      </p:sp>
+    </p:spTree>
+    <p:extLst>
+      <p:ext uri="{BB962C8B-B14F-4D97-AF65-F5344CB8AC3E}">
+        <p14:creationId xmlns:p14="http://schemas.microsoft.com/office/powerpoint/2010/main" val="78022513"/>
+      </p:ext>
+    </p:extLst>
+  </p:cSld>
+  <p:clrMapOvr>
+    <a:masterClrMapping/>
+  </p:clrMapOvr>
+</p:notes>
+</file>
+
+<file path=ppt/notesSlides/notesSlide16.xml><?xml version="1.0" encoding="utf-8"?>
+<p:notes xmlns:a="http://schemas.openxmlformats.org/drawingml/2006/main" xmlns:r="http://schemas.openxmlformats.org/officeDocument/2006/relationships" xmlns:p="http://schemas.openxmlformats.org/presentationml/2006/main">
+  <p:cSld>
+    <p:spTree>
+      <p:nvGrpSpPr>
+        <p:cNvPr id="1" name=""/>
+        <p:cNvGrpSpPr/>
+        <p:nvPr/>
+      </p:nvGrpSpPr>
+      <p:grpSpPr>
+        <a:xfrm>
+          <a:off x="0" y="0"/>
+          <a:ext cx="0" cy="0"/>
+          <a:chOff x="0" y="0"/>
+          <a:chExt cx="0" cy="0"/>
+        </a:xfrm>
+      </p:grpSpPr>
+      <p:sp>
+        <p:nvSpPr>
+          <p:cNvPr id="2" name="Slide Image Placeholder 1"/>
+          <p:cNvSpPr>
+            <a:spLocks noGrp="1" noRot="1" noChangeAspect="1"/>
+          </p:cNvSpPr>
+          <p:nvPr>
+            <p:ph type="sldImg"/>
+          </p:nvPr>
+        </p:nvSpPr>
+        <p:spPr/>
+      </p:sp>
+      <p:sp>
+        <p:nvSpPr>
+          <p:cNvPr id="3" name="Notes Placeholder 2"/>
+          <p:cNvSpPr>
+            <a:spLocks noGrp="1"/>
+          </p:cNvSpPr>
+          <p:nvPr>
+            <p:ph type="body" idx="1"/>
+          </p:nvPr>
+        </p:nvSpPr>
+        <p:spPr/>
+        <p:txBody>
+          <a:bodyPr/>
+          <a:lstStyle/>
+          <a:p>
+            <a:r>
+              <a:rPr lang="en-US" dirty="0" smtClean="0"/>
+              <a:t>All the integration test should pass.</a:t>
+            </a:r>
+            <a:endParaRPr lang="en-US" dirty="0"/>
+          </a:p>
+        </p:txBody>
+      </p:sp>
+      <p:sp>
+        <p:nvSpPr>
+          <p:cNvPr id="4" name="Slide Number Placeholder 3"/>
+          <p:cNvSpPr>
+            <a:spLocks noGrp="1"/>
+          </p:cNvSpPr>
+          <p:nvPr>
+            <p:ph type="sldNum" sz="quarter" idx="10"/>
+          </p:nvPr>
+        </p:nvSpPr>
+        <p:spPr/>
+        <p:txBody>
+          <a:bodyPr/>
+          <a:lstStyle/>
+          <a:p>
+            <a:pPr>
+              <a:defRPr/>
+            </a:pPr>
+            <a:fld id="{DC3734AA-3150-D947-AC52-2F5DF48BFCD5}" type="slidenum">
+              <a:rPr lang="en-US" smtClean="0"/>
+              <a:pPr>
+                <a:defRPr/>
+              </a:pPr>
+              <a:t>17</a:t>
+            </a:fld>
+            <a:endParaRPr lang="en-US" dirty="0"/>
+          </a:p>
+        </p:txBody>
+      </p:sp>
+      <p:sp>
+        <p:nvSpPr>
+          <p:cNvPr id="5" name="Header Placeholder 4"/>
+          <p:cNvSpPr>
+            <a:spLocks noGrp="1"/>
+          </p:cNvSpPr>
+          <p:nvPr>
+            <p:ph type="hdr" sz="quarter" idx="11"/>
+          </p:nvPr>
+        </p:nvSpPr>
+        <p:spPr/>
+        <p:txBody>
+          <a:bodyPr/>
+          <a:lstStyle/>
+          <a:p>
+            <a:pPr>
+              <a:defRPr/>
+            </a:pPr>
+            <a:endParaRPr lang="en-US"/>
+          </a:p>
+        </p:txBody>
+      </p:sp>
+      <p:sp>
+        <p:nvSpPr>
+          <p:cNvPr id="6" name="Footer Placeholder 5"/>
+          <p:cNvSpPr>
+            <a:spLocks noGrp="1"/>
+          </p:cNvSpPr>
+          <p:nvPr>
+            <p:ph type="ftr" sz="quarter" idx="12"/>
+          </p:nvPr>
+        </p:nvSpPr>
+        <p:spPr/>
+        <p:txBody>
+          <a:bodyPr/>
+          <a:lstStyle/>
+          <a:p>
+            <a:pPr>
+              <a:defRPr/>
+            </a:pPr>
+            <a:endParaRPr lang="en-US"/>
+          </a:p>
+        </p:txBody>
+      </p:sp>
+    </p:spTree>
+    <p:extLst>
+      <p:ext uri="{BB962C8B-B14F-4D97-AF65-F5344CB8AC3E}">
+        <p14:creationId xmlns:p14="http://schemas.microsoft.com/office/powerpoint/2010/main" val="1359351321"/>
+      </p:ext>
+    </p:extLst>
+  </p:cSld>
+  <p:clrMapOvr>
+    <a:masterClrMapping/>
+  </p:clrMapOvr>
+</p:notes>
+</file>
+
+<file path=ppt/notesSlides/notesSlide17.xml><?xml version="1.0" encoding="utf-8"?>
+<p:notes xmlns:a="http://schemas.openxmlformats.org/drawingml/2006/main" xmlns:r="http://schemas.openxmlformats.org/officeDocument/2006/relationships" xmlns:p="http://schemas.openxmlformats.org/presentationml/2006/main">
+  <p:cSld>
+    <p:spTree>
+      <p:nvGrpSpPr>
+        <p:cNvPr id="1" name=""/>
+        <p:cNvGrpSpPr/>
+        <p:nvPr/>
+      </p:nvGrpSpPr>
+      <p:grpSpPr>
+        <a:xfrm>
+          <a:off x="0" y="0"/>
+          <a:ext cx="0" cy="0"/>
+          <a:chOff x="0" y="0"/>
+          <a:chExt cx="0" cy="0"/>
+        </a:xfrm>
+      </p:grpSpPr>
+      <p:sp>
+        <p:nvSpPr>
+          <p:cNvPr id="2" name="Slide Image Placeholder 1"/>
+          <p:cNvSpPr>
+            <a:spLocks noGrp="1" noRot="1" noChangeAspect="1"/>
+          </p:cNvSpPr>
+          <p:nvPr>
+            <p:ph type="sldImg"/>
+          </p:nvPr>
+        </p:nvSpPr>
+        <p:spPr/>
+      </p:sp>
+      <p:sp>
+        <p:nvSpPr>
+          <p:cNvPr id="3" name="Notes Placeholder 2"/>
+          <p:cNvSpPr>
+            <a:spLocks noGrp="1"/>
+          </p:cNvSpPr>
+          <p:nvPr>
+            <p:ph type="body" idx="1"/>
+          </p:nvPr>
+        </p:nvSpPr>
+        <p:spPr/>
+        <p:txBody>
+          <a:bodyPr/>
+          <a:lstStyle/>
+          <a:p>
+            <a:r>
+              <a:rPr lang="en-US" dirty="0" smtClean="0"/>
+              <a:t>Resource</a:t>
+            </a:r>
+            <a:r>
+              <a:rPr lang="en-US" baseline="0" dirty="0" smtClean="0"/>
+              <a:t> properties can also have default values setup for them. Lets explore setting a default value for the </a:t>
+            </a:r>
+            <a:r>
+              <a:rPr lang="en-US" baseline="0" dirty="0" err="1" smtClean="0"/>
+              <a:t>site_port</a:t>
+            </a:r>
+            <a:r>
+              <a:rPr lang="en-US" baseline="0" dirty="0" smtClean="0"/>
+              <a:t> property.</a:t>
+            </a:r>
+            <a:endParaRPr lang="en-US" dirty="0"/>
+          </a:p>
+        </p:txBody>
+      </p:sp>
+      <p:sp>
+        <p:nvSpPr>
+          <p:cNvPr id="4" name="Slide Number Placeholder 3"/>
+          <p:cNvSpPr>
+            <a:spLocks noGrp="1"/>
+          </p:cNvSpPr>
+          <p:nvPr>
+            <p:ph type="sldNum" sz="quarter" idx="10"/>
+          </p:nvPr>
+        </p:nvSpPr>
+        <p:spPr/>
+        <p:txBody>
+          <a:bodyPr/>
+          <a:lstStyle/>
+          <a:p>
+            <a:pPr>
+              <a:defRPr/>
+            </a:pPr>
+            <a:fld id="{DC3734AA-3150-D947-AC52-2F5DF48BFCD5}" type="slidenum">
+              <a:rPr lang="en-US" smtClean="0"/>
+              <a:pPr>
+                <a:defRPr/>
+              </a:pPr>
+              <a:t>18</a:t>
+            </a:fld>
+            <a:endParaRPr lang="en-US" dirty="0"/>
+          </a:p>
+        </p:txBody>
+      </p:sp>
+      <p:sp>
+        <p:nvSpPr>
+          <p:cNvPr id="5" name="Header Placeholder 4"/>
+          <p:cNvSpPr>
+            <a:spLocks noGrp="1"/>
+          </p:cNvSpPr>
+          <p:nvPr>
+            <p:ph type="hdr" sz="quarter" idx="11"/>
+          </p:nvPr>
+        </p:nvSpPr>
+        <p:spPr/>
+        <p:txBody>
+          <a:bodyPr/>
+          <a:lstStyle/>
+          <a:p>
+            <a:pPr>
+              <a:defRPr/>
+            </a:pPr>
+            <a:endParaRPr lang="en-US"/>
+          </a:p>
+        </p:txBody>
+      </p:sp>
+      <p:sp>
+        <p:nvSpPr>
+          <p:cNvPr id="6" name="Footer Placeholder 5"/>
+          <p:cNvSpPr>
+            <a:spLocks noGrp="1"/>
+          </p:cNvSpPr>
+          <p:nvPr>
+            <p:ph type="ftr" sz="quarter" idx="12"/>
+          </p:nvPr>
+        </p:nvSpPr>
+        <p:spPr/>
+        <p:txBody>
+          <a:bodyPr/>
+          <a:lstStyle/>
+          <a:p>
+            <a:pPr>
+              <a:defRPr/>
+            </a:pPr>
+            <a:endParaRPr lang="en-US"/>
+          </a:p>
+        </p:txBody>
+      </p:sp>
+    </p:spTree>
+    <p:extLst>
+      <p:ext uri="{BB962C8B-B14F-4D97-AF65-F5344CB8AC3E}">
+        <p14:creationId xmlns:p14="http://schemas.microsoft.com/office/powerpoint/2010/main" val="1686615261"/>
+      </p:ext>
+    </p:extLst>
+  </p:cSld>
+  <p:clrMapOvr>
+    <a:masterClrMapping/>
+  </p:clrMapOvr>
+</p:notes>
+</file>
+
+<file path=ppt/notesSlides/notesSlide18.xml><?xml version="1.0" encoding="utf-8"?>
+<p:notes xmlns:a="http://schemas.openxmlformats.org/drawingml/2006/main" xmlns:r="http://schemas.openxmlformats.org/officeDocument/2006/relationships" xmlns:p="http://schemas.openxmlformats.org/presentationml/2006/main">
+  <p:cSld>
+    <p:spTree>
+      <p:nvGrpSpPr>
+        <p:cNvPr id="1" name=""/>
+        <p:cNvGrpSpPr/>
+        <p:nvPr/>
+      </p:nvGrpSpPr>
+      <p:grpSpPr>
+        <a:xfrm>
+          <a:off x="0" y="0"/>
+          <a:ext cx="0" cy="0"/>
+          <a:chOff x="0" y="0"/>
+          <a:chExt cx="0" cy="0"/>
+        </a:xfrm>
+      </p:grpSpPr>
+      <p:sp>
+        <p:nvSpPr>
+          <p:cNvPr id="2" name="Slide Image Placeholder 1"/>
+          <p:cNvSpPr>
+            <a:spLocks noGrp="1" noRot="1" noChangeAspect="1"/>
+          </p:cNvSpPr>
+          <p:nvPr>
+            <p:ph type="sldImg"/>
+          </p:nvPr>
+        </p:nvSpPr>
+        <p:spPr/>
+      </p:sp>
+      <p:sp>
+        <p:nvSpPr>
+          <p:cNvPr id="3" name="Notes Placeholder 2"/>
+          <p:cNvSpPr>
+            <a:spLocks noGrp="1"/>
+          </p:cNvSpPr>
+          <p:nvPr>
+            <p:ph type="body" idx="1"/>
+          </p:nvPr>
+        </p:nvSpPr>
+        <p:spPr/>
+        <p:txBody>
+          <a:bodyPr/>
+          <a:lstStyle/>
+          <a:p>
+            <a:pPr marL="0" marR="0" indent="0" algn="l" defTabSz="1217613" rtl="0" eaLnBrk="1" fontAlgn="base" latinLnBrk="0" hangingPunct="1">
+              <a:lnSpc>
+                <a:spcPct val="90000"/>
+              </a:lnSpc>
+              <a:spcBef>
+                <a:spcPct val="30000"/>
+              </a:spcBef>
+              <a:spcAft>
+                <a:spcPts val="450"/>
+              </a:spcAft>
+              <a:buClrTx/>
+              <a:buSzTx/>
+              <a:buFontTx/>
+              <a:buNone/>
+              <a:tabLst/>
+              <a:defRPr/>
+            </a:pPr>
+            <a:r>
+              <a:rPr lang="en-US" baseline="0" dirty="0" smtClean="0"/>
+              <a:t>Setting a default value for a property allows you to define the resource and if you omit setting the property then the default value is used. We can use this behavior for our </a:t>
+            </a:r>
+            <a:r>
+              <a:rPr lang="en-US" baseline="0" dirty="0" err="1" smtClean="0"/>
+              <a:t>site_port</a:t>
+            </a:r>
+            <a:r>
+              <a:rPr lang="en-US" baseline="0" dirty="0" smtClean="0"/>
+              <a:t>, choosing to say that if you do not specify a port we want the port to be 80.</a:t>
+            </a:r>
+            <a:endParaRPr lang="en-US" dirty="0" smtClean="0"/>
+          </a:p>
+          <a:p>
+            <a:endParaRPr lang="en-US" dirty="0"/>
+          </a:p>
+        </p:txBody>
+      </p:sp>
+      <p:sp>
+        <p:nvSpPr>
+          <p:cNvPr id="4" name="Slide Number Placeholder 3"/>
+          <p:cNvSpPr>
+            <a:spLocks noGrp="1"/>
+          </p:cNvSpPr>
+          <p:nvPr>
+            <p:ph type="sldNum" sz="quarter" idx="10"/>
+          </p:nvPr>
+        </p:nvSpPr>
+        <p:spPr/>
+        <p:txBody>
+          <a:bodyPr/>
+          <a:lstStyle/>
+          <a:p>
+            <a:pPr>
+              <a:defRPr/>
+            </a:pPr>
+            <a:fld id="{DC3734AA-3150-D947-AC52-2F5DF48BFCD5}" type="slidenum">
+              <a:rPr lang="en-US" smtClean="0"/>
+              <a:pPr>
+                <a:defRPr/>
+              </a:pPr>
+              <a:t>19</a:t>
+            </a:fld>
+            <a:endParaRPr lang="en-US" dirty="0"/>
+          </a:p>
+        </p:txBody>
+      </p:sp>
+      <p:sp>
+        <p:nvSpPr>
+          <p:cNvPr id="5" name="Header Placeholder 4"/>
+          <p:cNvSpPr>
+            <a:spLocks noGrp="1"/>
+          </p:cNvSpPr>
+          <p:nvPr>
+            <p:ph type="hdr" sz="quarter" idx="11"/>
+          </p:nvPr>
+        </p:nvSpPr>
+        <p:spPr/>
+        <p:txBody>
+          <a:bodyPr/>
+          <a:lstStyle/>
+          <a:p>
+            <a:pPr>
+              <a:defRPr/>
+            </a:pPr>
+            <a:endParaRPr lang="en-US"/>
+          </a:p>
+        </p:txBody>
+      </p:sp>
+      <p:sp>
+        <p:nvSpPr>
+          <p:cNvPr id="6" name="Footer Placeholder 5"/>
+          <p:cNvSpPr>
+            <a:spLocks noGrp="1"/>
+          </p:cNvSpPr>
+          <p:nvPr>
+            <p:ph type="ftr" sz="quarter" idx="12"/>
+          </p:nvPr>
+        </p:nvSpPr>
+        <p:spPr/>
+        <p:txBody>
+          <a:bodyPr/>
+          <a:lstStyle/>
+          <a:p>
+            <a:pPr>
+              <a:defRPr/>
+            </a:pPr>
+            <a:endParaRPr lang="en-US"/>
+          </a:p>
+        </p:txBody>
+      </p:sp>
+    </p:spTree>
+    <p:extLst>
+      <p:ext uri="{BB962C8B-B14F-4D97-AF65-F5344CB8AC3E}">
+        <p14:creationId xmlns:p14="http://schemas.microsoft.com/office/powerpoint/2010/main" val="562210979"/>
+      </p:ext>
+    </p:extLst>
+  </p:cSld>
+  <p:clrMapOvr>
+    <a:masterClrMapping/>
+  </p:clrMapOvr>
+</p:notes>
+</file>
+
+<file path=ppt/notesSlides/notesSlide19.xml><?xml version="1.0" encoding="utf-8"?>
+<p:notes xmlns:a="http://schemas.openxmlformats.org/drawingml/2006/main" xmlns:r="http://schemas.openxmlformats.org/officeDocument/2006/relationships" xmlns:p="http://schemas.openxmlformats.org/presentationml/2006/main">
+  <p:cSld>
+    <p:spTree>
+      <p:nvGrpSpPr>
+        <p:cNvPr id="1" name=""/>
+        <p:cNvGrpSpPr/>
+        <p:nvPr/>
+      </p:nvGrpSpPr>
+      <p:grpSpPr>
+        <a:xfrm>
+          <a:off x="0" y="0"/>
+          <a:ext cx="0" cy="0"/>
+          <a:chOff x="0" y="0"/>
+          <a:chExt cx="0" cy="0"/>
+        </a:xfrm>
+      </p:grpSpPr>
+      <p:sp>
+        <p:nvSpPr>
+          <p:cNvPr id="2" name="Slide Image Placeholder 1"/>
+          <p:cNvSpPr>
+            <a:spLocks noGrp="1" noRot="1" noChangeAspect="1"/>
+          </p:cNvSpPr>
+          <p:nvPr>
+            <p:ph type="sldImg"/>
+          </p:nvPr>
+        </p:nvSpPr>
+        <p:spPr/>
+      </p:sp>
+      <p:sp>
+        <p:nvSpPr>
+          <p:cNvPr id="3" name="Notes Placeholder 2"/>
+          <p:cNvSpPr>
+            <a:spLocks noGrp="1"/>
+          </p:cNvSpPr>
+          <p:nvPr>
+            <p:ph type="body" idx="1"/>
+          </p:nvPr>
+        </p:nvSpPr>
+        <p:spPr/>
+        <p:txBody>
+          <a:bodyPr/>
+          <a:lstStyle/>
+          <a:p>
+            <a:r>
+              <a:rPr lang="en-US" dirty="0" smtClean="0"/>
+              <a:t>All properties may have a default value.</a:t>
+            </a:r>
+            <a:r>
+              <a:rPr lang="en-US" baseline="0" dirty="0" smtClean="0"/>
+              <a:t> To add one requires that you simply add the option 'default' with its corresponding default value. Here we are setting the '</a:t>
+            </a:r>
+            <a:r>
+              <a:rPr lang="en-US" baseline="0" dirty="0" err="1" smtClean="0"/>
+              <a:t>site_port</a:t>
+            </a:r>
+            <a:r>
+              <a:rPr lang="en-US" baseline="0" dirty="0" smtClean="0"/>
+              <a:t>' value to 80.</a:t>
+            </a:r>
+            <a:endParaRPr lang="en-US" dirty="0"/>
+          </a:p>
+        </p:txBody>
+      </p:sp>
+      <p:sp>
+        <p:nvSpPr>
+          <p:cNvPr id="4" name="Slide Number Placeholder 3"/>
+          <p:cNvSpPr>
+            <a:spLocks noGrp="1"/>
+          </p:cNvSpPr>
+          <p:nvPr>
+            <p:ph type="sldNum" sz="quarter" idx="10"/>
+          </p:nvPr>
+        </p:nvSpPr>
+        <p:spPr/>
+        <p:txBody>
+          <a:bodyPr/>
+          <a:lstStyle/>
+          <a:p>
+            <a:pPr>
+              <a:defRPr/>
+            </a:pPr>
+            <a:fld id="{DC3734AA-3150-D947-AC52-2F5DF48BFCD5}" type="slidenum">
+              <a:rPr lang="en-US" smtClean="0"/>
+              <a:pPr>
+                <a:defRPr/>
+              </a:pPr>
+              <a:t>20</a:t>
+            </a:fld>
+            <a:endParaRPr lang="en-US" dirty="0"/>
+          </a:p>
+        </p:txBody>
+      </p:sp>
+      <p:sp>
+        <p:nvSpPr>
+          <p:cNvPr id="5" name="Header Placeholder 4"/>
+          <p:cNvSpPr>
+            <a:spLocks noGrp="1"/>
+          </p:cNvSpPr>
+          <p:nvPr>
+            <p:ph type="hdr" sz="quarter" idx="11"/>
+          </p:nvPr>
+        </p:nvSpPr>
+        <p:spPr/>
+        <p:txBody>
+          <a:bodyPr/>
+          <a:lstStyle/>
+          <a:p>
+            <a:pPr>
+              <a:defRPr/>
+            </a:pPr>
+            <a:endParaRPr lang="en-US"/>
+          </a:p>
+        </p:txBody>
+      </p:sp>
+      <p:sp>
+        <p:nvSpPr>
+          <p:cNvPr id="6" name="Footer Placeholder 5"/>
+          <p:cNvSpPr>
+            <a:spLocks noGrp="1"/>
+          </p:cNvSpPr>
+          <p:nvPr>
+            <p:ph type="ftr" sz="quarter" idx="12"/>
+          </p:nvPr>
+        </p:nvSpPr>
+        <p:spPr/>
+        <p:txBody>
+          <a:bodyPr/>
+          <a:lstStyle/>
+          <a:p>
+            <a:pPr>
+              <a:defRPr/>
+            </a:pPr>
+            <a:endParaRPr lang="en-US"/>
+          </a:p>
+        </p:txBody>
+      </p:sp>
+    </p:spTree>
+    <p:extLst>
+      <p:ext uri="{BB962C8B-B14F-4D97-AF65-F5344CB8AC3E}">
+        <p14:creationId xmlns:p14="http://schemas.microsoft.com/office/powerpoint/2010/main" val="436049455"/>
+      </p:ext>
+    </p:extLst>
+  </p:cSld>
+  <p:clrMapOvr>
+    <a:masterClrMapping/>
+  </p:clrMapOvr>
+</p:notes>
+</file>
+
+<file path=ppt/notesSlides/notesSlide2.xml><?xml version="1.0" encoding="utf-8"?>
+<p:notes xmlns:a="http://schemas.openxmlformats.org/drawingml/2006/main" xmlns:r="http://schemas.openxmlformats.org/officeDocument/2006/relationships" xmlns:p="http://schemas.openxmlformats.org/presentationml/2006/main">
+  <p:cSld>
+    <p:spTree>
+      <p:nvGrpSpPr>
+        <p:cNvPr id="1" name=""/>
+        <p:cNvGrpSpPr/>
+        <p:nvPr/>
+      </p:nvGrpSpPr>
+      <p:grpSpPr>
+        <a:xfrm>
+          <a:off x="0" y="0"/>
+          <a:ext cx="0" cy="0"/>
+          <a:chOff x="0" y="0"/>
+          <a:chExt cx="0" cy="0"/>
+        </a:xfrm>
+      </p:grpSpPr>
+      <p:sp>
+        <p:nvSpPr>
+          <p:cNvPr id="2" name="Slide Image Placeholder 1"/>
+          <p:cNvSpPr>
+            <a:spLocks noGrp="1" noRot="1" noChangeAspect="1"/>
+          </p:cNvSpPr>
+          <p:nvPr>
+            <p:ph type="sldImg"/>
+          </p:nvPr>
+        </p:nvSpPr>
+        <p:spPr/>
+      </p:sp>
+      <p:sp>
+        <p:nvSpPr>
+          <p:cNvPr id="3" name="Notes Placeholder 2"/>
+          <p:cNvSpPr>
+            <a:spLocks noGrp="1"/>
+          </p:cNvSpPr>
+          <p:nvPr>
+            <p:ph type="body" idx="1"/>
+          </p:nvPr>
+        </p:nvSpPr>
+        <p:spPr/>
+        <p:txBody>
+          <a:bodyPr/>
+          <a:lstStyle/>
+          <a:p>
+            <a:r>
+              <a:rPr lang="en-US" dirty="0" smtClean="0"/>
+              <a:t>Every</a:t>
+            </a:r>
+            <a:r>
+              <a:rPr lang="en-US" baseline="0" dirty="0" smtClean="0"/>
+              <a:t> resource that you have used within Chef has had a default action.</a:t>
+            </a:r>
+            <a:endParaRPr lang="en-US" dirty="0"/>
+          </a:p>
+        </p:txBody>
+      </p:sp>
+      <p:sp>
+        <p:nvSpPr>
+          <p:cNvPr id="4" name="Slide Number Placeholder 3"/>
+          <p:cNvSpPr>
+            <a:spLocks noGrp="1"/>
+          </p:cNvSpPr>
+          <p:nvPr>
+            <p:ph type="sldNum" sz="quarter" idx="10"/>
+          </p:nvPr>
+        </p:nvSpPr>
+        <p:spPr/>
+        <p:txBody>
+          <a:bodyPr/>
+          <a:lstStyle/>
+          <a:p>
+            <a:pPr>
+              <a:defRPr/>
+            </a:pPr>
+            <a:fld id="{DC3734AA-3150-D947-AC52-2F5DF48BFCD5}" type="slidenum">
+              <a:rPr lang="en-US" smtClean="0"/>
+              <a:pPr>
+                <a:defRPr/>
+              </a:pPr>
+              <a:t>3</a:t>
+            </a:fld>
+            <a:endParaRPr lang="en-US" dirty="0"/>
+          </a:p>
+        </p:txBody>
+      </p:sp>
+      <p:sp>
+        <p:nvSpPr>
+          <p:cNvPr id="5" name="Header Placeholder 4"/>
+          <p:cNvSpPr>
+            <a:spLocks noGrp="1"/>
+          </p:cNvSpPr>
+          <p:nvPr>
+            <p:ph type="hdr" sz="quarter" idx="11"/>
+          </p:nvPr>
+        </p:nvSpPr>
+        <p:spPr/>
+        <p:txBody>
+          <a:bodyPr/>
+          <a:lstStyle/>
+          <a:p>
+            <a:pPr>
+              <a:defRPr/>
+            </a:pPr>
+            <a:endParaRPr lang="en-US"/>
+          </a:p>
+        </p:txBody>
+      </p:sp>
+      <p:sp>
+        <p:nvSpPr>
+          <p:cNvPr id="6" name="Footer Placeholder 5"/>
+          <p:cNvSpPr>
+            <a:spLocks noGrp="1"/>
+          </p:cNvSpPr>
+          <p:nvPr>
+            <p:ph type="ftr" sz="quarter" idx="12"/>
+          </p:nvPr>
+        </p:nvSpPr>
+        <p:spPr/>
+        <p:txBody>
+          <a:bodyPr/>
+          <a:lstStyle/>
+          <a:p>
+            <a:pPr>
+              <a:defRPr/>
+            </a:pPr>
+            <a:endParaRPr lang="en-US"/>
+          </a:p>
+        </p:txBody>
+      </p:sp>
+    </p:spTree>
+    <p:extLst>
+      <p:ext uri="{BB962C8B-B14F-4D97-AF65-F5344CB8AC3E}">
+        <p14:creationId xmlns:p14="http://schemas.microsoft.com/office/powerpoint/2010/main" val="1845043316"/>
+      </p:ext>
+    </p:extLst>
+  </p:cSld>
+  <p:clrMapOvr>
+    <a:masterClrMapping/>
+  </p:clrMapOvr>
+</p:notes>
+</file>
+
+<file path=ppt/notesSlides/notesSlide20.xml><?xml version="1.0" encoding="utf-8"?>
+<p:notes xmlns:a="http://schemas.openxmlformats.org/drawingml/2006/main" xmlns:r="http://schemas.openxmlformats.org/officeDocument/2006/relationships" xmlns:p="http://schemas.openxmlformats.org/presentationml/2006/main">
+  <p:cSld>
+    <p:spTree>
+      <p:nvGrpSpPr>
+        <p:cNvPr id="1" name=""/>
+        <p:cNvGrpSpPr/>
+        <p:nvPr/>
+      </p:nvGrpSpPr>
+      <p:grpSpPr>
+        <a:xfrm>
+          <a:off x="0" y="0"/>
+          <a:ext cx="0" cy="0"/>
+          <a:chOff x="0" y="0"/>
+          <a:chExt cx="0" cy="0"/>
+        </a:xfrm>
+      </p:grpSpPr>
+      <p:sp>
+        <p:nvSpPr>
+          <p:cNvPr id="2" name="Slide Image Placeholder 1"/>
+          <p:cNvSpPr>
+            <a:spLocks noGrp="1" noRot="1" noChangeAspect="1"/>
+          </p:cNvSpPr>
+          <p:nvPr>
+            <p:ph type="sldImg"/>
+          </p:nvPr>
+        </p:nvSpPr>
+        <p:spPr/>
+      </p:sp>
+      <p:sp>
+        <p:nvSpPr>
+          <p:cNvPr id="3" name="Notes Placeholder 2"/>
+          <p:cNvSpPr>
+            <a:spLocks noGrp="1"/>
+          </p:cNvSpPr>
+          <p:nvPr>
+            <p:ph type="body" idx="1"/>
+          </p:nvPr>
+        </p:nvSpPr>
+        <p:spPr/>
+        <p:txBody>
+          <a:bodyPr/>
+          <a:lstStyle/>
+          <a:p>
+            <a:r>
+              <a:rPr lang="en-US" dirty="0" smtClean="0"/>
+              <a:t>This allows us to remove the value from a</a:t>
+            </a:r>
+            <a:r>
+              <a:rPr lang="en-US" baseline="0" dirty="0" smtClean="0"/>
+              <a:t> single resource.</a:t>
+            </a:r>
+            <a:endParaRPr lang="en-US" dirty="0"/>
+          </a:p>
+        </p:txBody>
+      </p:sp>
+      <p:sp>
+        <p:nvSpPr>
+          <p:cNvPr id="4" name="Slide Number Placeholder 3"/>
+          <p:cNvSpPr>
+            <a:spLocks noGrp="1"/>
+          </p:cNvSpPr>
+          <p:nvPr>
+            <p:ph type="sldNum" sz="quarter" idx="10"/>
+          </p:nvPr>
+        </p:nvSpPr>
+        <p:spPr/>
+        <p:txBody>
+          <a:bodyPr/>
+          <a:lstStyle/>
+          <a:p>
+            <a:pPr>
+              <a:defRPr/>
+            </a:pPr>
+            <a:fld id="{DC3734AA-3150-D947-AC52-2F5DF48BFCD5}" type="slidenum">
+              <a:rPr lang="en-US" smtClean="0"/>
+              <a:pPr>
+                <a:defRPr/>
+              </a:pPr>
+              <a:t>21</a:t>
+            </a:fld>
+            <a:endParaRPr lang="en-US" dirty="0"/>
+          </a:p>
+        </p:txBody>
+      </p:sp>
+      <p:sp>
+        <p:nvSpPr>
+          <p:cNvPr id="5" name="Header Placeholder 4"/>
+          <p:cNvSpPr>
+            <a:spLocks noGrp="1"/>
+          </p:cNvSpPr>
+          <p:nvPr>
+            <p:ph type="hdr" sz="quarter" idx="11"/>
+          </p:nvPr>
+        </p:nvSpPr>
+        <p:spPr/>
+        <p:txBody>
+          <a:bodyPr/>
+          <a:lstStyle/>
+          <a:p>
+            <a:pPr>
+              <a:defRPr/>
+            </a:pPr>
+            <a:endParaRPr lang="en-US"/>
+          </a:p>
+        </p:txBody>
+      </p:sp>
+      <p:sp>
+        <p:nvSpPr>
+          <p:cNvPr id="6" name="Footer Placeholder 5"/>
+          <p:cNvSpPr>
+            <a:spLocks noGrp="1"/>
+          </p:cNvSpPr>
+          <p:nvPr>
+            <p:ph type="ftr" sz="quarter" idx="12"/>
+          </p:nvPr>
+        </p:nvSpPr>
+        <p:spPr/>
+        <p:txBody>
+          <a:bodyPr/>
+          <a:lstStyle/>
+          <a:p>
+            <a:pPr>
+              <a:defRPr/>
+            </a:pPr>
+            <a:endParaRPr lang="en-US"/>
+          </a:p>
+        </p:txBody>
+      </p:sp>
+    </p:spTree>
+    <p:extLst>
+      <p:ext uri="{BB962C8B-B14F-4D97-AF65-F5344CB8AC3E}">
+        <p14:creationId xmlns:p14="http://schemas.microsoft.com/office/powerpoint/2010/main" val="717396360"/>
+      </p:ext>
+    </p:extLst>
+  </p:cSld>
+  <p:clrMapOvr>
+    <a:masterClrMapping/>
+  </p:clrMapOvr>
+</p:notes>
+</file>
+
+<file path=ppt/notesSlides/notesSlide21.xml><?xml version="1.0" encoding="utf-8"?>
+<p:notes xmlns:a="http://schemas.openxmlformats.org/drawingml/2006/main" xmlns:r="http://schemas.openxmlformats.org/officeDocument/2006/relationships" xmlns:p="http://schemas.openxmlformats.org/presentationml/2006/main">
+  <p:cSld>
+    <p:spTree>
+      <p:nvGrpSpPr>
+        <p:cNvPr id="1" name=""/>
+        <p:cNvGrpSpPr/>
+        <p:nvPr/>
+      </p:nvGrpSpPr>
+      <p:grpSpPr>
+        <a:xfrm>
+          <a:off x="0" y="0"/>
+          <a:ext cx="0" cy="0"/>
+          <a:chOff x="0" y="0"/>
+          <a:chExt cx="0" cy="0"/>
+        </a:xfrm>
+      </p:grpSpPr>
+      <p:sp>
+        <p:nvSpPr>
+          <p:cNvPr id="2" name="Slide Image Placeholder 1"/>
+          <p:cNvSpPr>
+            <a:spLocks noGrp="1" noRot="1" noChangeAspect="1"/>
+          </p:cNvSpPr>
+          <p:nvPr>
+            <p:ph type="sldImg"/>
+          </p:nvPr>
+        </p:nvSpPr>
+        <p:spPr/>
+      </p:sp>
+      <p:sp>
+        <p:nvSpPr>
+          <p:cNvPr id="3" name="Notes Placeholder 2"/>
+          <p:cNvSpPr>
+            <a:spLocks noGrp="1"/>
+          </p:cNvSpPr>
+          <p:nvPr>
+            <p:ph type="body" idx="1"/>
+          </p:nvPr>
+        </p:nvSpPr>
+        <p:spPr/>
+        <p:txBody>
+          <a:bodyPr/>
+          <a:lstStyle/>
+          <a:p>
+            <a:pPr marL="0" marR="0" indent="0" algn="l" defTabSz="1217613" rtl="0" eaLnBrk="1" fontAlgn="base" latinLnBrk="0" hangingPunct="1">
+              <a:lnSpc>
+                <a:spcPct val="90000"/>
+              </a:lnSpc>
+              <a:spcBef>
+                <a:spcPct val="30000"/>
+              </a:spcBef>
+              <a:spcAft>
+                <a:spcPts val="450"/>
+              </a:spcAft>
+              <a:buClrTx/>
+              <a:buSzTx/>
+              <a:buFontTx/>
+              <a:buNone/>
+              <a:tabLst/>
+              <a:defRPr/>
+            </a:pPr>
+            <a:r>
+              <a:rPr lang="en-US" dirty="0" smtClean="0"/>
+              <a:t>All the unit tests should pass.</a:t>
+            </a:r>
+          </a:p>
+        </p:txBody>
+      </p:sp>
+      <p:sp>
+        <p:nvSpPr>
+          <p:cNvPr id="4" name="Slide Number Placeholder 3"/>
+          <p:cNvSpPr>
+            <a:spLocks noGrp="1"/>
+          </p:cNvSpPr>
+          <p:nvPr>
+            <p:ph type="sldNum" sz="quarter" idx="10"/>
+          </p:nvPr>
+        </p:nvSpPr>
+        <p:spPr/>
+        <p:txBody>
+          <a:bodyPr/>
+          <a:lstStyle/>
+          <a:p>
+            <a:pPr>
+              <a:defRPr/>
+            </a:pPr>
+            <a:fld id="{DC3734AA-3150-D947-AC52-2F5DF48BFCD5}" type="slidenum">
+              <a:rPr lang="en-US" smtClean="0"/>
+              <a:pPr>
+                <a:defRPr/>
+              </a:pPr>
+              <a:t>22</a:t>
+            </a:fld>
+            <a:endParaRPr lang="en-US" dirty="0"/>
+          </a:p>
+        </p:txBody>
+      </p:sp>
+      <p:sp>
+        <p:nvSpPr>
+          <p:cNvPr id="5" name="Header Placeholder 4"/>
+          <p:cNvSpPr>
+            <a:spLocks noGrp="1"/>
+          </p:cNvSpPr>
+          <p:nvPr>
+            <p:ph type="hdr" sz="quarter" idx="11"/>
+          </p:nvPr>
+        </p:nvSpPr>
+        <p:spPr/>
+        <p:txBody>
+          <a:bodyPr/>
+          <a:lstStyle/>
+          <a:p>
+            <a:pPr>
+              <a:defRPr/>
+            </a:pPr>
+            <a:endParaRPr lang="en-US"/>
+          </a:p>
+        </p:txBody>
+      </p:sp>
+      <p:sp>
+        <p:nvSpPr>
+          <p:cNvPr id="6" name="Footer Placeholder 5"/>
+          <p:cNvSpPr>
+            <a:spLocks noGrp="1"/>
+          </p:cNvSpPr>
+          <p:nvPr>
+            <p:ph type="ftr" sz="quarter" idx="12"/>
+          </p:nvPr>
+        </p:nvSpPr>
+        <p:spPr/>
+        <p:txBody>
+          <a:bodyPr/>
+          <a:lstStyle/>
+          <a:p>
+            <a:pPr>
+              <a:defRPr/>
+            </a:pPr>
+            <a:endParaRPr lang="en-US"/>
+          </a:p>
+        </p:txBody>
+      </p:sp>
+    </p:spTree>
+    <p:extLst>
+      <p:ext uri="{BB962C8B-B14F-4D97-AF65-F5344CB8AC3E}">
+        <p14:creationId xmlns:p14="http://schemas.microsoft.com/office/powerpoint/2010/main" val="477305969"/>
+      </p:ext>
+    </p:extLst>
+  </p:cSld>
+  <p:clrMapOvr>
+    <a:masterClrMapping/>
+  </p:clrMapOvr>
+</p:notes>
+</file>
+
+<file path=ppt/notesSlides/notesSlide22.xml><?xml version="1.0" encoding="utf-8"?>
+<p:notes xmlns:a="http://schemas.openxmlformats.org/drawingml/2006/main" xmlns:r="http://schemas.openxmlformats.org/officeDocument/2006/relationships" xmlns:p="http://schemas.openxmlformats.org/presentationml/2006/main">
+  <p:cSld>
+    <p:spTree>
+      <p:nvGrpSpPr>
+        <p:cNvPr id="1" name=""/>
+        <p:cNvGrpSpPr/>
+        <p:nvPr/>
+      </p:nvGrpSpPr>
+      <p:grpSpPr>
+        <a:xfrm>
+          <a:off x="0" y="0"/>
+          <a:ext cx="0" cy="0"/>
+          <a:chOff x="0" y="0"/>
+          <a:chExt cx="0" cy="0"/>
+        </a:xfrm>
+      </p:grpSpPr>
+      <p:sp>
+        <p:nvSpPr>
+          <p:cNvPr id="2" name="Slide Image Placeholder 1"/>
+          <p:cNvSpPr>
+            <a:spLocks noGrp="1" noRot="1" noChangeAspect="1"/>
+          </p:cNvSpPr>
+          <p:nvPr>
+            <p:ph type="sldImg"/>
+          </p:nvPr>
+        </p:nvSpPr>
+        <p:spPr/>
+      </p:sp>
+      <p:sp>
+        <p:nvSpPr>
+          <p:cNvPr id="3" name="Notes Placeholder 2"/>
+          <p:cNvSpPr>
+            <a:spLocks noGrp="1"/>
+          </p:cNvSpPr>
+          <p:nvPr>
+            <p:ph type="body" idx="1"/>
+          </p:nvPr>
+        </p:nvSpPr>
+        <p:spPr/>
+        <p:txBody>
+          <a:bodyPr/>
+          <a:lstStyle/>
+          <a:p>
+            <a:pPr marL="0" marR="0" indent="0" algn="l" defTabSz="1217613" rtl="0" eaLnBrk="1" fontAlgn="base" latinLnBrk="0" hangingPunct="1">
+              <a:lnSpc>
+                <a:spcPct val="90000"/>
+              </a:lnSpc>
+              <a:spcBef>
+                <a:spcPct val="30000"/>
+              </a:spcBef>
+              <a:spcAft>
+                <a:spcPts val="450"/>
+              </a:spcAft>
+              <a:buClrTx/>
+              <a:buSzTx/>
+              <a:buFontTx/>
+              <a:buNone/>
+              <a:tabLst/>
+              <a:defRPr/>
+            </a:pPr>
+            <a:r>
+              <a:rPr lang="en-US" dirty="0" smtClean="0"/>
+              <a:t>All the integration test should pass.</a:t>
+            </a:r>
+          </a:p>
+        </p:txBody>
+      </p:sp>
+      <p:sp>
+        <p:nvSpPr>
+          <p:cNvPr id="4" name="Slide Number Placeholder 3"/>
+          <p:cNvSpPr>
+            <a:spLocks noGrp="1"/>
+          </p:cNvSpPr>
+          <p:nvPr>
+            <p:ph type="sldNum" sz="quarter" idx="10"/>
+          </p:nvPr>
+        </p:nvSpPr>
+        <p:spPr/>
+        <p:txBody>
+          <a:bodyPr/>
+          <a:lstStyle/>
+          <a:p>
+            <a:pPr>
+              <a:defRPr/>
+            </a:pPr>
+            <a:fld id="{DC3734AA-3150-D947-AC52-2F5DF48BFCD5}" type="slidenum">
+              <a:rPr lang="en-US" smtClean="0"/>
+              <a:pPr>
+                <a:defRPr/>
+              </a:pPr>
+              <a:t>23</a:t>
+            </a:fld>
+            <a:endParaRPr lang="en-US" dirty="0"/>
+          </a:p>
+        </p:txBody>
+      </p:sp>
+      <p:sp>
+        <p:nvSpPr>
+          <p:cNvPr id="5" name="Header Placeholder 4"/>
+          <p:cNvSpPr>
+            <a:spLocks noGrp="1"/>
+          </p:cNvSpPr>
+          <p:nvPr>
+            <p:ph type="hdr" sz="quarter" idx="11"/>
+          </p:nvPr>
+        </p:nvSpPr>
+        <p:spPr/>
+        <p:txBody>
+          <a:bodyPr/>
+          <a:lstStyle/>
+          <a:p>
+            <a:pPr>
+              <a:defRPr/>
+            </a:pPr>
+            <a:endParaRPr lang="en-US"/>
+          </a:p>
+        </p:txBody>
+      </p:sp>
+      <p:sp>
+        <p:nvSpPr>
+          <p:cNvPr id="6" name="Footer Placeholder 5"/>
+          <p:cNvSpPr>
+            <a:spLocks noGrp="1"/>
+          </p:cNvSpPr>
+          <p:nvPr>
+            <p:ph type="ftr" sz="quarter" idx="12"/>
+          </p:nvPr>
+        </p:nvSpPr>
+        <p:spPr/>
+        <p:txBody>
+          <a:bodyPr/>
+          <a:lstStyle/>
+          <a:p>
+            <a:pPr>
+              <a:defRPr/>
+            </a:pPr>
+            <a:endParaRPr lang="en-US"/>
+          </a:p>
+        </p:txBody>
+      </p:sp>
+    </p:spTree>
+    <p:extLst>
+      <p:ext uri="{BB962C8B-B14F-4D97-AF65-F5344CB8AC3E}">
+        <p14:creationId xmlns:p14="http://schemas.microsoft.com/office/powerpoint/2010/main" val="1229999438"/>
+      </p:ext>
+    </p:extLst>
+  </p:cSld>
+  <p:clrMapOvr>
+    <a:masterClrMapping/>
+  </p:clrMapOvr>
+</p:notes>
+</file>
+
+<file path=ppt/notesSlides/notesSlide23.xml><?xml version="1.0" encoding="utf-8"?>
+<p:notes xmlns:a="http://schemas.openxmlformats.org/drawingml/2006/main" xmlns:r="http://schemas.openxmlformats.org/officeDocument/2006/relationships" xmlns:p="http://schemas.openxmlformats.org/presentationml/2006/main">
+  <p:cSld>
+    <p:spTree>
+      <p:nvGrpSpPr>
+        <p:cNvPr id="1" name=""/>
+        <p:cNvGrpSpPr/>
+        <p:nvPr/>
+      </p:nvGrpSpPr>
+      <p:grpSpPr>
+        <a:xfrm>
+          <a:off x="0" y="0"/>
+          <a:ext cx="0" cy="0"/>
+          <a:chOff x="0" y="0"/>
+          <a:chExt cx="0" cy="0"/>
+        </a:xfrm>
+      </p:grpSpPr>
+      <p:sp>
+        <p:nvSpPr>
+          <p:cNvPr id="2" name="Slide Image Placeholder 1"/>
+          <p:cNvSpPr>
+            <a:spLocks noGrp="1" noRot="1" noChangeAspect="1"/>
+          </p:cNvSpPr>
+          <p:nvPr>
+            <p:ph type="sldImg"/>
+          </p:nvPr>
+        </p:nvSpPr>
+        <p:spPr/>
+      </p:sp>
+      <p:sp>
+        <p:nvSpPr>
+          <p:cNvPr id="3" name="Notes Placeholder 2"/>
+          <p:cNvSpPr>
+            <a:spLocks noGrp="1"/>
+          </p:cNvSpPr>
+          <p:nvPr>
+            <p:ph type="body" idx="1"/>
+          </p:nvPr>
+        </p:nvSpPr>
+        <p:spPr/>
+        <p:txBody>
+          <a:bodyPr/>
+          <a:lstStyle/>
+          <a:p>
+            <a:r>
+              <a:rPr lang="en-US" dirty="0" smtClean="0"/>
+              <a:t>Finally we</a:t>
+            </a:r>
+            <a:r>
+              <a:rPr lang="en-US" baseline="0" dirty="0" smtClean="0"/>
+              <a:t> want to properly address how the custom resource handles notifications.</a:t>
+            </a:r>
+            <a:endParaRPr lang="en-US" dirty="0"/>
+          </a:p>
+        </p:txBody>
+      </p:sp>
+      <p:sp>
+        <p:nvSpPr>
+          <p:cNvPr id="4" name="Slide Number Placeholder 3"/>
+          <p:cNvSpPr>
+            <a:spLocks noGrp="1"/>
+          </p:cNvSpPr>
+          <p:nvPr>
+            <p:ph type="sldNum" sz="quarter" idx="10"/>
+          </p:nvPr>
+        </p:nvSpPr>
+        <p:spPr/>
+        <p:txBody>
+          <a:bodyPr/>
+          <a:lstStyle/>
+          <a:p>
+            <a:pPr>
+              <a:defRPr/>
+            </a:pPr>
+            <a:fld id="{DC3734AA-3150-D947-AC52-2F5DF48BFCD5}" type="slidenum">
+              <a:rPr lang="en-US" smtClean="0"/>
+              <a:pPr>
+                <a:defRPr/>
+              </a:pPr>
+              <a:t>24</a:t>
+            </a:fld>
+            <a:endParaRPr lang="en-US" dirty="0"/>
+          </a:p>
+        </p:txBody>
+      </p:sp>
+      <p:sp>
+        <p:nvSpPr>
+          <p:cNvPr id="5" name="Header Placeholder 4"/>
+          <p:cNvSpPr>
+            <a:spLocks noGrp="1"/>
+          </p:cNvSpPr>
+          <p:nvPr>
+            <p:ph type="hdr" sz="quarter" idx="11"/>
+          </p:nvPr>
+        </p:nvSpPr>
+        <p:spPr/>
+        <p:txBody>
+          <a:bodyPr/>
+          <a:lstStyle/>
+          <a:p>
+            <a:pPr>
+              <a:defRPr/>
+            </a:pPr>
+            <a:endParaRPr lang="en-US"/>
+          </a:p>
+        </p:txBody>
+      </p:sp>
+      <p:sp>
+        <p:nvSpPr>
+          <p:cNvPr id="6" name="Footer Placeholder 5"/>
+          <p:cNvSpPr>
+            <a:spLocks noGrp="1"/>
+          </p:cNvSpPr>
+          <p:nvPr>
+            <p:ph type="ftr" sz="quarter" idx="12"/>
+          </p:nvPr>
+        </p:nvSpPr>
+        <p:spPr/>
+        <p:txBody>
+          <a:bodyPr/>
+          <a:lstStyle/>
+          <a:p>
+            <a:pPr>
+              <a:defRPr/>
+            </a:pPr>
+            <a:endParaRPr lang="en-US"/>
+          </a:p>
+        </p:txBody>
+      </p:sp>
+    </p:spTree>
+    <p:extLst>
+      <p:ext uri="{BB962C8B-B14F-4D97-AF65-F5344CB8AC3E}">
+        <p14:creationId xmlns:p14="http://schemas.microsoft.com/office/powerpoint/2010/main" val="922968444"/>
+      </p:ext>
+    </p:extLst>
+  </p:cSld>
+  <p:clrMapOvr>
+    <a:masterClrMapping/>
+  </p:clrMapOvr>
+</p:notes>
+</file>
+
+<file path=ppt/notesSlides/notesSlide24.xml><?xml version="1.0" encoding="utf-8"?>
+<p:notes xmlns:a="http://schemas.openxmlformats.org/drawingml/2006/main" xmlns:r="http://schemas.openxmlformats.org/officeDocument/2006/relationships" xmlns:p="http://schemas.openxmlformats.org/presentationml/2006/main">
+  <p:cSld>
+    <p:spTree>
+      <p:nvGrpSpPr>
+        <p:cNvPr id="1" name=""/>
+        <p:cNvGrpSpPr/>
+        <p:nvPr/>
+      </p:nvGrpSpPr>
+      <p:grpSpPr>
+        <a:xfrm>
+          <a:off x="0" y="0"/>
+          <a:ext cx="0" cy="0"/>
+          <a:chOff x="0" y="0"/>
+          <a:chExt cx="0" cy="0"/>
+        </a:xfrm>
+      </p:grpSpPr>
+      <p:sp>
+        <p:nvSpPr>
+          <p:cNvPr id="2" name="Slide Image Placeholder 1"/>
+          <p:cNvSpPr>
+            <a:spLocks noGrp="1" noRot="1" noChangeAspect="1"/>
+          </p:cNvSpPr>
+          <p:nvPr>
+            <p:ph type="sldImg"/>
+          </p:nvPr>
+        </p:nvSpPr>
+        <p:spPr/>
+      </p:sp>
+      <p:sp>
+        <p:nvSpPr>
+          <p:cNvPr id="3" name="Notes Placeholder 2"/>
+          <p:cNvSpPr>
+            <a:spLocks noGrp="1"/>
+          </p:cNvSpPr>
+          <p:nvPr>
+            <p:ph type="body" idx="1"/>
+          </p:nvPr>
+        </p:nvSpPr>
+        <p:spPr/>
+        <p:txBody>
+          <a:bodyPr/>
+          <a:lstStyle/>
+          <a:p>
+            <a:r>
+              <a:rPr lang="en-US" dirty="0" smtClean="0"/>
+              <a:t>When</a:t>
+            </a:r>
+            <a:r>
+              <a:rPr lang="en-US" baseline="0" dirty="0" smtClean="0"/>
+              <a:t> defining notifications within a resource action if you reference a resource outside of the action implementation there is a chance that your code may break if that resource's name were to change or simply not be implemented at all.</a:t>
+            </a:r>
+          </a:p>
+          <a:p>
+            <a:endParaRPr lang="en-US" baseline="0" dirty="0" smtClean="0"/>
+          </a:p>
+          <a:p>
+            <a:r>
+              <a:rPr lang="en-US" baseline="0" dirty="0" smtClean="0"/>
+              <a:t>If any resource were to take action within the custom resource then the custom resource considers itself as taking action. We often say that any changed resource events are sent the parent custom resource and from that custom resource you can define your notifications.</a:t>
+            </a:r>
+          </a:p>
+        </p:txBody>
+      </p:sp>
+      <p:sp>
+        <p:nvSpPr>
+          <p:cNvPr id="4" name="Slide Number Placeholder 3"/>
+          <p:cNvSpPr>
+            <a:spLocks noGrp="1"/>
+          </p:cNvSpPr>
+          <p:nvPr>
+            <p:ph type="sldNum" sz="quarter" idx="10"/>
+          </p:nvPr>
+        </p:nvSpPr>
+        <p:spPr/>
+        <p:txBody>
+          <a:bodyPr/>
+          <a:lstStyle/>
+          <a:p>
+            <a:pPr>
+              <a:defRPr/>
+            </a:pPr>
+            <a:fld id="{DC3734AA-3150-D947-AC52-2F5DF48BFCD5}" type="slidenum">
+              <a:rPr lang="en-US" smtClean="0"/>
+              <a:pPr>
+                <a:defRPr/>
+              </a:pPr>
+              <a:t>25</a:t>
+            </a:fld>
+            <a:endParaRPr lang="en-US" dirty="0"/>
+          </a:p>
+        </p:txBody>
+      </p:sp>
+      <p:sp>
+        <p:nvSpPr>
+          <p:cNvPr id="5" name="Header Placeholder 4"/>
+          <p:cNvSpPr>
+            <a:spLocks noGrp="1"/>
+          </p:cNvSpPr>
+          <p:nvPr>
+            <p:ph type="hdr" sz="quarter" idx="11"/>
+          </p:nvPr>
+        </p:nvSpPr>
+        <p:spPr/>
+        <p:txBody>
+          <a:bodyPr/>
+          <a:lstStyle/>
+          <a:p>
+            <a:pPr>
+              <a:defRPr/>
+            </a:pPr>
+            <a:endParaRPr lang="en-US"/>
+          </a:p>
+        </p:txBody>
+      </p:sp>
+      <p:sp>
+        <p:nvSpPr>
+          <p:cNvPr id="6" name="Footer Placeholder 5"/>
+          <p:cNvSpPr>
+            <a:spLocks noGrp="1"/>
+          </p:cNvSpPr>
+          <p:nvPr>
+            <p:ph type="ftr" sz="quarter" idx="12"/>
+          </p:nvPr>
+        </p:nvSpPr>
+        <p:spPr/>
+        <p:txBody>
+          <a:bodyPr/>
+          <a:lstStyle/>
+          <a:p>
+            <a:pPr>
+              <a:defRPr/>
+            </a:pPr>
+            <a:endParaRPr lang="en-US"/>
+          </a:p>
+        </p:txBody>
+      </p:sp>
+    </p:spTree>
+    <p:extLst>
+      <p:ext uri="{BB962C8B-B14F-4D97-AF65-F5344CB8AC3E}">
+        <p14:creationId xmlns:p14="http://schemas.microsoft.com/office/powerpoint/2010/main" val="1703877870"/>
+      </p:ext>
+    </p:extLst>
+  </p:cSld>
+  <p:clrMapOvr>
+    <a:masterClrMapping/>
+  </p:clrMapOvr>
+</p:notes>
+</file>
+
+<file path=ppt/notesSlides/notesSlide25.xml><?xml version="1.0" encoding="utf-8"?>
+<p:notes xmlns:a="http://schemas.openxmlformats.org/drawingml/2006/main" xmlns:r="http://schemas.openxmlformats.org/officeDocument/2006/relationships" xmlns:p="http://schemas.openxmlformats.org/presentationml/2006/main">
+  <p:cSld>
+    <p:spTree>
+      <p:nvGrpSpPr>
+        <p:cNvPr id="1" name=""/>
+        <p:cNvGrpSpPr/>
+        <p:nvPr/>
+      </p:nvGrpSpPr>
+      <p:grpSpPr>
+        <a:xfrm>
+          <a:off x="0" y="0"/>
+          <a:ext cx="0" cy="0"/>
+          <a:chOff x="0" y="0"/>
+          <a:chExt cx="0" cy="0"/>
+        </a:xfrm>
+      </p:grpSpPr>
+      <p:sp>
+        <p:nvSpPr>
+          <p:cNvPr id="2" name="Slide Image Placeholder 1"/>
+          <p:cNvSpPr>
+            <a:spLocks noGrp="1" noRot="1" noChangeAspect="1"/>
+          </p:cNvSpPr>
+          <p:nvPr>
+            <p:ph type="sldImg"/>
+          </p:nvPr>
+        </p:nvSpPr>
+        <p:spPr/>
+      </p:sp>
+      <p:sp>
+        <p:nvSpPr>
+          <p:cNvPr id="3" name="Notes Placeholder 2"/>
+          <p:cNvSpPr>
+            <a:spLocks noGrp="1"/>
+          </p:cNvSpPr>
+          <p:nvPr>
+            <p:ph type="body" idx="1"/>
+          </p:nvPr>
+        </p:nvSpPr>
+        <p:spPr/>
+        <p:txBody>
+          <a:bodyPr/>
+          <a:lstStyle/>
+          <a:p>
+            <a:r>
+              <a:rPr lang="en-US" dirty="0" smtClean="0"/>
+              <a:t>First we remove the dependency on</a:t>
+            </a:r>
+            <a:r>
+              <a:rPr lang="en-US" baseline="0" dirty="0" smtClean="0"/>
+              <a:t> a resource not present within the action implementation of the custom resource.</a:t>
+            </a:r>
+            <a:endParaRPr lang="en-US" dirty="0"/>
+          </a:p>
+        </p:txBody>
+      </p:sp>
+      <p:sp>
+        <p:nvSpPr>
+          <p:cNvPr id="4" name="Slide Number Placeholder 3"/>
+          <p:cNvSpPr>
+            <a:spLocks noGrp="1"/>
+          </p:cNvSpPr>
+          <p:nvPr>
+            <p:ph type="sldNum" sz="quarter" idx="10"/>
+          </p:nvPr>
+        </p:nvSpPr>
+        <p:spPr/>
+        <p:txBody>
+          <a:bodyPr/>
+          <a:lstStyle/>
+          <a:p>
+            <a:pPr>
+              <a:defRPr/>
+            </a:pPr>
+            <a:fld id="{DC3734AA-3150-D947-AC52-2F5DF48BFCD5}" type="slidenum">
+              <a:rPr lang="en-US" smtClean="0"/>
+              <a:pPr>
+                <a:defRPr/>
+              </a:pPr>
+              <a:t>26</a:t>
+            </a:fld>
+            <a:endParaRPr lang="en-US" dirty="0"/>
+          </a:p>
+        </p:txBody>
+      </p:sp>
+      <p:sp>
+        <p:nvSpPr>
+          <p:cNvPr id="5" name="Header Placeholder 4"/>
+          <p:cNvSpPr>
+            <a:spLocks noGrp="1"/>
+          </p:cNvSpPr>
+          <p:nvPr>
+            <p:ph type="hdr" sz="quarter" idx="11"/>
+          </p:nvPr>
+        </p:nvSpPr>
+        <p:spPr/>
+        <p:txBody>
+          <a:bodyPr/>
+          <a:lstStyle/>
+          <a:p>
+            <a:pPr>
+              <a:defRPr/>
+            </a:pPr>
+            <a:endParaRPr lang="en-US"/>
+          </a:p>
+        </p:txBody>
+      </p:sp>
+      <p:sp>
+        <p:nvSpPr>
+          <p:cNvPr id="6" name="Footer Placeholder 5"/>
+          <p:cNvSpPr>
+            <a:spLocks noGrp="1"/>
+          </p:cNvSpPr>
+          <p:nvPr>
+            <p:ph type="ftr" sz="quarter" idx="12"/>
+          </p:nvPr>
+        </p:nvSpPr>
+        <p:spPr/>
+        <p:txBody>
+          <a:bodyPr/>
+          <a:lstStyle/>
+          <a:p>
+            <a:pPr>
+              <a:defRPr/>
+            </a:pPr>
+            <a:endParaRPr lang="en-US"/>
+          </a:p>
+        </p:txBody>
+      </p:sp>
+    </p:spTree>
+    <p:extLst>
+      <p:ext uri="{BB962C8B-B14F-4D97-AF65-F5344CB8AC3E}">
+        <p14:creationId xmlns:p14="http://schemas.microsoft.com/office/powerpoint/2010/main" val="95501158"/>
+      </p:ext>
+    </p:extLst>
+  </p:cSld>
+  <p:clrMapOvr>
+    <a:masterClrMapping/>
+  </p:clrMapOvr>
+</p:notes>
+</file>
+
+<file path=ppt/notesSlides/notesSlide26.xml><?xml version="1.0" encoding="utf-8"?>
+<p:notes xmlns:a="http://schemas.openxmlformats.org/drawingml/2006/main" xmlns:r="http://schemas.openxmlformats.org/officeDocument/2006/relationships" xmlns:p="http://schemas.openxmlformats.org/presentationml/2006/main">
+  <p:cSld>
+    <p:spTree>
+      <p:nvGrpSpPr>
+        <p:cNvPr id="1" name=""/>
+        <p:cNvGrpSpPr/>
+        <p:nvPr/>
+      </p:nvGrpSpPr>
+      <p:grpSpPr>
+        <a:xfrm>
+          <a:off x="0" y="0"/>
+          <a:ext cx="0" cy="0"/>
+          <a:chOff x="0" y="0"/>
+          <a:chExt cx="0" cy="0"/>
+        </a:xfrm>
+      </p:grpSpPr>
+      <p:sp>
+        <p:nvSpPr>
+          <p:cNvPr id="2" name="Slide Image Placeholder 1"/>
+          <p:cNvSpPr>
+            <a:spLocks noGrp="1" noRot="1" noChangeAspect="1"/>
+          </p:cNvSpPr>
+          <p:nvPr>
+            <p:ph type="sldImg"/>
+          </p:nvPr>
+        </p:nvSpPr>
+        <p:spPr/>
+      </p:sp>
+      <p:sp>
+        <p:nvSpPr>
+          <p:cNvPr id="3" name="Notes Placeholder 2"/>
+          <p:cNvSpPr>
+            <a:spLocks noGrp="1"/>
+          </p:cNvSpPr>
+          <p:nvPr>
+            <p:ph type="body" idx="1"/>
+          </p:nvPr>
+        </p:nvSpPr>
+        <p:spPr/>
+        <p:txBody>
+          <a:bodyPr/>
+          <a:lstStyle/>
+          <a:p>
+            <a:r>
+              <a:rPr lang="en-US" dirty="0" smtClean="0"/>
+              <a:t>We then add the</a:t>
+            </a:r>
+            <a:r>
+              <a:rPr lang="en-US" baseline="0" dirty="0" smtClean="0"/>
+              <a:t> notifications to the custom resource implementations within the default recipe.</a:t>
+            </a:r>
+            <a:endParaRPr lang="en-US" dirty="0"/>
+          </a:p>
+        </p:txBody>
+      </p:sp>
+      <p:sp>
+        <p:nvSpPr>
+          <p:cNvPr id="4" name="Slide Number Placeholder 3"/>
+          <p:cNvSpPr>
+            <a:spLocks noGrp="1"/>
+          </p:cNvSpPr>
+          <p:nvPr>
+            <p:ph type="sldNum" sz="quarter" idx="10"/>
+          </p:nvPr>
+        </p:nvSpPr>
+        <p:spPr/>
+        <p:txBody>
+          <a:bodyPr/>
+          <a:lstStyle/>
+          <a:p>
+            <a:pPr>
+              <a:defRPr/>
+            </a:pPr>
+            <a:fld id="{DC3734AA-3150-D947-AC52-2F5DF48BFCD5}" type="slidenum">
+              <a:rPr lang="en-US" smtClean="0"/>
+              <a:pPr>
+                <a:defRPr/>
+              </a:pPr>
+              <a:t>27</a:t>
+            </a:fld>
+            <a:endParaRPr lang="en-US" dirty="0"/>
+          </a:p>
+        </p:txBody>
+      </p:sp>
+      <p:sp>
+        <p:nvSpPr>
+          <p:cNvPr id="5" name="Header Placeholder 4"/>
+          <p:cNvSpPr>
+            <a:spLocks noGrp="1"/>
+          </p:cNvSpPr>
+          <p:nvPr>
+            <p:ph type="hdr" sz="quarter" idx="11"/>
+          </p:nvPr>
+        </p:nvSpPr>
+        <p:spPr/>
+        <p:txBody>
+          <a:bodyPr/>
+          <a:lstStyle/>
+          <a:p>
+            <a:pPr>
+              <a:defRPr/>
+            </a:pPr>
+            <a:endParaRPr lang="en-US"/>
+          </a:p>
+        </p:txBody>
+      </p:sp>
+      <p:sp>
+        <p:nvSpPr>
+          <p:cNvPr id="6" name="Footer Placeholder 5"/>
+          <p:cNvSpPr>
+            <a:spLocks noGrp="1"/>
+          </p:cNvSpPr>
+          <p:nvPr>
+            <p:ph type="ftr" sz="quarter" idx="12"/>
+          </p:nvPr>
+        </p:nvSpPr>
+        <p:spPr/>
+        <p:txBody>
+          <a:bodyPr/>
+          <a:lstStyle/>
+          <a:p>
+            <a:pPr>
+              <a:defRPr/>
+            </a:pPr>
+            <a:endParaRPr lang="en-US"/>
+          </a:p>
+        </p:txBody>
+      </p:sp>
+    </p:spTree>
+    <p:extLst>
+      <p:ext uri="{BB962C8B-B14F-4D97-AF65-F5344CB8AC3E}">
+        <p14:creationId xmlns:p14="http://schemas.microsoft.com/office/powerpoint/2010/main" val="951343138"/>
+      </p:ext>
+    </p:extLst>
+  </p:cSld>
+  <p:clrMapOvr>
+    <a:masterClrMapping/>
+  </p:clrMapOvr>
+</p:notes>
+</file>
+
+<file path=ppt/notesSlides/notesSlide27.xml><?xml version="1.0" encoding="utf-8"?>
+<p:notes xmlns:a="http://schemas.openxmlformats.org/drawingml/2006/main" xmlns:r="http://schemas.openxmlformats.org/officeDocument/2006/relationships" xmlns:p="http://schemas.openxmlformats.org/presentationml/2006/main">
+  <p:cSld>
+    <p:spTree>
+      <p:nvGrpSpPr>
+        <p:cNvPr id="1" name=""/>
+        <p:cNvGrpSpPr/>
+        <p:nvPr/>
+      </p:nvGrpSpPr>
+      <p:grpSpPr>
+        <a:xfrm>
+          <a:off x="0" y="0"/>
+          <a:ext cx="0" cy="0"/>
+          <a:chOff x="0" y="0"/>
+          <a:chExt cx="0" cy="0"/>
+        </a:xfrm>
+      </p:grpSpPr>
+      <p:sp>
+        <p:nvSpPr>
+          <p:cNvPr id="2" name="Slide Image Placeholder 1"/>
+          <p:cNvSpPr>
+            <a:spLocks noGrp="1" noRot="1" noChangeAspect="1"/>
+          </p:cNvSpPr>
+          <p:nvPr>
+            <p:ph type="sldImg"/>
+          </p:nvPr>
+        </p:nvSpPr>
+        <p:spPr/>
+      </p:sp>
+      <p:sp>
+        <p:nvSpPr>
+          <p:cNvPr id="3" name="Notes Placeholder 2"/>
+          <p:cNvSpPr>
+            <a:spLocks noGrp="1"/>
+          </p:cNvSpPr>
+          <p:nvPr>
+            <p:ph type="body" idx="1"/>
+          </p:nvPr>
+        </p:nvSpPr>
+        <p:spPr/>
+        <p:txBody>
+          <a:bodyPr/>
+          <a:lstStyle/>
+          <a:p>
+            <a:pPr marL="0" marR="0" indent="0" algn="l" defTabSz="1217613" rtl="0" eaLnBrk="1" fontAlgn="base" latinLnBrk="0" hangingPunct="1">
+              <a:lnSpc>
+                <a:spcPct val="90000"/>
+              </a:lnSpc>
+              <a:spcBef>
+                <a:spcPct val="30000"/>
+              </a:spcBef>
+              <a:spcAft>
+                <a:spcPts val="450"/>
+              </a:spcAft>
+              <a:buClrTx/>
+              <a:buSzTx/>
+              <a:buFontTx/>
+              <a:buNone/>
+              <a:tabLst/>
+              <a:defRPr/>
+            </a:pPr>
+            <a:r>
+              <a:rPr lang="en-US" dirty="0" smtClean="0"/>
+              <a:t>We then add the</a:t>
+            </a:r>
+            <a:r>
+              <a:rPr lang="en-US" baseline="0" dirty="0" smtClean="0"/>
+              <a:t> notifications to the custom resource implementations within the default recipe.</a:t>
+            </a:r>
+            <a:endParaRPr lang="en-US" dirty="0" smtClean="0"/>
+          </a:p>
+          <a:p>
+            <a:endParaRPr lang="en-US" dirty="0"/>
+          </a:p>
+        </p:txBody>
+      </p:sp>
+      <p:sp>
+        <p:nvSpPr>
+          <p:cNvPr id="4" name="Slide Number Placeholder 3"/>
+          <p:cNvSpPr>
+            <a:spLocks noGrp="1"/>
+          </p:cNvSpPr>
+          <p:nvPr>
+            <p:ph type="sldNum" sz="quarter" idx="10"/>
+          </p:nvPr>
+        </p:nvSpPr>
+        <p:spPr/>
+        <p:txBody>
+          <a:bodyPr/>
+          <a:lstStyle/>
+          <a:p>
+            <a:pPr>
+              <a:defRPr/>
+            </a:pPr>
+            <a:fld id="{DC3734AA-3150-D947-AC52-2F5DF48BFCD5}" type="slidenum">
+              <a:rPr lang="en-US" smtClean="0"/>
+              <a:pPr>
+                <a:defRPr/>
+              </a:pPr>
+              <a:t>28</a:t>
+            </a:fld>
+            <a:endParaRPr lang="en-US" dirty="0"/>
+          </a:p>
+        </p:txBody>
+      </p:sp>
+      <p:sp>
+        <p:nvSpPr>
+          <p:cNvPr id="5" name="Header Placeholder 4"/>
+          <p:cNvSpPr>
+            <a:spLocks noGrp="1"/>
+          </p:cNvSpPr>
+          <p:nvPr>
+            <p:ph type="hdr" sz="quarter" idx="11"/>
+          </p:nvPr>
+        </p:nvSpPr>
+        <p:spPr/>
+        <p:txBody>
+          <a:bodyPr/>
+          <a:lstStyle/>
+          <a:p>
+            <a:pPr>
+              <a:defRPr/>
+            </a:pPr>
+            <a:endParaRPr lang="en-US"/>
+          </a:p>
+        </p:txBody>
+      </p:sp>
+      <p:sp>
+        <p:nvSpPr>
+          <p:cNvPr id="6" name="Footer Placeholder 5"/>
+          <p:cNvSpPr>
+            <a:spLocks noGrp="1"/>
+          </p:cNvSpPr>
+          <p:nvPr>
+            <p:ph type="ftr" sz="quarter" idx="12"/>
+          </p:nvPr>
+        </p:nvSpPr>
+        <p:spPr/>
+        <p:txBody>
+          <a:bodyPr/>
+          <a:lstStyle/>
+          <a:p>
+            <a:pPr>
+              <a:defRPr/>
+            </a:pPr>
+            <a:endParaRPr lang="en-US"/>
+          </a:p>
+        </p:txBody>
+      </p:sp>
+    </p:spTree>
+    <p:extLst>
+      <p:ext uri="{BB962C8B-B14F-4D97-AF65-F5344CB8AC3E}">
+        <p14:creationId xmlns:p14="http://schemas.microsoft.com/office/powerpoint/2010/main" val="1297266688"/>
+      </p:ext>
+    </p:extLst>
+  </p:cSld>
+  <p:clrMapOvr>
+    <a:masterClrMapping/>
+  </p:clrMapOvr>
+</p:notes>
+</file>
+
+<file path=ppt/notesSlides/notesSlide28.xml><?xml version="1.0" encoding="utf-8"?>
+<p:notes xmlns:a="http://schemas.openxmlformats.org/drawingml/2006/main" xmlns:r="http://schemas.openxmlformats.org/officeDocument/2006/relationships" xmlns:p="http://schemas.openxmlformats.org/presentationml/2006/main">
+  <p:cSld>
+    <p:spTree>
+      <p:nvGrpSpPr>
+        <p:cNvPr id="1" name=""/>
+        <p:cNvGrpSpPr/>
+        <p:nvPr/>
+      </p:nvGrpSpPr>
+      <p:grpSpPr>
+        <a:xfrm>
+          <a:off x="0" y="0"/>
+          <a:ext cx="0" cy="0"/>
+          <a:chOff x="0" y="0"/>
+          <a:chExt cx="0" cy="0"/>
+        </a:xfrm>
+      </p:grpSpPr>
+      <p:sp>
+        <p:nvSpPr>
+          <p:cNvPr id="2" name="Slide Image Placeholder 1"/>
+          <p:cNvSpPr>
+            <a:spLocks noGrp="1" noRot="1" noChangeAspect="1"/>
+          </p:cNvSpPr>
+          <p:nvPr>
+            <p:ph type="sldImg"/>
+          </p:nvPr>
+        </p:nvSpPr>
+        <p:spPr/>
+      </p:sp>
+      <p:sp>
+        <p:nvSpPr>
+          <p:cNvPr id="3" name="Notes Placeholder 2"/>
+          <p:cNvSpPr>
+            <a:spLocks noGrp="1"/>
+          </p:cNvSpPr>
+          <p:nvPr>
+            <p:ph type="body" idx="1"/>
+          </p:nvPr>
+        </p:nvSpPr>
+        <p:spPr/>
+        <p:txBody>
+          <a:bodyPr/>
+          <a:lstStyle/>
+          <a:p>
+            <a:pPr marL="0" marR="0" indent="0" algn="l" defTabSz="1217613" rtl="0" eaLnBrk="1" fontAlgn="base" latinLnBrk="0" hangingPunct="1">
+              <a:lnSpc>
+                <a:spcPct val="90000"/>
+              </a:lnSpc>
+              <a:spcBef>
+                <a:spcPct val="30000"/>
+              </a:spcBef>
+              <a:spcAft>
+                <a:spcPts val="450"/>
+              </a:spcAft>
+              <a:buClrTx/>
+              <a:buSzTx/>
+              <a:buFontTx/>
+              <a:buNone/>
+              <a:tabLst/>
+              <a:defRPr/>
+            </a:pPr>
+            <a:r>
+              <a:rPr lang="en-US" dirty="0" smtClean="0"/>
+              <a:t>All the unit tests should pass.</a:t>
+            </a:r>
+          </a:p>
+        </p:txBody>
+      </p:sp>
+      <p:sp>
+        <p:nvSpPr>
+          <p:cNvPr id="4" name="Slide Number Placeholder 3"/>
+          <p:cNvSpPr>
+            <a:spLocks noGrp="1"/>
+          </p:cNvSpPr>
+          <p:nvPr>
+            <p:ph type="sldNum" sz="quarter" idx="10"/>
+          </p:nvPr>
+        </p:nvSpPr>
+        <p:spPr/>
+        <p:txBody>
+          <a:bodyPr/>
+          <a:lstStyle/>
+          <a:p>
+            <a:pPr>
+              <a:defRPr/>
+            </a:pPr>
+            <a:fld id="{DC3734AA-3150-D947-AC52-2F5DF48BFCD5}" type="slidenum">
+              <a:rPr lang="en-US" smtClean="0"/>
+              <a:pPr>
+                <a:defRPr/>
+              </a:pPr>
+              <a:t>29</a:t>
+            </a:fld>
+            <a:endParaRPr lang="en-US" dirty="0"/>
+          </a:p>
+        </p:txBody>
+      </p:sp>
+      <p:sp>
+        <p:nvSpPr>
+          <p:cNvPr id="5" name="Header Placeholder 4"/>
+          <p:cNvSpPr>
+            <a:spLocks noGrp="1"/>
+          </p:cNvSpPr>
+          <p:nvPr>
+            <p:ph type="hdr" sz="quarter" idx="11"/>
+          </p:nvPr>
+        </p:nvSpPr>
+        <p:spPr/>
+        <p:txBody>
+          <a:bodyPr/>
+          <a:lstStyle/>
+          <a:p>
+            <a:pPr>
+              <a:defRPr/>
+            </a:pPr>
+            <a:endParaRPr lang="en-US"/>
+          </a:p>
+        </p:txBody>
+      </p:sp>
+      <p:sp>
+        <p:nvSpPr>
+          <p:cNvPr id="6" name="Footer Placeholder 5"/>
+          <p:cNvSpPr>
+            <a:spLocks noGrp="1"/>
+          </p:cNvSpPr>
+          <p:nvPr>
+            <p:ph type="ftr" sz="quarter" idx="12"/>
+          </p:nvPr>
+        </p:nvSpPr>
+        <p:spPr/>
+        <p:txBody>
+          <a:bodyPr/>
+          <a:lstStyle/>
+          <a:p>
+            <a:pPr>
+              <a:defRPr/>
+            </a:pPr>
+            <a:endParaRPr lang="en-US"/>
+          </a:p>
+        </p:txBody>
+      </p:sp>
+    </p:spTree>
+    <p:extLst>
+      <p:ext uri="{BB962C8B-B14F-4D97-AF65-F5344CB8AC3E}">
+        <p14:creationId xmlns:p14="http://schemas.microsoft.com/office/powerpoint/2010/main" val="1907240872"/>
+      </p:ext>
+    </p:extLst>
+  </p:cSld>
+  <p:clrMapOvr>
+    <a:masterClrMapping/>
+  </p:clrMapOvr>
+</p:notes>
+</file>
+
+<file path=ppt/notesSlides/notesSlide29.xml><?xml version="1.0" encoding="utf-8"?>
+<p:notes xmlns:a="http://schemas.openxmlformats.org/drawingml/2006/main" xmlns:r="http://schemas.openxmlformats.org/officeDocument/2006/relationships" xmlns:p="http://schemas.openxmlformats.org/presentationml/2006/main">
+  <p:cSld>
+    <p:spTree>
+      <p:nvGrpSpPr>
+        <p:cNvPr id="1" name=""/>
+        <p:cNvGrpSpPr/>
+        <p:nvPr/>
+      </p:nvGrpSpPr>
+      <p:grpSpPr>
+        <a:xfrm>
+          <a:off x="0" y="0"/>
+          <a:ext cx="0" cy="0"/>
+          <a:chOff x="0" y="0"/>
+          <a:chExt cx="0" cy="0"/>
+        </a:xfrm>
+      </p:grpSpPr>
+      <p:sp>
+        <p:nvSpPr>
+          <p:cNvPr id="2" name="Slide Image Placeholder 1"/>
+          <p:cNvSpPr>
+            <a:spLocks noGrp="1" noRot="1" noChangeAspect="1"/>
+          </p:cNvSpPr>
+          <p:nvPr>
+            <p:ph type="sldImg"/>
+          </p:nvPr>
+        </p:nvSpPr>
+        <p:spPr/>
+      </p:sp>
+      <p:sp>
+        <p:nvSpPr>
+          <p:cNvPr id="3" name="Notes Placeholder 2"/>
+          <p:cNvSpPr>
+            <a:spLocks noGrp="1"/>
+          </p:cNvSpPr>
+          <p:nvPr>
+            <p:ph type="body" idx="1"/>
+          </p:nvPr>
+        </p:nvSpPr>
+        <p:spPr/>
+        <p:txBody>
+          <a:bodyPr/>
+          <a:lstStyle/>
+          <a:p>
+            <a:pPr marL="0" marR="0" indent="0" algn="l" defTabSz="1217613" rtl="0" eaLnBrk="1" fontAlgn="base" latinLnBrk="0" hangingPunct="1">
+              <a:lnSpc>
+                <a:spcPct val="90000"/>
+              </a:lnSpc>
+              <a:spcBef>
+                <a:spcPct val="30000"/>
+              </a:spcBef>
+              <a:spcAft>
+                <a:spcPts val="450"/>
+              </a:spcAft>
+              <a:buClrTx/>
+              <a:buSzTx/>
+              <a:buFontTx/>
+              <a:buNone/>
+              <a:tabLst/>
+              <a:defRPr/>
+            </a:pPr>
+            <a:r>
+              <a:rPr lang="en-US" dirty="0" smtClean="0"/>
+              <a:t>All the integration test should pass.</a:t>
+            </a:r>
+            <a:endParaRPr lang="en-US" dirty="0" smtClean="0"/>
+          </a:p>
+        </p:txBody>
+      </p:sp>
+      <p:sp>
+        <p:nvSpPr>
+          <p:cNvPr id="4" name="Slide Number Placeholder 3"/>
+          <p:cNvSpPr>
+            <a:spLocks noGrp="1"/>
+          </p:cNvSpPr>
+          <p:nvPr>
+            <p:ph type="sldNum" sz="quarter" idx="10"/>
+          </p:nvPr>
+        </p:nvSpPr>
+        <p:spPr/>
+        <p:txBody>
+          <a:bodyPr/>
+          <a:lstStyle/>
+          <a:p>
+            <a:pPr>
+              <a:defRPr/>
+            </a:pPr>
+            <a:fld id="{DC3734AA-3150-D947-AC52-2F5DF48BFCD5}" type="slidenum">
+              <a:rPr lang="en-US" smtClean="0"/>
+              <a:pPr>
+                <a:defRPr/>
+              </a:pPr>
+              <a:t>30</a:t>
+            </a:fld>
+            <a:endParaRPr lang="en-US" dirty="0"/>
+          </a:p>
+        </p:txBody>
+      </p:sp>
+      <p:sp>
+        <p:nvSpPr>
+          <p:cNvPr id="5" name="Header Placeholder 4"/>
+          <p:cNvSpPr>
+            <a:spLocks noGrp="1"/>
+          </p:cNvSpPr>
+          <p:nvPr>
+            <p:ph type="hdr" sz="quarter" idx="11"/>
+          </p:nvPr>
+        </p:nvSpPr>
+        <p:spPr/>
+        <p:txBody>
+          <a:bodyPr/>
+          <a:lstStyle/>
+          <a:p>
+            <a:pPr>
+              <a:defRPr/>
+            </a:pPr>
+            <a:endParaRPr lang="en-US"/>
+          </a:p>
+        </p:txBody>
+      </p:sp>
+      <p:sp>
+        <p:nvSpPr>
+          <p:cNvPr id="6" name="Footer Placeholder 5"/>
+          <p:cNvSpPr>
+            <a:spLocks noGrp="1"/>
+          </p:cNvSpPr>
+          <p:nvPr>
+            <p:ph type="ftr" sz="quarter" idx="12"/>
+          </p:nvPr>
+        </p:nvSpPr>
+        <p:spPr/>
+        <p:txBody>
+          <a:bodyPr/>
+          <a:lstStyle/>
+          <a:p>
+            <a:pPr>
+              <a:defRPr/>
+            </a:pPr>
+            <a:endParaRPr lang="en-US"/>
+          </a:p>
+        </p:txBody>
+      </p:sp>
+    </p:spTree>
+    <p:extLst>
+      <p:ext uri="{BB962C8B-B14F-4D97-AF65-F5344CB8AC3E}">
+        <p14:creationId xmlns:p14="http://schemas.microsoft.com/office/powerpoint/2010/main" val="846027182"/>
+      </p:ext>
+    </p:extLst>
+  </p:cSld>
+  <p:clrMapOvr>
+    <a:masterClrMapping/>
+  </p:clrMapOvr>
+</p:notes>
+</file>
+
+<file path=ppt/notesSlides/notesSlide3.xml><?xml version="1.0" encoding="utf-8"?>
+<p:notes xmlns:a="http://schemas.openxmlformats.org/drawingml/2006/main" xmlns:r="http://schemas.openxmlformats.org/officeDocument/2006/relationships" xmlns:p="http://schemas.openxmlformats.org/presentationml/2006/main">
+  <p:cSld>
+    <p:spTree>
+      <p:nvGrpSpPr>
+        <p:cNvPr id="1" name=""/>
+        <p:cNvGrpSpPr/>
+        <p:nvPr/>
+      </p:nvGrpSpPr>
+      <p:grpSpPr>
+        <a:xfrm>
+          <a:off x="0" y="0"/>
+          <a:ext cx="0" cy="0"/>
+          <a:chOff x="0" y="0"/>
+          <a:chExt cx="0" cy="0"/>
+        </a:xfrm>
+      </p:grpSpPr>
+      <p:sp>
+        <p:nvSpPr>
+          <p:cNvPr id="2" name="Slide Image Placeholder 1"/>
+          <p:cNvSpPr>
+            <a:spLocks noGrp="1" noRot="1" noChangeAspect="1"/>
+          </p:cNvSpPr>
+          <p:nvPr>
+            <p:ph type="sldImg"/>
+          </p:nvPr>
+        </p:nvSpPr>
+        <p:spPr/>
+      </p:sp>
+      <p:sp>
+        <p:nvSpPr>
+          <p:cNvPr id="3" name="Notes Placeholder 2"/>
+          <p:cNvSpPr>
+            <a:spLocks noGrp="1"/>
+          </p:cNvSpPr>
+          <p:nvPr>
+            <p:ph type="body" idx="1"/>
+          </p:nvPr>
+        </p:nvSpPr>
+        <p:spPr/>
+        <p:txBody>
+          <a:bodyPr/>
+          <a:lstStyle/>
+          <a:p>
+            <a:pPr marL="0" marR="0" indent="0" algn="l" defTabSz="1217613" rtl="0" eaLnBrk="1" fontAlgn="base" latinLnBrk="0" hangingPunct="1">
+              <a:lnSpc>
+                <a:spcPct val="90000"/>
+              </a:lnSpc>
+              <a:spcBef>
+                <a:spcPct val="30000"/>
+              </a:spcBef>
+              <a:spcAft>
+                <a:spcPts val="450"/>
+              </a:spcAft>
+              <a:buClrTx/>
+              <a:buSzTx/>
+              <a:buFontTx/>
+              <a:buNone/>
+              <a:tabLst/>
+              <a:defRPr/>
+            </a:pPr>
+            <a:r>
+              <a:rPr lang="en-US" baseline="0" dirty="0" smtClean="0"/>
+              <a:t>Our custom resource should be no different. Having a default action that performs a non-surprising operation is important. Of the two actions that we have defined the create action seems like the current correct default action.</a:t>
+            </a:r>
+            <a:endParaRPr lang="en-US" dirty="0"/>
+          </a:p>
+        </p:txBody>
+      </p:sp>
+      <p:sp>
+        <p:nvSpPr>
+          <p:cNvPr id="4" name="Slide Number Placeholder 3"/>
+          <p:cNvSpPr>
+            <a:spLocks noGrp="1"/>
+          </p:cNvSpPr>
+          <p:nvPr>
+            <p:ph type="sldNum" sz="quarter" idx="10"/>
+          </p:nvPr>
+        </p:nvSpPr>
+        <p:spPr/>
+        <p:txBody>
+          <a:bodyPr/>
+          <a:lstStyle/>
+          <a:p>
+            <a:pPr>
+              <a:defRPr/>
+            </a:pPr>
+            <a:fld id="{DC3734AA-3150-D947-AC52-2F5DF48BFCD5}" type="slidenum">
+              <a:rPr lang="en-US" smtClean="0"/>
+              <a:pPr>
+                <a:defRPr/>
+              </a:pPr>
+              <a:t>4</a:t>
+            </a:fld>
+            <a:endParaRPr lang="en-US" dirty="0"/>
+          </a:p>
+        </p:txBody>
+      </p:sp>
+      <p:sp>
+        <p:nvSpPr>
+          <p:cNvPr id="5" name="Header Placeholder 4"/>
+          <p:cNvSpPr>
+            <a:spLocks noGrp="1"/>
+          </p:cNvSpPr>
+          <p:nvPr>
+            <p:ph type="hdr" sz="quarter" idx="11"/>
+          </p:nvPr>
+        </p:nvSpPr>
+        <p:spPr/>
+        <p:txBody>
+          <a:bodyPr/>
+          <a:lstStyle/>
+          <a:p>
+            <a:pPr>
+              <a:defRPr/>
+            </a:pPr>
+            <a:endParaRPr lang="en-US"/>
+          </a:p>
+        </p:txBody>
+      </p:sp>
+      <p:sp>
+        <p:nvSpPr>
+          <p:cNvPr id="6" name="Footer Placeholder 5"/>
+          <p:cNvSpPr>
+            <a:spLocks noGrp="1"/>
+          </p:cNvSpPr>
+          <p:nvPr>
+            <p:ph type="ftr" sz="quarter" idx="12"/>
+          </p:nvPr>
+        </p:nvSpPr>
+        <p:spPr/>
+        <p:txBody>
+          <a:bodyPr/>
+          <a:lstStyle/>
+          <a:p>
+            <a:pPr>
+              <a:defRPr/>
+            </a:pPr>
+            <a:endParaRPr lang="en-US"/>
+          </a:p>
+        </p:txBody>
+      </p:sp>
+    </p:spTree>
+    <p:extLst>
+      <p:ext uri="{BB962C8B-B14F-4D97-AF65-F5344CB8AC3E}">
+        <p14:creationId xmlns:p14="http://schemas.microsoft.com/office/powerpoint/2010/main" val="355691265"/>
+      </p:ext>
+    </p:extLst>
+  </p:cSld>
+  <p:clrMapOvr>
+    <a:masterClrMapping/>
+  </p:clrMapOvr>
+</p:notes>
+</file>
+
+<file path=ppt/notesSlides/notesSlide30.xml><?xml version="1.0" encoding="utf-8"?>
+<p:notes xmlns:a="http://schemas.openxmlformats.org/drawingml/2006/main" xmlns:r="http://schemas.openxmlformats.org/officeDocument/2006/relationships" xmlns:p="http://schemas.openxmlformats.org/presentationml/2006/main">
+  <p:cSld>
+    <p:spTree>
+      <p:nvGrpSpPr>
+        <p:cNvPr id="1" name=""/>
+        <p:cNvGrpSpPr/>
+        <p:nvPr/>
+      </p:nvGrpSpPr>
+      <p:grpSpPr>
+        <a:xfrm>
+          <a:off x="0" y="0"/>
+          <a:ext cx="0" cy="0"/>
+          <a:chOff x="0" y="0"/>
+          <a:chExt cx="0" cy="0"/>
+        </a:xfrm>
+      </p:grpSpPr>
+      <p:sp>
+        <p:nvSpPr>
+          <p:cNvPr id="2" name="Slide Image Placeholder 1"/>
+          <p:cNvSpPr>
+            <a:spLocks noGrp="1" noRot="1" noChangeAspect="1"/>
+          </p:cNvSpPr>
+          <p:nvPr>
+            <p:ph type="sldImg"/>
+          </p:nvPr>
+        </p:nvSpPr>
+        <p:spPr/>
+      </p:sp>
+      <p:sp>
+        <p:nvSpPr>
+          <p:cNvPr id="3" name="Notes Placeholder 2"/>
+          <p:cNvSpPr>
+            <a:spLocks noGrp="1"/>
+          </p:cNvSpPr>
+          <p:nvPr>
+            <p:ph type="body" idx="1"/>
+          </p:nvPr>
+        </p:nvSpPr>
+        <p:spPr/>
+        <p:txBody>
+          <a:bodyPr/>
+          <a:lstStyle/>
+          <a:p>
+            <a:r>
+              <a:rPr lang="en-US" dirty="0" smtClean="0"/>
+              <a:t>We now</a:t>
+            </a:r>
+            <a:r>
+              <a:rPr lang="en-US" baseline="0" dirty="0" smtClean="0"/>
+              <a:t> have refactored the custom resource to have it behave more like other resources we are familiar within Chef.</a:t>
+            </a:r>
+            <a:endParaRPr lang="en-US" dirty="0"/>
+          </a:p>
+        </p:txBody>
+      </p:sp>
+      <p:sp>
+        <p:nvSpPr>
+          <p:cNvPr id="4" name="Slide Number Placeholder 3"/>
+          <p:cNvSpPr>
+            <a:spLocks noGrp="1"/>
+          </p:cNvSpPr>
+          <p:nvPr>
+            <p:ph type="sldNum" sz="quarter" idx="10"/>
+          </p:nvPr>
+        </p:nvSpPr>
+        <p:spPr/>
+        <p:txBody>
+          <a:bodyPr/>
+          <a:lstStyle/>
+          <a:p>
+            <a:pPr>
+              <a:defRPr/>
+            </a:pPr>
+            <a:fld id="{DC3734AA-3150-D947-AC52-2F5DF48BFCD5}" type="slidenum">
+              <a:rPr lang="en-US" smtClean="0"/>
+              <a:pPr>
+                <a:defRPr/>
+              </a:pPr>
+              <a:t>31</a:t>
+            </a:fld>
+            <a:endParaRPr lang="en-US" dirty="0"/>
+          </a:p>
+        </p:txBody>
+      </p:sp>
+      <p:sp>
+        <p:nvSpPr>
+          <p:cNvPr id="5" name="Header Placeholder 4"/>
+          <p:cNvSpPr>
+            <a:spLocks noGrp="1"/>
+          </p:cNvSpPr>
+          <p:nvPr>
+            <p:ph type="hdr" sz="quarter" idx="11"/>
+          </p:nvPr>
+        </p:nvSpPr>
+        <p:spPr/>
+        <p:txBody>
+          <a:bodyPr/>
+          <a:lstStyle/>
+          <a:p>
+            <a:pPr>
+              <a:defRPr/>
+            </a:pPr>
+            <a:endParaRPr lang="en-US"/>
+          </a:p>
+        </p:txBody>
+      </p:sp>
+      <p:sp>
+        <p:nvSpPr>
+          <p:cNvPr id="6" name="Footer Placeholder 5"/>
+          <p:cNvSpPr>
+            <a:spLocks noGrp="1"/>
+          </p:cNvSpPr>
+          <p:nvPr>
+            <p:ph type="ftr" sz="quarter" idx="12"/>
+          </p:nvPr>
+        </p:nvSpPr>
+        <p:spPr/>
+        <p:txBody>
+          <a:bodyPr/>
+          <a:lstStyle/>
+          <a:p>
+            <a:pPr>
+              <a:defRPr/>
+            </a:pPr>
+            <a:endParaRPr lang="en-US"/>
+          </a:p>
+        </p:txBody>
+      </p:sp>
+    </p:spTree>
+    <p:extLst>
+      <p:ext uri="{BB962C8B-B14F-4D97-AF65-F5344CB8AC3E}">
+        <p14:creationId xmlns:p14="http://schemas.microsoft.com/office/powerpoint/2010/main" val="689621087"/>
+      </p:ext>
+    </p:extLst>
+  </p:cSld>
+  <p:clrMapOvr>
+    <a:masterClrMapping/>
+  </p:clrMapOvr>
+</p:notes>
+</file>
+
+<file path=ppt/notesSlides/notesSlide31.xml><?xml version="1.0" encoding="utf-8"?>
+<p:notes xmlns:a="http://schemas.openxmlformats.org/drawingml/2006/main" xmlns:r="http://schemas.openxmlformats.org/officeDocument/2006/relationships" xmlns:p="http://schemas.openxmlformats.org/presentationml/2006/main">
+  <p:cSld>
+    <p:spTree>
+      <p:nvGrpSpPr>
+        <p:cNvPr id="1" name=""/>
+        <p:cNvGrpSpPr/>
+        <p:nvPr/>
+      </p:nvGrpSpPr>
+      <p:grpSpPr>
+        <a:xfrm>
+          <a:off x="0" y="0"/>
+          <a:ext cx="0" cy="0"/>
+          <a:chOff x="0" y="0"/>
+          <a:chExt cx="0" cy="0"/>
+        </a:xfrm>
+      </p:grpSpPr>
+      <p:sp>
+        <p:nvSpPr>
+          <p:cNvPr id="2" name="Slide Image Placeholder 1"/>
+          <p:cNvSpPr>
+            <a:spLocks noGrp="1" noRot="1" noChangeAspect="1"/>
+          </p:cNvSpPr>
+          <p:nvPr>
+            <p:ph type="sldImg"/>
+          </p:nvPr>
+        </p:nvSpPr>
+        <p:spPr/>
+      </p:sp>
+      <p:sp>
+        <p:nvSpPr>
+          <p:cNvPr id="3" name="Notes Placeholder 2"/>
+          <p:cNvSpPr>
+            <a:spLocks noGrp="1"/>
+          </p:cNvSpPr>
+          <p:nvPr>
+            <p:ph type="body" idx="1"/>
+          </p:nvPr>
+        </p:nvSpPr>
+        <p:spPr/>
+        <p:txBody>
+          <a:bodyPr/>
+          <a:lstStyle/>
+          <a:p>
+            <a:r>
+              <a:rPr lang="en-US" smtClean="0"/>
+              <a:t>What questions can we answer for you?</a:t>
+            </a:r>
+            <a:endParaRPr lang="en-US"/>
+          </a:p>
+        </p:txBody>
+      </p:sp>
+      <p:sp>
+        <p:nvSpPr>
+          <p:cNvPr id="4" name="Slide Number Placeholder 3"/>
+          <p:cNvSpPr>
+            <a:spLocks noGrp="1"/>
+          </p:cNvSpPr>
+          <p:nvPr>
+            <p:ph type="sldNum" sz="quarter" idx="10"/>
+          </p:nvPr>
+        </p:nvSpPr>
+        <p:spPr/>
+        <p:txBody>
+          <a:bodyPr/>
+          <a:lstStyle/>
+          <a:p>
+            <a:pPr>
+              <a:defRPr/>
+            </a:pPr>
+            <a:fld id="{DC3734AA-3150-D947-AC52-2F5DF48BFCD5}" type="slidenum">
+              <a:rPr lang="en-US" smtClean="0"/>
+              <a:pPr>
+                <a:defRPr/>
+              </a:pPr>
+              <a:t>32</a:t>
+            </a:fld>
+            <a:endParaRPr lang="en-US" dirty="0"/>
+          </a:p>
+        </p:txBody>
+      </p:sp>
+      <p:sp>
+        <p:nvSpPr>
+          <p:cNvPr id="5" name="Header Placeholder 4"/>
+          <p:cNvSpPr>
+            <a:spLocks noGrp="1"/>
+          </p:cNvSpPr>
+          <p:nvPr>
+            <p:ph type="hdr" sz="quarter" idx="11"/>
+          </p:nvPr>
+        </p:nvSpPr>
+        <p:spPr/>
+        <p:txBody>
+          <a:bodyPr/>
+          <a:lstStyle/>
+          <a:p>
+            <a:pPr>
+              <a:defRPr/>
+            </a:pPr>
+            <a:endParaRPr lang="en-US"/>
+          </a:p>
+        </p:txBody>
+      </p:sp>
+      <p:sp>
+        <p:nvSpPr>
+          <p:cNvPr id="6" name="Footer Placeholder 5"/>
+          <p:cNvSpPr>
+            <a:spLocks noGrp="1"/>
+          </p:cNvSpPr>
+          <p:nvPr>
+            <p:ph type="ftr" sz="quarter" idx="12"/>
+          </p:nvPr>
+        </p:nvSpPr>
+        <p:spPr/>
+        <p:txBody>
+          <a:bodyPr/>
+          <a:lstStyle/>
+          <a:p>
+            <a:pPr>
+              <a:defRPr/>
+            </a:pPr>
+            <a:endParaRPr lang="en-US"/>
+          </a:p>
+        </p:txBody>
+      </p:sp>
+    </p:spTree>
+    <p:extLst>
+      <p:ext uri="{BB962C8B-B14F-4D97-AF65-F5344CB8AC3E}">
+        <p14:creationId xmlns:p14="http://schemas.microsoft.com/office/powerpoint/2010/main" val="1997297844"/>
+      </p:ext>
+    </p:extLst>
+  </p:cSld>
+  <p:clrMapOvr>
+    <a:masterClrMapping/>
+  </p:clrMapOvr>
+</p:notes>
+</file>
+
+<file path=ppt/notesSlides/notesSlide4.xml><?xml version="1.0" encoding="utf-8"?>
+<p:notes xmlns:a="http://schemas.openxmlformats.org/drawingml/2006/main" xmlns:r="http://schemas.openxmlformats.org/officeDocument/2006/relationships" xmlns:p="http://schemas.openxmlformats.org/presentationml/2006/main">
+  <p:cSld>
+    <p:spTree>
+      <p:nvGrpSpPr>
+        <p:cNvPr id="1" name=""/>
+        <p:cNvGrpSpPr/>
+        <p:nvPr/>
+      </p:nvGrpSpPr>
+      <p:grpSpPr>
+        <a:xfrm>
+          <a:off x="0" y="0"/>
+          <a:ext cx="0" cy="0"/>
+          <a:chOff x="0" y="0"/>
+          <a:chExt cx="0" cy="0"/>
+        </a:xfrm>
+      </p:grpSpPr>
+      <p:sp>
+        <p:nvSpPr>
+          <p:cNvPr id="2" name="Slide Image Placeholder 1"/>
+          <p:cNvSpPr>
+            <a:spLocks noGrp="1" noRot="1" noChangeAspect="1"/>
+          </p:cNvSpPr>
+          <p:nvPr>
+            <p:ph type="sldImg"/>
+          </p:nvPr>
+        </p:nvSpPr>
+        <p:spPr/>
+      </p:sp>
+      <p:sp>
+        <p:nvSpPr>
+          <p:cNvPr id="3" name="Notes Placeholder 2"/>
+          <p:cNvSpPr>
+            <a:spLocks noGrp="1"/>
+          </p:cNvSpPr>
+          <p:nvPr>
+            <p:ph type="body" idx="1"/>
+          </p:nvPr>
+        </p:nvSpPr>
+        <p:spPr/>
+        <p:txBody>
+          <a:bodyPr/>
+          <a:lstStyle/>
+          <a:p>
+            <a:r>
+              <a:rPr lang="en-US" dirty="0" smtClean="0"/>
+              <a:t>If you defined the create</a:t>
+            </a:r>
+            <a:r>
+              <a:rPr lang="en-US" baseline="0" dirty="0" smtClean="0"/>
+              <a:t> action as the first action within a resource definition file it automatically is the default action. The first action is the default action and that probably makes sense to those reading the custom resource definition.</a:t>
+            </a:r>
+          </a:p>
+          <a:p>
+            <a:endParaRPr lang="en-US" baseline="0" dirty="0" smtClean="0"/>
+          </a:p>
+          <a:p>
+            <a:r>
+              <a:rPr lang="en-US" baseline="0" dirty="0" smtClean="0"/>
+              <a:t>You may also explicitly declare the default action.</a:t>
+            </a:r>
+            <a:endParaRPr lang="en-US" dirty="0"/>
+          </a:p>
+        </p:txBody>
+      </p:sp>
+      <p:sp>
+        <p:nvSpPr>
+          <p:cNvPr id="4" name="Slide Number Placeholder 3"/>
+          <p:cNvSpPr>
+            <a:spLocks noGrp="1"/>
+          </p:cNvSpPr>
+          <p:nvPr>
+            <p:ph type="sldNum" sz="quarter" idx="10"/>
+          </p:nvPr>
+        </p:nvSpPr>
+        <p:spPr/>
+        <p:txBody>
+          <a:bodyPr/>
+          <a:lstStyle/>
+          <a:p>
+            <a:pPr>
+              <a:defRPr/>
+            </a:pPr>
+            <a:fld id="{DC3734AA-3150-D947-AC52-2F5DF48BFCD5}" type="slidenum">
+              <a:rPr lang="en-US" smtClean="0"/>
+              <a:pPr>
+                <a:defRPr/>
+              </a:pPr>
+              <a:t>5</a:t>
+            </a:fld>
+            <a:endParaRPr lang="en-US" dirty="0"/>
+          </a:p>
+        </p:txBody>
+      </p:sp>
+      <p:sp>
+        <p:nvSpPr>
+          <p:cNvPr id="5" name="Header Placeholder 4"/>
+          <p:cNvSpPr>
+            <a:spLocks noGrp="1"/>
+          </p:cNvSpPr>
+          <p:nvPr>
+            <p:ph type="hdr" sz="quarter" idx="11"/>
+          </p:nvPr>
+        </p:nvSpPr>
+        <p:spPr/>
+        <p:txBody>
+          <a:bodyPr/>
+          <a:lstStyle/>
+          <a:p>
+            <a:pPr>
+              <a:defRPr/>
+            </a:pPr>
+            <a:endParaRPr lang="en-US"/>
+          </a:p>
+        </p:txBody>
+      </p:sp>
+      <p:sp>
+        <p:nvSpPr>
+          <p:cNvPr id="6" name="Footer Placeholder 5"/>
+          <p:cNvSpPr>
+            <a:spLocks noGrp="1"/>
+          </p:cNvSpPr>
+          <p:nvPr>
+            <p:ph type="ftr" sz="quarter" idx="12"/>
+          </p:nvPr>
+        </p:nvSpPr>
+        <p:spPr/>
+        <p:txBody>
+          <a:bodyPr/>
+          <a:lstStyle/>
+          <a:p>
+            <a:pPr>
+              <a:defRPr/>
+            </a:pPr>
+            <a:endParaRPr lang="en-US"/>
+          </a:p>
+        </p:txBody>
+      </p:sp>
+    </p:spTree>
+    <p:extLst>
+      <p:ext uri="{BB962C8B-B14F-4D97-AF65-F5344CB8AC3E}">
+        <p14:creationId xmlns:p14="http://schemas.microsoft.com/office/powerpoint/2010/main" val="1700728687"/>
+      </p:ext>
+    </p:extLst>
+  </p:cSld>
+  <p:clrMapOvr>
+    <a:masterClrMapping/>
+  </p:clrMapOvr>
+</p:notes>
+</file>
+
+<file path=ppt/notesSlides/notesSlide5.xml><?xml version="1.0" encoding="utf-8"?>
+<p:notes xmlns:a="http://schemas.openxmlformats.org/drawingml/2006/main" xmlns:r="http://schemas.openxmlformats.org/officeDocument/2006/relationships" xmlns:p="http://schemas.openxmlformats.org/presentationml/2006/main">
+  <p:cSld>
+    <p:spTree>
+      <p:nvGrpSpPr>
+        <p:cNvPr id="1" name=""/>
+        <p:cNvGrpSpPr/>
+        <p:nvPr/>
+      </p:nvGrpSpPr>
+      <p:grpSpPr>
+        <a:xfrm>
+          <a:off x="0" y="0"/>
+          <a:ext cx="0" cy="0"/>
+          <a:chOff x="0" y="0"/>
+          <a:chExt cx="0" cy="0"/>
+        </a:xfrm>
+      </p:grpSpPr>
+      <p:sp>
+        <p:nvSpPr>
+          <p:cNvPr id="2" name="Slide Image Placeholder 1"/>
+          <p:cNvSpPr>
+            <a:spLocks noGrp="1" noRot="1" noChangeAspect="1"/>
+          </p:cNvSpPr>
+          <p:nvPr>
+            <p:ph type="sldImg"/>
+          </p:nvPr>
+        </p:nvSpPr>
+        <p:spPr/>
+      </p:sp>
+      <p:sp>
+        <p:nvSpPr>
+          <p:cNvPr id="3" name="Notes Placeholder 2"/>
+          <p:cNvSpPr>
+            <a:spLocks noGrp="1"/>
+          </p:cNvSpPr>
+          <p:nvPr>
+            <p:ph type="body" idx="1"/>
+          </p:nvPr>
+        </p:nvSpPr>
+        <p:spPr/>
+        <p:txBody>
+          <a:bodyPr/>
+          <a:lstStyle/>
+          <a:p>
+            <a:r>
+              <a:rPr lang="en-US" dirty="0" smtClean="0"/>
+              <a:t>If</a:t>
+            </a:r>
+            <a:r>
+              <a:rPr lang="en-US" baseline="0" dirty="0" smtClean="0"/>
+              <a:t> the first action is the create action then you do not need to explicitly define the default action. However, you may decide that it makes it clearer for you or those you are collaborating with to specify this within the resource definition.</a:t>
+            </a:r>
+            <a:endParaRPr lang="en-US" dirty="0"/>
+          </a:p>
+        </p:txBody>
+      </p:sp>
+      <p:sp>
+        <p:nvSpPr>
+          <p:cNvPr id="4" name="Slide Number Placeholder 3"/>
+          <p:cNvSpPr>
+            <a:spLocks noGrp="1"/>
+          </p:cNvSpPr>
+          <p:nvPr>
+            <p:ph type="sldNum" sz="quarter" idx="10"/>
+          </p:nvPr>
+        </p:nvSpPr>
+        <p:spPr/>
+        <p:txBody>
+          <a:bodyPr/>
+          <a:lstStyle/>
+          <a:p>
+            <a:pPr>
+              <a:defRPr/>
+            </a:pPr>
+            <a:fld id="{DC3734AA-3150-D947-AC52-2F5DF48BFCD5}" type="slidenum">
+              <a:rPr lang="en-US" smtClean="0"/>
+              <a:pPr>
+                <a:defRPr/>
+              </a:pPr>
+              <a:t>6</a:t>
+            </a:fld>
+            <a:endParaRPr lang="en-US" dirty="0"/>
+          </a:p>
+        </p:txBody>
+      </p:sp>
+      <p:sp>
+        <p:nvSpPr>
+          <p:cNvPr id="5" name="Header Placeholder 4"/>
+          <p:cNvSpPr>
+            <a:spLocks noGrp="1"/>
+          </p:cNvSpPr>
+          <p:nvPr>
+            <p:ph type="hdr" sz="quarter" idx="11"/>
+          </p:nvPr>
+        </p:nvSpPr>
+        <p:spPr/>
+        <p:txBody>
+          <a:bodyPr/>
+          <a:lstStyle/>
+          <a:p>
+            <a:pPr>
+              <a:defRPr/>
+            </a:pPr>
+            <a:endParaRPr lang="en-US"/>
+          </a:p>
+        </p:txBody>
+      </p:sp>
+      <p:sp>
+        <p:nvSpPr>
+          <p:cNvPr id="6" name="Footer Placeholder 5"/>
+          <p:cNvSpPr>
+            <a:spLocks noGrp="1"/>
+          </p:cNvSpPr>
+          <p:nvPr>
+            <p:ph type="ftr" sz="quarter" idx="12"/>
+          </p:nvPr>
+        </p:nvSpPr>
+        <p:spPr/>
+        <p:txBody>
+          <a:bodyPr/>
+          <a:lstStyle/>
+          <a:p>
+            <a:pPr>
+              <a:defRPr/>
+            </a:pPr>
+            <a:endParaRPr lang="en-US"/>
+          </a:p>
+        </p:txBody>
+      </p:sp>
+    </p:spTree>
+    <p:extLst>
+      <p:ext uri="{BB962C8B-B14F-4D97-AF65-F5344CB8AC3E}">
+        <p14:creationId xmlns:p14="http://schemas.microsoft.com/office/powerpoint/2010/main" val="56398510"/>
+      </p:ext>
+    </p:extLst>
+  </p:cSld>
+  <p:clrMapOvr>
+    <a:masterClrMapping/>
+  </p:clrMapOvr>
+</p:notes>
+</file>
+
+<file path=ppt/notesSlides/notesSlide6.xml><?xml version="1.0" encoding="utf-8"?>
+<p:notes xmlns:a="http://schemas.openxmlformats.org/drawingml/2006/main" xmlns:r="http://schemas.openxmlformats.org/officeDocument/2006/relationships" xmlns:p="http://schemas.openxmlformats.org/presentationml/2006/main">
+  <p:cSld>
+    <p:spTree>
+      <p:nvGrpSpPr>
+        <p:cNvPr id="1" name=""/>
+        <p:cNvGrpSpPr/>
+        <p:nvPr/>
+      </p:nvGrpSpPr>
+      <p:grpSpPr>
+        <a:xfrm>
+          <a:off x="0" y="0"/>
+          <a:ext cx="0" cy="0"/>
+          <a:chOff x="0" y="0"/>
+          <a:chExt cx="0" cy="0"/>
+        </a:xfrm>
+      </p:grpSpPr>
+      <p:sp>
+        <p:nvSpPr>
+          <p:cNvPr id="2" name="Slide Image Placeholder 1"/>
+          <p:cNvSpPr>
+            <a:spLocks noGrp="1" noRot="1" noChangeAspect="1"/>
+          </p:cNvSpPr>
+          <p:nvPr>
+            <p:ph type="sldImg"/>
+          </p:nvPr>
+        </p:nvSpPr>
+        <p:spPr/>
+      </p:sp>
+      <p:sp>
+        <p:nvSpPr>
+          <p:cNvPr id="3" name="Notes Placeholder 2"/>
+          <p:cNvSpPr>
+            <a:spLocks noGrp="1"/>
+          </p:cNvSpPr>
+          <p:nvPr>
+            <p:ph type="body" idx="1"/>
+          </p:nvPr>
+        </p:nvSpPr>
+        <p:spPr/>
+        <p:txBody>
+          <a:bodyPr/>
+          <a:lstStyle/>
+          <a:p>
+            <a:r>
+              <a:rPr lang="en-US" dirty="0" smtClean="0"/>
+              <a:t>With</a:t>
+            </a:r>
+            <a:r>
+              <a:rPr lang="en-US" baseline="0" dirty="0" smtClean="0"/>
+              <a:t> the default action defined all uses of the custom resource which explicitly defined it may have those lines removed.</a:t>
+            </a:r>
+            <a:endParaRPr lang="en-US" dirty="0"/>
+          </a:p>
+        </p:txBody>
+      </p:sp>
+      <p:sp>
+        <p:nvSpPr>
+          <p:cNvPr id="4" name="Slide Number Placeholder 3"/>
+          <p:cNvSpPr>
+            <a:spLocks noGrp="1"/>
+          </p:cNvSpPr>
+          <p:nvPr>
+            <p:ph type="sldNum" sz="quarter" idx="10"/>
+          </p:nvPr>
+        </p:nvSpPr>
+        <p:spPr/>
+        <p:txBody>
+          <a:bodyPr/>
+          <a:lstStyle/>
+          <a:p>
+            <a:pPr>
+              <a:defRPr/>
+            </a:pPr>
+            <a:fld id="{DC3734AA-3150-D947-AC52-2F5DF48BFCD5}" type="slidenum">
+              <a:rPr lang="en-US" smtClean="0"/>
+              <a:pPr>
+                <a:defRPr/>
+              </a:pPr>
+              <a:t>7</a:t>
+            </a:fld>
+            <a:endParaRPr lang="en-US" dirty="0"/>
+          </a:p>
+        </p:txBody>
+      </p:sp>
+      <p:sp>
+        <p:nvSpPr>
+          <p:cNvPr id="5" name="Header Placeholder 4"/>
+          <p:cNvSpPr>
+            <a:spLocks noGrp="1"/>
+          </p:cNvSpPr>
+          <p:nvPr>
+            <p:ph type="hdr" sz="quarter" idx="11"/>
+          </p:nvPr>
+        </p:nvSpPr>
+        <p:spPr/>
+        <p:txBody>
+          <a:bodyPr/>
+          <a:lstStyle/>
+          <a:p>
+            <a:pPr>
+              <a:defRPr/>
+            </a:pPr>
+            <a:endParaRPr lang="en-US"/>
+          </a:p>
+        </p:txBody>
+      </p:sp>
+      <p:sp>
+        <p:nvSpPr>
+          <p:cNvPr id="6" name="Footer Placeholder 5"/>
+          <p:cNvSpPr>
+            <a:spLocks noGrp="1"/>
+          </p:cNvSpPr>
+          <p:nvPr>
+            <p:ph type="ftr" sz="quarter" idx="12"/>
+          </p:nvPr>
+        </p:nvSpPr>
+        <p:spPr/>
+        <p:txBody>
+          <a:bodyPr/>
+          <a:lstStyle/>
+          <a:p>
+            <a:pPr>
+              <a:defRPr/>
+            </a:pPr>
+            <a:endParaRPr lang="en-US"/>
+          </a:p>
+        </p:txBody>
+      </p:sp>
+    </p:spTree>
+    <p:extLst>
+      <p:ext uri="{BB962C8B-B14F-4D97-AF65-F5344CB8AC3E}">
+        <p14:creationId xmlns:p14="http://schemas.microsoft.com/office/powerpoint/2010/main" val="1827479401"/>
+      </p:ext>
+    </p:extLst>
+  </p:cSld>
+  <p:clrMapOvr>
+    <a:masterClrMapping/>
+  </p:clrMapOvr>
+</p:notes>
+</file>
+
+<file path=ppt/notesSlides/notesSlide7.xml><?xml version="1.0" encoding="utf-8"?>
+<p:notes xmlns:a="http://schemas.openxmlformats.org/drawingml/2006/main" xmlns:r="http://schemas.openxmlformats.org/officeDocument/2006/relationships" xmlns:p="http://schemas.openxmlformats.org/presentationml/2006/main">
+  <p:cSld>
+    <p:spTree>
+      <p:nvGrpSpPr>
+        <p:cNvPr id="1" name=""/>
+        <p:cNvGrpSpPr/>
+        <p:nvPr/>
+      </p:nvGrpSpPr>
+      <p:grpSpPr>
+        <a:xfrm>
+          <a:off x="0" y="0"/>
+          <a:ext cx="0" cy="0"/>
+          <a:chOff x="0" y="0"/>
+          <a:chExt cx="0" cy="0"/>
+        </a:xfrm>
+      </p:grpSpPr>
+      <p:sp>
+        <p:nvSpPr>
+          <p:cNvPr id="2" name="Slide Image Placeholder 1"/>
+          <p:cNvSpPr>
+            <a:spLocks noGrp="1" noRot="1" noChangeAspect="1"/>
+          </p:cNvSpPr>
+          <p:nvPr>
+            <p:ph type="sldImg"/>
+          </p:nvPr>
+        </p:nvSpPr>
+        <p:spPr/>
+      </p:sp>
+      <p:sp>
+        <p:nvSpPr>
+          <p:cNvPr id="3" name="Notes Placeholder 2"/>
+          <p:cNvSpPr>
+            <a:spLocks noGrp="1"/>
+          </p:cNvSpPr>
+          <p:nvPr>
+            <p:ph type="body" idx="1"/>
+          </p:nvPr>
+        </p:nvSpPr>
+        <p:spPr/>
+        <p:txBody>
+          <a:bodyPr/>
+          <a:lstStyle/>
+          <a:p>
+            <a:pPr marL="0" marR="0" indent="0" algn="l" defTabSz="1217613" rtl="0" eaLnBrk="1" fontAlgn="base" latinLnBrk="0" hangingPunct="1">
+              <a:lnSpc>
+                <a:spcPct val="90000"/>
+              </a:lnSpc>
+              <a:spcBef>
+                <a:spcPct val="30000"/>
+              </a:spcBef>
+              <a:spcAft>
+                <a:spcPts val="450"/>
+              </a:spcAft>
+              <a:buClrTx/>
+              <a:buSzTx/>
+              <a:buFontTx/>
+              <a:buNone/>
+              <a:tabLst/>
+              <a:defRPr/>
+            </a:pPr>
+            <a:r>
+              <a:rPr lang="en-US" dirty="0" smtClean="0"/>
+              <a:t>With</a:t>
+            </a:r>
+            <a:r>
+              <a:rPr lang="en-US" baseline="0" dirty="0" smtClean="0"/>
+              <a:t> the default action defined all uses of the custom resource which explicitly defined it may have those lines removed.</a:t>
+            </a:r>
+            <a:endParaRPr lang="en-US" dirty="0" smtClean="0"/>
+          </a:p>
+        </p:txBody>
+      </p:sp>
+      <p:sp>
+        <p:nvSpPr>
+          <p:cNvPr id="4" name="Slide Number Placeholder 3"/>
+          <p:cNvSpPr>
+            <a:spLocks noGrp="1"/>
+          </p:cNvSpPr>
+          <p:nvPr>
+            <p:ph type="sldNum" sz="quarter" idx="10"/>
+          </p:nvPr>
+        </p:nvSpPr>
+        <p:spPr/>
+        <p:txBody>
+          <a:bodyPr/>
+          <a:lstStyle/>
+          <a:p>
+            <a:pPr>
+              <a:defRPr/>
+            </a:pPr>
+            <a:fld id="{DC3734AA-3150-D947-AC52-2F5DF48BFCD5}" type="slidenum">
+              <a:rPr lang="en-US" smtClean="0"/>
+              <a:pPr>
+                <a:defRPr/>
+              </a:pPr>
+              <a:t>8</a:t>
+            </a:fld>
+            <a:endParaRPr lang="en-US" dirty="0"/>
+          </a:p>
+        </p:txBody>
+      </p:sp>
+      <p:sp>
+        <p:nvSpPr>
+          <p:cNvPr id="5" name="Header Placeholder 4"/>
+          <p:cNvSpPr>
+            <a:spLocks noGrp="1"/>
+          </p:cNvSpPr>
+          <p:nvPr>
+            <p:ph type="hdr" sz="quarter" idx="11"/>
+          </p:nvPr>
+        </p:nvSpPr>
+        <p:spPr/>
+        <p:txBody>
+          <a:bodyPr/>
+          <a:lstStyle/>
+          <a:p>
+            <a:pPr>
+              <a:defRPr/>
+            </a:pPr>
+            <a:endParaRPr lang="en-US"/>
+          </a:p>
+        </p:txBody>
+      </p:sp>
+      <p:sp>
+        <p:nvSpPr>
+          <p:cNvPr id="6" name="Footer Placeholder 5"/>
+          <p:cNvSpPr>
+            <a:spLocks noGrp="1"/>
+          </p:cNvSpPr>
+          <p:nvPr>
+            <p:ph type="ftr" sz="quarter" idx="12"/>
+          </p:nvPr>
+        </p:nvSpPr>
+        <p:spPr/>
+        <p:txBody>
+          <a:bodyPr/>
+          <a:lstStyle/>
+          <a:p>
+            <a:pPr>
+              <a:defRPr/>
+            </a:pPr>
+            <a:endParaRPr lang="en-US"/>
+          </a:p>
+        </p:txBody>
+      </p:sp>
+    </p:spTree>
+    <p:extLst>
+      <p:ext uri="{BB962C8B-B14F-4D97-AF65-F5344CB8AC3E}">
+        <p14:creationId xmlns:p14="http://schemas.microsoft.com/office/powerpoint/2010/main" val="836238200"/>
+      </p:ext>
+    </p:extLst>
+  </p:cSld>
+  <p:clrMapOvr>
+    <a:masterClrMapping/>
+  </p:clrMapOvr>
+</p:notes>
+</file>
+
+<file path=ppt/notesSlides/notesSlide8.xml><?xml version="1.0" encoding="utf-8"?>
+<p:notes xmlns:a="http://schemas.openxmlformats.org/drawingml/2006/main" xmlns:r="http://schemas.openxmlformats.org/officeDocument/2006/relationships" xmlns:p="http://schemas.openxmlformats.org/presentationml/2006/main">
+  <p:cSld>
+    <p:spTree>
+      <p:nvGrpSpPr>
+        <p:cNvPr id="1" name=""/>
+        <p:cNvGrpSpPr/>
+        <p:nvPr/>
+      </p:nvGrpSpPr>
+      <p:grpSpPr>
+        <a:xfrm>
+          <a:off x="0" y="0"/>
+          <a:ext cx="0" cy="0"/>
+          <a:chOff x="0" y="0"/>
+          <a:chExt cx="0" cy="0"/>
+        </a:xfrm>
+      </p:grpSpPr>
+      <p:sp>
+        <p:nvSpPr>
+          <p:cNvPr id="2" name="Slide Image Placeholder 1"/>
+          <p:cNvSpPr>
+            <a:spLocks noGrp="1" noRot="1" noChangeAspect="1"/>
+          </p:cNvSpPr>
+          <p:nvPr>
+            <p:ph type="sldImg"/>
+          </p:nvPr>
+        </p:nvSpPr>
+        <p:spPr/>
+      </p:sp>
+      <p:sp>
+        <p:nvSpPr>
+          <p:cNvPr id="3" name="Notes Placeholder 2"/>
+          <p:cNvSpPr>
+            <a:spLocks noGrp="1"/>
+          </p:cNvSpPr>
+          <p:nvPr>
+            <p:ph type="body" idx="1"/>
+          </p:nvPr>
+        </p:nvSpPr>
+        <p:spPr/>
+        <p:txBody>
+          <a:bodyPr/>
+          <a:lstStyle/>
+          <a:p>
+            <a:r>
+              <a:rPr lang="en-US" dirty="0" smtClean="0"/>
+              <a:t>All the unit tests should pass.</a:t>
+            </a:r>
+            <a:endParaRPr lang="en-US" dirty="0"/>
+          </a:p>
+        </p:txBody>
+      </p:sp>
+      <p:sp>
+        <p:nvSpPr>
+          <p:cNvPr id="4" name="Slide Number Placeholder 3"/>
+          <p:cNvSpPr>
+            <a:spLocks noGrp="1"/>
+          </p:cNvSpPr>
+          <p:nvPr>
+            <p:ph type="sldNum" sz="quarter" idx="10"/>
+          </p:nvPr>
+        </p:nvSpPr>
+        <p:spPr/>
+        <p:txBody>
+          <a:bodyPr/>
+          <a:lstStyle/>
+          <a:p>
+            <a:pPr>
+              <a:defRPr/>
+            </a:pPr>
+            <a:fld id="{DC3734AA-3150-D947-AC52-2F5DF48BFCD5}" type="slidenum">
+              <a:rPr lang="en-US" smtClean="0"/>
+              <a:pPr>
+                <a:defRPr/>
+              </a:pPr>
+              <a:t>9</a:t>
+            </a:fld>
+            <a:endParaRPr lang="en-US" dirty="0"/>
+          </a:p>
+        </p:txBody>
+      </p:sp>
+      <p:sp>
+        <p:nvSpPr>
+          <p:cNvPr id="5" name="Header Placeholder 4"/>
+          <p:cNvSpPr>
+            <a:spLocks noGrp="1"/>
+          </p:cNvSpPr>
+          <p:nvPr>
+            <p:ph type="hdr" sz="quarter" idx="11"/>
+          </p:nvPr>
+        </p:nvSpPr>
+        <p:spPr/>
+        <p:txBody>
+          <a:bodyPr/>
+          <a:lstStyle/>
+          <a:p>
+            <a:pPr>
+              <a:defRPr/>
+            </a:pPr>
+            <a:endParaRPr lang="en-US"/>
+          </a:p>
+        </p:txBody>
+      </p:sp>
+      <p:sp>
+        <p:nvSpPr>
+          <p:cNvPr id="6" name="Footer Placeholder 5"/>
+          <p:cNvSpPr>
+            <a:spLocks noGrp="1"/>
+          </p:cNvSpPr>
+          <p:nvPr>
+            <p:ph type="ftr" sz="quarter" idx="12"/>
+          </p:nvPr>
+        </p:nvSpPr>
+        <p:spPr/>
+        <p:txBody>
+          <a:bodyPr/>
+          <a:lstStyle/>
+          <a:p>
+            <a:pPr>
+              <a:defRPr/>
+            </a:pPr>
+            <a:endParaRPr lang="en-US"/>
+          </a:p>
+        </p:txBody>
+      </p:sp>
+    </p:spTree>
+    <p:extLst>
+      <p:ext uri="{BB962C8B-B14F-4D97-AF65-F5344CB8AC3E}">
+        <p14:creationId xmlns:p14="http://schemas.microsoft.com/office/powerpoint/2010/main" val="405493619"/>
+      </p:ext>
+    </p:extLst>
+  </p:cSld>
+  <p:clrMapOvr>
+    <a:masterClrMapping/>
+  </p:clrMapOvr>
+</p:notes>
+</file>
+
+<file path=ppt/notesSlides/notesSlide9.xml><?xml version="1.0" encoding="utf-8"?>
+<p:notes xmlns:a="http://schemas.openxmlformats.org/drawingml/2006/main" xmlns:r="http://schemas.openxmlformats.org/officeDocument/2006/relationships" xmlns:p="http://schemas.openxmlformats.org/presentationml/2006/main">
+  <p:cSld>
+    <p:spTree>
+      <p:nvGrpSpPr>
+        <p:cNvPr id="1" name=""/>
+        <p:cNvGrpSpPr/>
+        <p:nvPr/>
+      </p:nvGrpSpPr>
+      <p:grpSpPr>
+        <a:xfrm>
+          <a:off x="0" y="0"/>
+          <a:ext cx="0" cy="0"/>
+          <a:chOff x="0" y="0"/>
+          <a:chExt cx="0" cy="0"/>
+        </a:xfrm>
+      </p:grpSpPr>
+      <p:sp>
+        <p:nvSpPr>
+          <p:cNvPr id="2" name="Slide Image Placeholder 1"/>
+          <p:cNvSpPr>
+            <a:spLocks noGrp="1" noRot="1" noChangeAspect="1"/>
+          </p:cNvSpPr>
+          <p:nvPr>
+            <p:ph type="sldImg"/>
+          </p:nvPr>
+        </p:nvSpPr>
+        <p:spPr/>
+      </p:sp>
+      <p:sp>
+        <p:nvSpPr>
+          <p:cNvPr id="3" name="Notes Placeholder 2"/>
+          <p:cNvSpPr>
+            <a:spLocks noGrp="1"/>
+          </p:cNvSpPr>
+          <p:nvPr>
+            <p:ph type="body" idx="1"/>
+          </p:nvPr>
+        </p:nvSpPr>
+        <p:spPr/>
+        <p:txBody>
+          <a:bodyPr/>
+          <a:lstStyle/>
+          <a:p>
+            <a:r>
+              <a:rPr lang="en-US" dirty="0" smtClean="0"/>
+              <a:t>All the integration test should pass.</a:t>
+            </a:r>
+            <a:endParaRPr lang="en-US" dirty="0"/>
+          </a:p>
+        </p:txBody>
+      </p:sp>
+      <p:sp>
+        <p:nvSpPr>
+          <p:cNvPr id="4" name="Slide Number Placeholder 3"/>
+          <p:cNvSpPr>
+            <a:spLocks noGrp="1"/>
+          </p:cNvSpPr>
+          <p:nvPr>
+            <p:ph type="sldNum" sz="quarter" idx="10"/>
+          </p:nvPr>
+        </p:nvSpPr>
+        <p:spPr/>
+        <p:txBody>
+          <a:bodyPr/>
+          <a:lstStyle/>
+          <a:p>
+            <a:pPr>
+              <a:defRPr/>
+            </a:pPr>
+            <a:fld id="{DC3734AA-3150-D947-AC52-2F5DF48BFCD5}" type="slidenum">
+              <a:rPr lang="en-US" smtClean="0"/>
+              <a:pPr>
+                <a:defRPr/>
+              </a:pPr>
+              <a:t>10</a:t>
+            </a:fld>
+            <a:endParaRPr lang="en-US" dirty="0"/>
+          </a:p>
+        </p:txBody>
+      </p:sp>
+      <p:sp>
+        <p:nvSpPr>
+          <p:cNvPr id="5" name="Header Placeholder 4"/>
+          <p:cNvSpPr>
+            <a:spLocks noGrp="1"/>
+          </p:cNvSpPr>
+          <p:nvPr>
+            <p:ph type="hdr" sz="quarter" idx="11"/>
+          </p:nvPr>
+        </p:nvSpPr>
+        <p:spPr/>
+        <p:txBody>
+          <a:bodyPr/>
+          <a:lstStyle/>
+          <a:p>
+            <a:pPr>
+              <a:defRPr/>
+            </a:pPr>
+            <a:endParaRPr lang="en-US"/>
+          </a:p>
+        </p:txBody>
+      </p:sp>
+      <p:sp>
+        <p:nvSpPr>
+          <p:cNvPr id="6" name="Footer Placeholder 5"/>
+          <p:cNvSpPr>
+            <a:spLocks noGrp="1"/>
+          </p:cNvSpPr>
+          <p:nvPr>
+            <p:ph type="ftr" sz="quarter" idx="12"/>
+          </p:nvPr>
+        </p:nvSpPr>
+        <p:spPr/>
+        <p:txBody>
+          <a:bodyPr/>
+          <a:lstStyle/>
+          <a:p>
+            <a:pPr>
+              <a:defRPr/>
+            </a:pPr>
+            <a:endParaRPr lang="en-US"/>
+          </a:p>
+        </p:txBody>
+      </p:sp>
+    </p:spTree>
+    <p:extLst>
+      <p:ext uri="{BB962C8B-B14F-4D97-AF65-F5344CB8AC3E}">
+        <p14:creationId xmlns:p14="http://schemas.microsoft.com/office/powerpoint/2010/main" val="1609383880"/>
+      </p:ext>
+    </p:extLst>
+  </p:cSld>
+  <p:clrMapOvr>
+    <a:masterClrMapping/>
+  </p:clrMapOvr>
+</p:notes>
+</file>
+
 <file path=ppt/slideLayouts/slideLayout1.xml><?xml version="1.0" encoding="utf-8"?>
 <p:sldLayout xmlns:a="http://schemas.openxmlformats.org/drawingml/2006/main" xmlns:r="http://schemas.openxmlformats.org/officeDocument/2006/relationships" xmlns:p="http://schemas.openxmlformats.org/presentationml/2006/main" preserve="1" userDrawn="1">
   <p:cSld name="Title Slide">
@@ -1455,14 +6064,14 @@
           </a:ln>
           <a:extLst>
             <a:ext uri="{909E8E84-426E-40dd-AFC4-6F175D3DCCD1}">
-              <a14:hiddenFill xmlns="" xmlns:a14="http://schemas.microsoft.com/office/drawing/2010/main">
+              <a14:hiddenFill xmlns:a14="http://schemas.microsoft.com/office/drawing/2010/main" xmlns="">
                 <a:solidFill>
                   <a:srgbClr val="FFFFFF"/>
                 </a:solidFill>
               </a14:hiddenFill>
             </a:ext>
             <a:ext uri="{91240B29-F687-4f45-9708-019B960494DF}">
-              <a14:hiddenLine xmlns="" xmlns:a14="http://schemas.microsoft.com/office/drawing/2010/main" w="9525">
+              <a14:hiddenLine xmlns:a14="http://schemas.microsoft.com/office/drawing/2010/main" xmlns="" w="9525">
                 <a:solidFill>
                   <a:srgbClr val="000000"/>
                 </a:solidFill>
@@ -1610,14 +6219,14 @@
           </a:ln>
           <a:extLst>
             <a:ext uri="{909E8E84-426E-40dd-AFC4-6F175D3DCCD1}">
-              <a14:hiddenFill xmlns="" xmlns:a14="http://schemas.microsoft.com/office/drawing/2010/main">
+              <a14:hiddenFill xmlns:a14="http://schemas.microsoft.com/office/drawing/2010/main" xmlns="">
                 <a:solidFill>
                   <a:srgbClr val="FFFFFF"/>
                 </a:solidFill>
               </a14:hiddenFill>
             </a:ext>
             <a:ext uri="{91240B29-F687-4f45-9708-019B960494DF}">
-              <a14:hiddenLine xmlns="" xmlns:a14="http://schemas.microsoft.com/office/drawing/2010/main" w="9525">
+              <a14:hiddenLine xmlns:a14="http://schemas.microsoft.com/office/drawing/2010/main" xmlns="" w="9525">
                 <a:solidFill>
                   <a:srgbClr val="000000"/>
                 </a:solidFill>
@@ -2073,14 +6682,14 @@
           </a:ln>
           <a:extLst>
             <a:ext uri="{909E8E84-426E-40dd-AFC4-6F175D3DCCD1}">
-              <a14:hiddenFill xmlns="" xmlns:a14="http://schemas.microsoft.com/office/drawing/2010/main">
+              <a14:hiddenFill xmlns:a14="http://schemas.microsoft.com/office/drawing/2010/main" xmlns="">
                 <a:solidFill>
                   <a:srgbClr val="FFFFFF"/>
                 </a:solidFill>
               </a14:hiddenFill>
             </a:ext>
             <a:ext uri="{91240B29-F687-4f45-9708-019B960494DF}">
-              <a14:hiddenLine xmlns="" xmlns:a14="http://schemas.microsoft.com/office/drawing/2010/main" w="9525">
+              <a14:hiddenLine xmlns:a14="http://schemas.microsoft.com/office/drawing/2010/main" xmlns="" w="9525">
                 <a:solidFill>
                   <a:srgbClr val="000000"/>
                 </a:solidFill>
@@ -2319,14 +6928,14 @@
           </a:ln>
           <a:extLst>
             <a:ext uri="{909E8E84-426E-40dd-AFC4-6F175D3DCCD1}">
-              <a14:hiddenFill xmlns="" xmlns:a14="http://schemas.microsoft.com/office/drawing/2010/main">
+              <a14:hiddenFill xmlns:a14="http://schemas.microsoft.com/office/drawing/2010/main" xmlns="">
                 <a:solidFill>
                   <a:srgbClr val="FFFFFF"/>
                 </a:solidFill>
               </a14:hiddenFill>
             </a:ext>
             <a:ext uri="{91240B29-F687-4f45-9708-019B960494DF}">
-              <a14:hiddenLine xmlns="" xmlns:a14="http://schemas.microsoft.com/office/drawing/2010/main" w="9525">
+              <a14:hiddenLine xmlns:a14="http://schemas.microsoft.com/office/drawing/2010/main" xmlns="" w="9525">
                 <a:solidFill>
                   <a:srgbClr val="000000"/>
                 </a:solidFill>
@@ -3950,14 +8559,14 @@
           </a:ln>
           <a:extLst>
             <a:ext uri="{909E8E84-426E-40dd-AFC4-6F175D3DCCD1}">
-              <a14:hiddenFill xmlns="" xmlns:a14="http://schemas.microsoft.com/office/drawing/2010/main">
+              <a14:hiddenFill xmlns:a14="http://schemas.microsoft.com/office/drawing/2010/main" xmlns="">
                 <a:solidFill>
                   <a:srgbClr val="FFFFFF"/>
                 </a:solidFill>
               </a14:hiddenFill>
             </a:ext>
             <a:ext uri="{91240B29-F687-4f45-9708-019B960494DF}">
-              <a14:hiddenLine xmlns="" xmlns:a14="http://schemas.microsoft.com/office/drawing/2010/main" w="9525">
+              <a14:hiddenLine xmlns:a14="http://schemas.microsoft.com/office/drawing/2010/main" xmlns="" w="9525">
                 <a:solidFill>
                   <a:srgbClr val="000000"/>
                 </a:solidFill>
@@ -5311,14 +9920,14 @@
           </a:ln>
           <a:extLst>
             <a:ext uri="{909E8E84-426E-40dd-AFC4-6F175D3DCCD1}">
-              <a14:hiddenFill xmlns="" xmlns:a14="http://schemas.microsoft.com/office/drawing/2010/main">
+              <a14:hiddenFill xmlns:a14="http://schemas.microsoft.com/office/drawing/2010/main" xmlns="">
                 <a:solidFill>
                   <a:srgbClr val="FFFFFF"/>
                 </a:solidFill>
               </a14:hiddenFill>
             </a:ext>
             <a:ext uri="{91240B29-F687-4f45-9708-019B960494DF}">
-              <a14:hiddenLine xmlns="" xmlns:a14="http://schemas.microsoft.com/office/drawing/2010/main" w="9525">
+              <a14:hiddenLine xmlns:a14="http://schemas.microsoft.com/office/drawing/2010/main" xmlns="" w="9525">
                 <a:solidFill>
                   <a:srgbClr val="000000"/>
                 </a:solidFill>
@@ -5674,14 +10283,14 @@
           </a:ln>
           <a:extLst>
             <a:ext uri="{909E8E84-426E-40dd-AFC4-6F175D3DCCD1}">
-              <a14:hiddenFill xmlns="" xmlns:a14="http://schemas.microsoft.com/office/drawing/2010/main">
+              <a14:hiddenFill xmlns:a14="http://schemas.microsoft.com/office/drawing/2010/main" xmlns="">
                 <a:solidFill>
                   <a:srgbClr val="FFFFFF"/>
                 </a:solidFill>
               </a14:hiddenFill>
             </a:ext>
             <a:ext uri="{91240B29-F687-4f45-9708-019B960494DF}">
-              <a14:hiddenLine xmlns="" xmlns:a14="http://schemas.microsoft.com/office/drawing/2010/main" w="9525">
+              <a14:hiddenLine xmlns:a14="http://schemas.microsoft.com/office/drawing/2010/main" xmlns="" w="9525">
                 <a:solidFill>
                   <a:srgbClr val="000000"/>
                 </a:solidFill>
@@ -6007,14 +10616,14 @@
           </a:ln>
           <a:extLst>
             <a:ext uri="{909E8E84-426E-40dd-AFC4-6F175D3DCCD1}">
-              <a14:hiddenFill xmlns="" xmlns:a14="http://schemas.microsoft.com/office/drawing/2010/main">
+              <a14:hiddenFill xmlns:a14="http://schemas.microsoft.com/office/drawing/2010/main" xmlns="">
                 <a:solidFill>
                   <a:srgbClr val="FFFFFF"/>
                 </a:solidFill>
               </a14:hiddenFill>
             </a:ext>
             <a:ext uri="{91240B29-F687-4f45-9708-019B960494DF}">
-              <a14:hiddenLine xmlns="" xmlns:a14="http://schemas.microsoft.com/office/drawing/2010/main" w="9525">
+              <a14:hiddenLine xmlns:a14="http://schemas.microsoft.com/office/drawing/2010/main" xmlns="" w="9525">
                 <a:solidFill>
                   <a:srgbClr val="000000"/>
                 </a:solidFill>
@@ -6537,14 +11146,14 @@
           </a:ln>
           <a:extLst>
             <a:ext uri="{909E8E84-426E-40dd-AFC4-6F175D3DCCD1}">
-              <a14:hiddenFill xmlns="" xmlns:a14="http://schemas.microsoft.com/office/drawing/2010/main">
+              <a14:hiddenFill xmlns:a14="http://schemas.microsoft.com/office/drawing/2010/main" xmlns="">
                 <a:solidFill>
                   <a:srgbClr val="FFFFFF"/>
                 </a:solidFill>
               </a14:hiddenFill>
             </a:ext>
             <a:ext uri="{91240B29-F687-4f45-9708-019B960494DF}">
-              <a14:hiddenLine xmlns="" xmlns:a14="http://schemas.microsoft.com/office/drawing/2010/main" w="9525">
+              <a14:hiddenLine xmlns:a14="http://schemas.microsoft.com/office/drawing/2010/main" xmlns="" w="9525">
                 <a:solidFill>
                   <a:srgbClr val="000000"/>
                 </a:solidFill>
@@ -7076,14 +11685,14 @@
           </a:ln>
           <a:extLst>
             <a:ext uri="{909E8E84-426E-40dd-AFC4-6F175D3DCCD1}">
-              <a14:hiddenFill xmlns="" xmlns:a14="http://schemas.microsoft.com/office/drawing/2010/main">
+              <a14:hiddenFill xmlns:a14="http://schemas.microsoft.com/office/drawing/2010/main" xmlns="">
                 <a:solidFill>
                   <a:srgbClr val="FFFFFF"/>
                 </a:solidFill>
               </a14:hiddenFill>
             </a:ext>
             <a:ext uri="{91240B29-F687-4f45-9708-019B960494DF}">
-              <a14:hiddenLine xmlns="" xmlns:a14="http://schemas.microsoft.com/office/drawing/2010/main" w="9525">
+              <a14:hiddenLine xmlns:a14="http://schemas.microsoft.com/office/drawing/2010/main" xmlns="" w="9525">
                 <a:solidFill>
                   <a:srgbClr val="000000"/>
                 </a:solidFill>
@@ -8023,14 +12632,14 @@
           </a:ln>
           <a:extLst>
             <a:ext uri="{909E8E84-426E-40dd-AFC4-6F175D3DCCD1}">
-              <a14:hiddenFill xmlns="" xmlns:a14="http://schemas.microsoft.com/office/drawing/2010/main">
+              <a14:hiddenFill xmlns:a14="http://schemas.microsoft.com/office/drawing/2010/main" xmlns="">
                 <a:solidFill>
                   <a:srgbClr val="FFFFFF"/>
                 </a:solidFill>
               </a14:hiddenFill>
             </a:ext>
             <a:ext uri="{91240B29-F687-4f45-9708-019B960494DF}">
-              <a14:hiddenLine xmlns="" xmlns:a14="http://schemas.microsoft.com/office/drawing/2010/main" w="9525">
+              <a14:hiddenLine xmlns:a14="http://schemas.microsoft.com/office/drawing/2010/main" xmlns="" w="9525">
                 <a:solidFill>
                   <a:srgbClr val="000000"/>
                 </a:solidFill>
@@ -8804,14 +13413,14 @@
           </a:ln>
           <a:extLst>
             <a:ext uri="{909E8E84-426E-40dd-AFC4-6F175D3DCCD1}">
-              <a14:hiddenFill xmlns="" xmlns:a14="http://schemas.microsoft.com/office/drawing/2010/main">
+              <a14:hiddenFill xmlns:a14="http://schemas.microsoft.com/office/drawing/2010/main" xmlns="">
                 <a:solidFill>
                   <a:srgbClr val="FFFFFF"/>
                 </a:solidFill>
               </a14:hiddenFill>
             </a:ext>
             <a:ext uri="{91240B29-F687-4f45-9708-019B960494DF}">
-              <a14:hiddenLine xmlns="" xmlns:a14="http://schemas.microsoft.com/office/drawing/2010/main" w="9525">
+              <a14:hiddenLine xmlns:a14="http://schemas.microsoft.com/office/drawing/2010/main" xmlns="" w="9525">
                 <a:solidFill>
                   <a:srgbClr val="000000"/>
                 </a:solidFill>
@@ -11857,13 +16466,16 @@
             </a:pPr>
             <a:r>
               <a:rPr lang="en-US" dirty="0" smtClean="0"/>
-              <a:t>Define a custom resource's </a:t>
-            </a:r>
-            <a:r>
-              <a:rPr lang="en-US" dirty="0" err="1" smtClean="0"/>
-              <a:t>name_attribute</a:t>
-            </a:r>
-            <a:endParaRPr lang="en-US" dirty="0" smtClean="0"/>
+              <a:t>Set a </a:t>
+            </a:r>
+            <a:r>
+              <a:rPr lang="en-US" dirty="0" smtClean="0"/>
+              <a:t>custom resource's </a:t>
+            </a:r>
+            <a:r>
+              <a:rPr lang="en-US" dirty="0" smtClean="0"/>
+              <a:t>name to a property</a:t>
+            </a:r>
           </a:p>
           <a:p>
             <a:pPr marL="457200" indent="-457200">
@@ -11872,9 +16484,19 @@
             </a:pPr>
             <a:r>
               <a:rPr lang="en-US" dirty="0" smtClean="0"/>
+              <a:t>Set a default value for a custom resource property</a:t>
+            </a:r>
+            <a:endParaRPr lang="en-US" dirty="0" smtClean="0"/>
+          </a:p>
+          <a:p>
+            <a:pPr marL="457200" indent="-457200">
+              <a:buFont typeface="Wingdings" charset="2"/>
+              <a:buChar char="Ø"/>
+            </a:pPr>
+            <a:r>
+              <a:rPr lang="en-US" dirty="0" smtClean="0"/>
               <a:t>Define notifications correctly when creating custom resources</a:t>
             </a:r>
-            <a:endParaRPr lang="en-US" dirty="0" smtClean="0"/>
           </a:p>
         </p:txBody>
       </p:sp>
@@ -12282,7 +16904,15 @@
             </a:r>
             <a:r>
               <a:rPr lang="en-US" dirty="0" smtClean="0"/>
-              <a:t> 'admins' do</a:t>
+              <a:t> </a:t>
+            </a:r>
+            <a:r>
+              <a:rPr lang="en-US" dirty="0" smtClean="0"/>
+              <a:t>'users' </a:t>
+            </a:r>
+            <a:r>
+              <a:rPr lang="en-US" dirty="0" smtClean="0"/>
+              <a:t>do</a:t>
             </a:r>
           </a:p>
           <a:p>
@@ -12301,24 +16931,6 @@
             <a:r>
               <a:rPr lang="en-US" dirty="0"/>
               <a:t>80</a:t>
-            </a:r>
-          </a:p>
-          <a:p>
-            <a:r>
-              <a:rPr lang="en-US" dirty="0"/>
-              <a:t>  </a:t>
-            </a:r>
-            <a:r>
-              <a:rPr lang="en-US" dirty="0" err="1"/>
-              <a:t>site_name</a:t>
-            </a:r>
-            <a:r>
-              <a:rPr lang="en-US" dirty="0"/>
-              <a:t> 'users</a:t>
-            </a:r>
-            <a:r>
-              <a:rPr lang="en-US" dirty="0" smtClean="0"/>
-              <a:t>'</a:t>
             </a:r>
           </a:p>
           <a:p>
@@ -13141,7 +17753,11 @@
           <a:p>
             <a:r>
               <a:rPr lang="en-US" dirty="0" smtClean="0"/>
-              <a:t>Defining a notification in a resource within a custom resource creates a fragile relationship. One that we want to address.</a:t>
+              <a:t>Defining a notification in a resource within a custom resource creates a fragile relationship. One that we want to </a:t>
+            </a:r>
+            <a:r>
+              <a:rPr lang="en-US" dirty="0" smtClean="0"/>
+              <a:t>address by removing any notifications to outside resources.</a:t>
             </a:r>
             <a:endParaRPr lang="en-US" dirty="0"/>
           </a:p>

</xml_diff>

<commit_message>
Updates the ChefSpec and Test Kitchen output
* Test Kitchen output shows more InSpec
* ChefSpec updated to new times for completion
</commit_message>
<xml_diff>
--- a/04-refactoring_custom_resources.pptx
+++ b/04-refactoring_custom_resources.pptx
@@ -306,7 +306,7 @@
               <a:pPr>
                 <a:defRPr/>
               </a:pPr>
-              <a:t>2016-09-18</a:t>
+              <a:t>2016-09-19</a:t>
             </a:fld>
             <a:endParaRPr lang="en-US" dirty="0"/>
           </a:p>
@@ -489,7 +489,7 @@
               <a:pPr>
                 <a:defRPr/>
               </a:pPr>
-              <a:t>2016-09-18</a:t>
+              <a:t>2016-09-19</a:t>
             </a:fld>
             <a:endParaRPr lang="en-US" dirty="0"/>
           </a:p>
@@ -4104,7 +4104,6 @@
               <a:rPr lang="en-US" dirty="0" smtClean="0"/>
               <a:t>All the integration test should pass.</a:t>
             </a:r>
-            <a:endParaRPr lang="en-US" dirty="0" smtClean="0"/>
           </a:p>
         </p:txBody>
       </p:sp>
@@ -6064,14 +6063,14 @@
           </a:ln>
           <a:extLst>
             <a:ext uri="{909E8E84-426E-40dd-AFC4-6F175D3DCCD1}">
-              <a14:hiddenFill xmlns:a14="http://schemas.microsoft.com/office/drawing/2010/main" xmlns="">
+              <a14:hiddenFill xmlns="" xmlns:a14="http://schemas.microsoft.com/office/drawing/2010/main">
                 <a:solidFill>
                   <a:srgbClr val="FFFFFF"/>
                 </a:solidFill>
               </a14:hiddenFill>
             </a:ext>
             <a:ext uri="{91240B29-F687-4f45-9708-019B960494DF}">
-              <a14:hiddenLine xmlns:a14="http://schemas.microsoft.com/office/drawing/2010/main" xmlns="" w="9525">
+              <a14:hiddenLine xmlns="" xmlns:a14="http://schemas.microsoft.com/office/drawing/2010/main" w="9525">
                 <a:solidFill>
                   <a:srgbClr val="000000"/>
                 </a:solidFill>
@@ -6219,14 +6218,14 @@
           </a:ln>
           <a:extLst>
             <a:ext uri="{909E8E84-426E-40dd-AFC4-6F175D3DCCD1}">
-              <a14:hiddenFill xmlns:a14="http://schemas.microsoft.com/office/drawing/2010/main" xmlns="">
+              <a14:hiddenFill xmlns="" xmlns:a14="http://schemas.microsoft.com/office/drawing/2010/main">
                 <a:solidFill>
                   <a:srgbClr val="FFFFFF"/>
                 </a:solidFill>
               </a14:hiddenFill>
             </a:ext>
             <a:ext uri="{91240B29-F687-4f45-9708-019B960494DF}">
-              <a14:hiddenLine xmlns:a14="http://schemas.microsoft.com/office/drawing/2010/main" xmlns="" w="9525">
+              <a14:hiddenLine xmlns="" xmlns:a14="http://schemas.microsoft.com/office/drawing/2010/main" w="9525">
                 <a:solidFill>
                   <a:srgbClr val="000000"/>
                 </a:solidFill>
@@ -6682,14 +6681,14 @@
           </a:ln>
           <a:extLst>
             <a:ext uri="{909E8E84-426E-40dd-AFC4-6F175D3DCCD1}">
-              <a14:hiddenFill xmlns:a14="http://schemas.microsoft.com/office/drawing/2010/main" xmlns="">
+              <a14:hiddenFill xmlns="" xmlns:a14="http://schemas.microsoft.com/office/drawing/2010/main">
                 <a:solidFill>
                   <a:srgbClr val="FFFFFF"/>
                 </a:solidFill>
               </a14:hiddenFill>
             </a:ext>
             <a:ext uri="{91240B29-F687-4f45-9708-019B960494DF}">
-              <a14:hiddenLine xmlns:a14="http://schemas.microsoft.com/office/drawing/2010/main" xmlns="" w="9525">
+              <a14:hiddenLine xmlns="" xmlns:a14="http://schemas.microsoft.com/office/drawing/2010/main" w="9525">
                 <a:solidFill>
                   <a:srgbClr val="000000"/>
                 </a:solidFill>
@@ -6928,14 +6927,14 @@
           </a:ln>
           <a:extLst>
             <a:ext uri="{909E8E84-426E-40dd-AFC4-6F175D3DCCD1}">
-              <a14:hiddenFill xmlns:a14="http://schemas.microsoft.com/office/drawing/2010/main" xmlns="">
+              <a14:hiddenFill xmlns="" xmlns:a14="http://schemas.microsoft.com/office/drawing/2010/main">
                 <a:solidFill>
                   <a:srgbClr val="FFFFFF"/>
                 </a:solidFill>
               </a14:hiddenFill>
             </a:ext>
             <a:ext uri="{91240B29-F687-4f45-9708-019B960494DF}">
-              <a14:hiddenLine xmlns:a14="http://schemas.microsoft.com/office/drawing/2010/main" xmlns="" w="9525">
+              <a14:hiddenLine xmlns="" xmlns:a14="http://schemas.microsoft.com/office/drawing/2010/main" w="9525">
                 <a:solidFill>
                   <a:srgbClr val="000000"/>
                 </a:solidFill>
@@ -8559,14 +8558,14 @@
           </a:ln>
           <a:extLst>
             <a:ext uri="{909E8E84-426E-40dd-AFC4-6F175D3DCCD1}">
-              <a14:hiddenFill xmlns:a14="http://schemas.microsoft.com/office/drawing/2010/main" xmlns="">
+              <a14:hiddenFill xmlns="" xmlns:a14="http://schemas.microsoft.com/office/drawing/2010/main">
                 <a:solidFill>
                   <a:srgbClr val="FFFFFF"/>
                 </a:solidFill>
               </a14:hiddenFill>
             </a:ext>
             <a:ext uri="{91240B29-F687-4f45-9708-019B960494DF}">
-              <a14:hiddenLine xmlns:a14="http://schemas.microsoft.com/office/drawing/2010/main" xmlns="" w="9525">
+              <a14:hiddenLine xmlns="" xmlns:a14="http://schemas.microsoft.com/office/drawing/2010/main" w="9525">
                 <a:solidFill>
                   <a:srgbClr val="000000"/>
                 </a:solidFill>
@@ -9920,14 +9919,14 @@
           </a:ln>
           <a:extLst>
             <a:ext uri="{909E8E84-426E-40dd-AFC4-6F175D3DCCD1}">
-              <a14:hiddenFill xmlns:a14="http://schemas.microsoft.com/office/drawing/2010/main" xmlns="">
+              <a14:hiddenFill xmlns="" xmlns:a14="http://schemas.microsoft.com/office/drawing/2010/main">
                 <a:solidFill>
                   <a:srgbClr val="FFFFFF"/>
                 </a:solidFill>
               </a14:hiddenFill>
             </a:ext>
             <a:ext uri="{91240B29-F687-4f45-9708-019B960494DF}">
-              <a14:hiddenLine xmlns:a14="http://schemas.microsoft.com/office/drawing/2010/main" xmlns="" w="9525">
+              <a14:hiddenLine xmlns="" xmlns:a14="http://schemas.microsoft.com/office/drawing/2010/main" w="9525">
                 <a:solidFill>
                   <a:srgbClr val="000000"/>
                 </a:solidFill>
@@ -10283,14 +10282,14 @@
           </a:ln>
           <a:extLst>
             <a:ext uri="{909E8E84-426E-40dd-AFC4-6F175D3DCCD1}">
-              <a14:hiddenFill xmlns:a14="http://schemas.microsoft.com/office/drawing/2010/main" xmlns="">
+              <a14:hiddenFill xmlns="" xmlns:a14="http://schemas.microsoft.com/office/drawing/2010/main">
                 <a:solidFill>
                   <a:srgbClr val="FFFFFF"/>
                 </a:solidFill>
               </a14:hiddenFill>
             </a:ext>
             <a:ext uri="{91240B29-F687-4f45-9708-019B960494DF}">
-              <a14:hiddenLine xmlns:a14="http://schemas.microsoft.com/office/drawing/2010/main" xmlns="" w="9525">
+              <a14:hiddenLine xmlns="" xmlns:a14="http://schemas.microsoft.com/office/drawing/2010/main" w="9525">
                 <a:solidFill>
                   <a:srgbClr val="000000"/>
                 </a:solidFill>
@@ -10616,14 +10615,14 @@
           </a:ln>
           <a:extLst>
             <a:ext uri="{909E8E84-426E-40dd-AFC4-6F175D3DCCD1}">
-              <a14:hiddenFill xmlns:a14="http://schemas.microsoft.com/office/drawing/2010/main" xmlns="">
+              <a14:hiddenFill xmlns="" xmlns:a14="http://schemas.microsoft.com/office/drawing/2010/main">
                 <a:solidFill>
                   <a:srgbClr val="FFFFFF"/>
                 </a:solidFill>
               </a14:hiddenFill>
             </a:ext>
             <a:ext uri="{91240B29-F687-4f45-9708-019B960494DF}">
-              <a14:hiddenLine xmlns:a14="http://schemas.microsoft.com/office/drawing/2010/main" xmlns="" w="9525">
+              <a14:hiddenLine xmlns="" xmlns:a14="http://schemas.microsoft.com/office/drawing/2010/main" w="9525">
                 <a:solidFill>
                   <a:srgbClr val="000000"/>
                 </a:solidFill>
@@ -11146,14 +11145,14 @@
           </a:ln>
           <a:extLst>
             <a:ext uri="{909E8E84-426E-40dd-AFC4-6F175D3DCCD1}">
-              <a14:hiddenFill xmlns:a14="http://schemas.microsoft.com/office/drawing/2010/main" xmlns="">
+              <a14:hiddenFill xmlns="" xmlns:a14="http://schemas.microsoft.com/office/drawing/2010/main">
                 <a:solidFill>
                   <a:srgbClr val="FFFFFF"/>
                 </a:solidFill>
               </a14:hiddenFill>
             </a:ext>
             <a:ext uri="{91240B29-F687-4f45-9708-019B960494DF}">
-              <a14:hiddenLine xmlns:a14="http://schemas.microsoft.com/office/drawing/2010/main" xmlns="" w="9525">
+              <a14:hiddenLine xmlns="" xmlns:a14="http://schemas.microsoft.com/office/drawing/2010/main" w="9525">
                 <a:solidFill>
                   <a:srgbClr val="000000"/>
                 </a:solidFill>
@@ -11685,14 +11684,14 @@
           </a:ln>
           <a:extLst>
             <a:ext uri="{909E8E84-426E-40dd-AFC4-6F175D3DCCD1}">
-              <a14:hiddenFill xmlns:a14="http://schemas.microsoft.com/office/drawing/2010/main" xmlns="">
+              <a14:hiddenFill xmlns="" xmlns:a14="http://schemas.microsoft.com/office/drawing/2010/main">
                 <a:solidFill>
                   <a:srgbClr val="FFFFFF"/>
                 </a:solidFill>
               </a14:hiddenFill>
             </a:ext>
             <a:ext uri="{91240B29-F687-4f45-9708-019B960494DF}">
-              <a14:hiddenLine xmlns:a14="http://schemas.microsoft.com/office/drawing/2010/main" xmlns="" w="9525">
+              <a14:hiddenLine xmlns="" xmlns:a14="http://schemas.microsoft.com/office/drawing/2010/main" w="9525">
                 <a:solidFill>
                   <a:srgbClr val="000000"/>
                 </a:solidFill>
@@ -12632,14 +12631,14 @@
           </a:ln>
           <a:extLst>
             <a:ext uri="{909E8E84-426E-40dd-AFC4-6F175D3DCCD1}">
-              <a14:hiddenFill xmlns:a14="http://schemas.microsoft.com/office/drawing/2010/main" xmlns="">
+              <a14:hiddenFill xmlns="" xmlns:a14="http://schemas.microsoft.com/office/drawing/2010/main">
                 <a:solidFill>
                   <a:srgbClr val="FFFFFF"/>
                 </a:solidFill>
               </a14:hiddenFill>
             </a:ext>
             <a:ext uri="{91240B29-F687-4f45-9708-019B960494DF}">
-              <a14:hiddenLine xmlns:a14="http://schemas.microsoft.com/office/drawing/2010/main" xmlns="" w="9525">
+              <a14:hiddenLine xmlns="" xmlns:a14="http://schemas.microsoft.com/office/drawing/2010/main" w="9525">
                 <a:solidFill>
                   <a:srgbClr val="000000"/>
                 </a:solidFill>
@@ -13413,14 +13412,14 @@
           </a:ln>
           <a:extLst>
             <a:ext uri="{909E8E84-426E-40dd-AFC4-6F175D3DCCD1}">
-              <a14:hiddenFill xmlns:a14="http://schemas.microsoft.com/office/drawing/2010/main" xmlns="">
+              <a14:hiddenFill xmlns="" xmlns:a14="http://schemas.microsoft.com/office/drawing/2010/main">
                 <a:solidFill>
                   <a:srgbClr val="FFFFFF"/>
                 </a:solidFill>
               </a14:hiddenFill>
             </a:ext>
             <a:ext uri="{91240B29-F687-4f45-9708-019B960494DF}">
-              <a14:hiddenLine xmlns:a14="http://schemas.microsoft.com/office/drawing/2010/main" xmlns="" w="9525">
+              <a14:hiddenLine xmlns="" xmlns:a14="http://schemas.microsoft.com/office/drawing/2010/main" w="9525">
                 <a:solidFill>
                   <a:srgbClr val="000000"/>
                 </a:solidFill>
@@ -14284,7 +14283,7 @@
             </a:pPr>
             <a:r>
               <a:rPr lang="en-US" sz="2000" dirty="0"/>
-              <a:t>Synchronizing Cookbooks:</a:t>
+              <a:t>-----&gt; Verifying &lt;default-centos-67&gt;...</a:t>
             </a:r>
           </a:p>
           <a:p>
@@ -14294,267 +14293,25 @@
               </a:lnSpc>
             </a:pPr>
             <a:r>
-              <a:rPr lang="it-IT" sz="2000" dirty="0"/>
-              <a:t> - apache (0.1.0)</a:t>
-            </a:r>
-          </a:p>
-          <a:p>
-            <a:pPr>
-              <a:lnSpc>
-                <a:spcPct val="80000"/>
-              </a:lnSpc>
-            </a:pPr>
-            <a:r>
-              <a:rPr lang="it-IT" sz="2000" dirty="0" err="1"/>
-              <a:t>Installing</a:t>
-            </a:r>
-            <a:r>
-              <a:rPr lang="it-IT" sz="2000" dirty="0"/>
-              <a:t> </a:t>
-            </a:r>
-            <a:r>
-              <a:rPr lang="it-IT" sz="2000" dirty="0" err="1"/>
-              <a:t>Cookbook</a:t>
-            </a:r>
-            <a:r>
-              <a:rPr lang="it-IT" sz="2000" dirty="0"/>
-              <a:t> </a:t>
-            </a:r>
-            <a:r>
-              <a:rPr lang="it-IT" sz="2000" dirty="0" err="1"/>
-              <a:t>Gems</a:t>
-            </a:r>
-            <a:r>
-              <a:rPr lang="it-IT" sz="2000" dirty="0"/>
-              <a:t>:</a:t>
-            </a:r>
-          </a:p>
-          <a:p>
-            <a:pPr>
-              <a:lnSpc>
-                <a:spcPct val="80000"/>
-              </a:lnSpc>
-            </a:pPr>
-            <a:r>
-              <a:rPr lang="it-IT" sz="2000" dirty="0" err="1"/>
-              <a:t>Compiling</a:t>
-            </a:r>
-            <a:r>
-              <a:rPr lang="it-IT" sz="2000" dirty="0"/>
-              <a:t> </a:t>
-            </a:r>
-            <a:r>
-              <a:rPr lang="it-IT" sz="2000" dirty="0" err="1"/>
-              <a:t>Cookbooks</a:t>
-            </a:r>
-            <a:r>
-              <a:rPr lang="it-IT" sz="2000" dirty="0"/>
-              <a:t>...</a:t>
-            </a:r>
-          </a:p>
-          <a:p>
-            <a:pPr>
-              <a:lnSpc>
-                <a:spcPct val="80000"/>
-              </a:lnSpc>
-            </a:pPr>
-            <a:r>
-              <a:rPr lang="it-IT" sz="2000" dirty="0" err="1"/>
-              <a:t>Converging</a:t>
-            </a:r>
-            <a:r>
-              <a:rPr lang="it-IT" sz="2000" dirty="0"/>
-              <a:t> 5 </a:t>
-            </a:r>
-            <a:r>
-              <a:rPr lang="it-IT" sz="2000" dirty="0" err="1"/>
-              <a:t>resources</a:t>
-            </a:r>
-            <a:endParaRPr lang="it-IT" sz="2000" dirty="0"/>
-          </a:p>
-          <a:p>
-            <a:pPr>
-              <a:lnSpc>
-                <a:spcPct val="80000"/>
-              </a:lnSpc>
-            </a:pPr>
-            <a:r>
-              <a:rPr lang="it-IT" sz="2000" dirty="0" err="1"/>
-              <a:t>Recipe</a:t>
-            </a:r>
-            <a:r>
-              <a:rPr lang="it-IT" sz="2000" dirty="0"/>
-              <a:t>: apache::default</a:t>
-            </a:r>
-          </a:p>
-          <a:p>
-            <a:pPr>
-              <a:lnSpc>
-                <a:spcPct val="80000"/>
-              </a:lnSpc>
-            </a:pPr>
-            <a:r>
-              <a:rPr lang="it-IT" sz="2000" dirty="0"/>
-              <a:t> * </a:t>
-            </a:r>
-            <a:r>
-              <a:rPr lang="it-IT" sz="2000" dirty="0" err="1"/>
-              <a:t>yum_package</a:t>
-            </a:r>
-            <a:r>
-              <a:rPr lang="it-IT" sz="2000" dirty="0"/>
-              <a:t>[</a:t>
-            </a:r>
-            <a:r>
-              <a:rPr lang="it-IT" sz="2000" dirty="0" err="1"/>
+              <a:rPr lang="en-US" sz="2000" dirty="0"/>
+              <a:t>       Use `/Users/</a:t>
+            </a:r>
+            <a:r>
+              <a:rPr lang="en-US" sz="2000" dirty="0" err="1"/>
+              <a:t>franklinwebber</a:t>
+            </a:r>
+            <a:r>
+              <a:rPr lang="en-US" sz="2000" dirty="0"/>
+              <a:t>/scratch/</a:t>
+            </a:r>
+            <a:r>
+              <a:rPr lang="en-US" sz="2000" dirty="0" err="1"/>
               <a:t>httpd</a:t>
             </a:r>
             <a:r>
-              <a:rPr lang="it-IT" sz="2000" dirty="0"/>
-              <a:t>] </a:t>
-            </a:r>
-            <a:r>
-              <a:rPr lang="it-IT" sz="2000" dirty="0" err="1"/>
-              <a:t>action</a:t>
-            </a:r>
-            <a:r>
-              <a:rPr lang="it-IT" sz="2000" dirty="0"/>
-              <a:t> </a:t>
-            </a:r>
-            <a:r>
-              <a:rPr lang="it-IT" sz="2000" dirty="0" err="1"/>
-              <a:t>install</a:t>
-            </a:r>
-            <a:r>
-              <a:rPr lang="it-IT" sz="2000" dirty="0"/>
-              <a:t> (up to date)</a:t>
-            </a:r>
-          </a:p>
-          <a:p>
-            <a:pPr>
-              <a:lnSpc>
-                <a:spcPct val="80000"/>
-              </a:lnSpc>
-            </a:pPr>
-            <a:r>
-              <a:rPr lang="it-IT" sz="2000" dirty="0"/>
-              <a:t> * </a:t>
-            </a:r>
-            <a:r>
-              <a:rPr lang="it-IT" sz="2000" dirty="0" err="1"/>
-              <a:t>apache_vhost</a:t>
-            </a:r>
-            <a:r>
-              <a:rPr lang="it-IT" sz="2000" dirty="0"/>
-              <a:t>[welcome] </a:t>
-            </a:r>
-            <a:r>
-              <a:rPr lang="it-IT" sz="2000" dirty="0" err="1"/>
-              <a:t>action</a:t>
-            </a:r>
-            <a:r>
-              <a:rPr lang="it-IT" sz="2000" dirty="0"/>
-              <a:t> </a:t>
-            </a:r>
-            <a:r>
-              <a:rPr lang="it-IT" sz="2000" dirty="0" err="1"/>
-              <a:t>remove</a:t>
-            </a:r>
-            <a:endParaRPr lang="it-IT" sz="2000" dirty="0"/>
-          </a:p>
-          <a:p>
-            <a:pPr>
-              <a:lnSpc>
-                <a:spcPct val="80000"/>
-              </a:lnSpc>
-            </a:pPr>
-            <a:r>
-              <a:rPr lang="it-IT" sz="2000" dirty="0"/>
-              <a:t> (up to date)</a:t>
-            </a:r>
-          </a:p>
-          <a:p>
-            <a:pPr>
-              <a:lnSpc>
-                <a:spcPct val="80000"/>
-              </a:lnSpc>
-            </a:pPr>
-            <a:r>
-              <a:rPr lang="it-IT" sz="2000" dirty="0"/>
-              <a:t> (up to date)</a:t>
-            </a:r>
-            <a:endParaRPr lang="en-US" sz="2000" dirty="0"/>
-          </a:p>
-          <a:p>
-            <a:pPr>
-              <a:lnSpc>
-                <a:spcPct val="80000"/>
-              </a:lnSpc>
-            </a:pPr>
-            <a:r>
-              <a:rPr lang="it-IT" sz="2000" dirty="0"/>
-              <a:t>     (up to date)</a:t>
-            </a:r>
-          </a:p>
-          <a:p>
-            <a:pPr>
-              <a:lnSpc>
-                <a:spcPct val="80000"/>
-              </a:lnSpc>
-            </a:pPr>
-            <a:endParaRPr lang="it-IT" sz="2000" dirty="0"/>
-          </a:p>
-          <a:p>
-            <a:pPr>
-              <a:lnSpc>
-                <a:spcPct val="80000"/>
-              </a:lnSpc>
-            </a:pPr>
-            <a:r>
-              <a:rPr lang="it-IT" sz="2000" dirty="0"/>
-              <a:t> (up to date)</a:t>
-            </a:r>
-            <a:endParaRPr lang="en-US" sz="2000" dirty="0"/>
-          </a:p>
-          <a:p>
-            <a:pPr>
-              <a:lnSpc>
-                <a:spcPct val="80000"/>
-              </a:lnSpc>
-            </a:pPr>
-            <a:r>
-              <a:rPr lang="it-IT" sz="2000" dirty="0"/>
-              <a:t> (up to date)</a:t>
-            </a:r>
-            <a:endParaRPr lang="en-US" sz="2000" dirty="0"/>
-          </a:p>
-          <a:p>
-            <a:pPr>
-              <a:lnSpc>
-                <a:spcPct val="80000"/>
-              </a:lnSpc>
-            </a:pPr>
-            <a:r>
-              <a:rPr lang="it-IT" sz="2000" dirty="0"/>
-              <a:t> (up to date)</a:t>
-            </a:r>
-            <a:endParaRPr lang="en-US" sz="2000" dirty="0"/>
-          </a:p>
-          <a:p>
-            <a:pPr>
-              <a:lnSpc>
-                <a:spcPct val="80000"/>
-              </a:lnSpc>
-            </a:pPr>
-            <a:r>
               <a:rPr lang="en-US" sz="2000" dirty="0"/>
-              <a:t>    </a:t>
-            </a:r>
-            <a:r>
-              <a:rPr lang="it-IT" sz="2000" dirty="0"/>
-              <a:t> (up to date)</a:t>
-            </a:r>
-            <a:endParaRPr lang="en-US" sz="2000" dirty="0"/>
+              <a:t>/test/recipes/default` for testing</a:t>
+            </a:r>
           </a:p>
           <a:p>
             <a:pPr>
@@ -14565,6 +14322,118 @@
             <a:endParaRPr lang="en-US" sz="2000" dirty="0"/>
           </a:p>
           <a:p>
+            <a:pPr>
+              <a:lnSpc>
+                <a:spcPct val="80000"/>
+              </a:lnSpc>
+            </a:pPr>
+            <a:r>
+              <a:rPr lang="en-US" sz="2000" dirty="0"/>
+              <a:t>Target:  </a:t>
+            </a:r>
+            <a:r>
+              <a:rPr lang="en-US" sz="2000" dirty="0" err="1"/>
+              <a:t>ssh</a:t>
+            </a:r>
+            <a:r>
+              <a:rPr lang="en-US" sz="2000" dirty="0"/>
+              <a:t>://vagrant@127.0.0.1:2222</a:t>
+            </a:r>
+          </a:p>
+          <a:p>
+            <a:pPr>
+              <a:lnSpc>
+                <a:spcPct val="80000"/>
+              </a:lnSpc>
+            </a:pPr>
+            <a:endParaRPr lang="en-US" sz="2000" dirty="0"/>
+          </a:p>
+          <a:p>
+            <a:pPr>
+              <a:lnSpc>
+                <a:spcPct val="80000"/>
+              </a:lnSpc>
+            </a:pPr>
+            <a:r>
+              <a:rPr lang="en-US" sz="2000" dirty="0"/>
+              <a:t>  ✔  Command curl http://</a:t>
+            </a:r>
+            <a:r>
+              <a:rPr lang="en-US" sz="2000" dirty="0" err="1"/>
+              <a:t>localhost</a:t>
+            </a:r>
+            <a:r>
+              <a:rPr lang="en-US" sz="2000" dirty="0"/>
+              <a:t> </a:t>
+            </a:r>
+            <a:r>
+              <a:rPr lang="en-US" sz="2000" dirty="0" err="1"/>
+              <a:t>stdout</a:t>
+            </a:r>
+            <a:r>
+              <a:rPr lang="en-US" sz="2000" dirty="0"/>
+              <a:t> should match /Welcome home/</a:t>
+            </a:r>
+          </a:p>
+          <a:p>
+            <a:pPr>
+              <a:lnSpc>
+                <a:spcPct val="80000"/>
+              </a:lnSpc>
+            </a:pPr>
+            <a:r>
+              <a:rPr lang="en-US" sz="2000" dirty="0"/>
+              <a:t>  ✔  Command curl http://localhost:8080 </a:t>
+            </a:r>
+            <a:r>
+              <a:rPr lang="en-US" sz="2000" dirty="0" err="1"/>
+              <a:t>stdout</a:t>
+            </a:r>
+            <a:r>
+              <a:rPr lang="en-US" sz="2000" dirty="0"/>
+              <a:t> should match /Welcome admins/</a:t>
+            </a:r>
+          </a:p>
+          <a:p>
+            <a:pPr>
+              <a:lnSpc>
+                <a:spcPct val="80000"/>
+              </a:lnSpc>
+            </a:pPr>
+            <a:endParaRPr lang="en-US" sz="2000" dirty="0"/>
+          </a:p>
+          <a:p>
+            <a:pPr>
+              <a:lnSpc>
+                <a:spcPct val="80000"/>
+              </a:lnSpc>
+            </a:pPr>
+            <a:r>
+              <a:rPr lang="en-US" sz="2000" dirty="0"/>
+              <a:t>Summary: 2 successful, 0 failures, 0 skipped</a:t>
+            </a:r>
+          </a:p>
+          <a:p>
+            <a:pPr>
+              <a:lnSpc>
+                <a:spcPct val="80000"/>
+              </a:lnSpc>
+            </a:pPr>
+            <a:r>
+              <a:rPr lang="en-US" sz="2000" dirty="0"/>
+              <a:t>       Finished verifying &lt;default-centos-67&gt; (0m0.77s).</a:t>
+            </a:r>
+          </a:p>
+          <a:p>
+            <a:pPr>
+              <a:lnSpc>
+                <a:spcPct val="80000"/>
+              </a:lnSpc>
+            </a:pPr>
+            <a:r>
+              <a:rPr lang="en-US" sz="2000" dirty="0"/>
+              <a:t>-----&gt; Kitchen is finished. (2m42.37s)</a:t>
+            </a:r>
             <a:endParaRPr lang="en-US" sz="2000" dirty="0"/>
           </a:p>
         </p:txBody>
@@ -15669,7 +15538,7 @@
           <a:lstStyle/>
           <a:p>
             <a:r>
-              <a:rPr lang="en-US" dirty="0" smtClean="0"/>
+              <a:rPr lang="en-US" dirty="0"/>
               <a:t>..........</a:t>
             </a:r>
           </a:p>
@@ -15679,28 +15548,14 @@
           <a:p>
             <a:r>
               <a:rPr lang="en-US" dirty="0"/>
-              <a:t>Finished in 2.8 seconds (files took 4.67 seconds to load</a:t>
-            </a:r>
-            <a:r>
-              <a:rPr lang="en-US" dirty="0" smtClean="0"/>
-              <a:t>)</a:t>
-            </a:r>
-          </a:p>
-          <a:p>
-            <a:r>
-              <a:rPr lang="en-US" dirty="0" smtClean="0"/>
-              <a:t>10 </a:t>
-            </a:r>
+              <a:t>Finished in 1.22 seconds (files took 2.56 seconds to load)</a:t>
+            </a:r>
+          </a:p>
+          <a:p>
             <a:r>
               <a:rPr lang="en-US" dirty="0"/>
-              <a:t>examples, 0 failures</a:t>
-            </a:r>
-            <a:endParaRPr lang="en-US" dirty="0" smtClean="0"/>
-          </a:p>
-          <a:p>
-            <a:endParaRPr lang="en-US" dirty="0"/>
-          </a:p>
-          <a:p>
+              <a:t>10 examples, 0 failures</a:t>
+            </a:r>
             <a:endParaRPr lang="en-US" dirty="0"/>
           </a:p>
         </p:txBody>
@@ -15810,7 +15665,7 @@
             </a:pPr>
             <a:r>
               <a:rPr lang="en-US" sz="2000" dirty="0"/>
-              <a:t>Synchronizing Cookbooks:</a:t>
+              <a:t>-----&gt; Verifying &lt;default-centos-67&gt;...</a:t>
             </a:r>
           </a:p>
           <a:p>
@@ -15820,267 +15675,25 @@
               </a:lnSpc>
             </a:pPr>
             <a:r>
-              <a:rPr lang="it-IT" sz="2000" dirty="0"/>
-              <a:t> - apache (0.1.0)</a:t>
-            </a:r>
-          </a:p>
-          <a:p>
-            <a:pPr>
-              <a:lnSpc>
-                <a:spcPct val="80000"/>
-              </a:lnSpc>
-            </a:pPr>
-            <a:r>
-              <a:rPr lang="it-IT" sz="2000" dirty="0" err="1"/>
-              <a:t>Installing</a:t>
-            </a:r>
-            <a:r>
-              <a:rPr lang="it-IT" sz="2000" dirty="0"/>
-              <a:t> </a:t>
-            </a:r>
-            <a:r>
-              <a:rPr lang="it-IT" sz="2000" dirty="0" err="1"/>
-              <a:t>Cookbook</a:t>
-            </a:r>
-            <a:r>
-              <a:rPr lang="it-IT" sz="2000" dirty="0"/>
-              <a:t> </a:t>
-            </a:r>
-            <a:r>
-              <a:rPr lang="it-IT" sz="2000" dirty="0" err="1"/>
-              <a:t>Gems</a:t>
-            </a:r>
-            <a:r>
-              <a:rPr lang="it-IT" sz="2000" dirty="0"/>
-              <a:t>:</a:t>
-            </a:r>
-          </a:p>
-          <a:p>
-            <a:pPr>
-              <a:lnSpc>
-                <a:spcPct val="80000"/>
-              </a:lnSpc>
-            </a:pPr>
-            <a:r>
-              <a:rPr lang="it-IT" sz="2000" dirty="0" err="1"/>
-              <a:t>Compiling</a:t>
-            </a:r>
-            <a:r>
-              <a:rPr lang="it-IT" sz="2000" dirty="0"/>
-              <a:t> </a:t>
-            </a:r>
-            <a:r>
-              <a:rPr lang="it-IT" sz="2000" dirty="0" err="1"/>
-              <a:t>Cookbooks</a:t>
-            </a:r>
-            <a:r>
-              <a:rPr lang="it-IT" sz="2000" dirty="0"/>
-              <a:t>...</a:t>
-            </a:r>
-          </a:p>
-          <a:p>
-            <a:pPr>
-              <a:lnSpc>
-                <a:spcPct val="80000"/>
-              </a:lnSpc>
-            </a:pPr>
-            <a:r>
-              <a:rPr lang="it-IT" sz="2000" dirty="0" err="1"/>
-              <a:t>Converging</a:t>
-            </a:r>
-            <a:r>
-              <a:rPr lang="it-IT" sz="2000" dirty="0"/>
-              <a:t> 5 </a:t>
-            </a:r>
-            <a:r>
-              <a:rPr lang="it-IT" sz="2000" dirty="0" err="1"/>
-              <a:t>resources</a:t>
-            </a:r>
-            <a:endParaRPr lang="it-IT" sz="2000" dirty="0"/>
-          </a:p>
-          <a:p>
-            <a:pPr>
-              <a:lnSpc>
-                <a:spcPct val="80000"/>
-              </a:lnSpc>
-            </a:pPr>
-            <a:r>
-              <a:rPr lang="it-IT" sz="2000" dirty="0" err="1"/>
-              <a:t>Recipe</a:t>
-            </a:r>
-            <a:r>
-              <a:rPr lang="it-IT" sz="2000" dirty="0"/>
-              <a:t>: apache::default</a:t>
-            </a:r>
-          </a:p>
-          <a:p>
-            <a:pPr>
-              <a:lnSpc>
-                <a:spcPct val="80000"/>
-              </a:lnSpc>
-            </a:pPr>
-            <a:r>
-              <a:rPr lang="it-IT" sz="2000" dirty="0"/>
-              <a:t> * </a:t>
-            </a:r>
-            <a:r>
-              <a:rPr lang="it-IT" sz="2000" dirty="0" err="1"/>
-              <a:t>yum_package</a:t>
-            </a:r>
-            <a:r>
-              <a:rPr lang="it-IT" sz="2000" dirty="0"/>
-              <a:t>[</a:t>
-            </a:r>
-            <a:r>
-              <a:rPr lang="it-IT" sz="2000" dirty="0" err="1"/>
+              <a:rPr lang="en-US" sz="2000" dirty="0"/>
+              <a:t>       Use `/Users/</a:t>
+            </a:r>
+            <a:r>
+              <a:rPr lang="en-US" sz="2000" dirty="0" err="1"/>
+              <a:t>franklinwebber</a:t>
+            </a:r>
+            <a:r>
+              <a:rPr lang="en-US" sz="2000" dirty="0"/>
+              <a:t>/scratch/</a:t>
+            </a:r>
+            <a:r>
+              <a:rPr lang="en-US" sz="2000" dirty="0" err="1"/>
               <a:t>httpd</a:t>
             </a:r>
             <a:r>
-              <a:rPr lang="it-IT" sz="2000" dirty="0"/>
-              <a:t>] </a:t>
-            </a:r>
-            <a:r>
-              <a:rPr lang="it-IT" sz="2000" dirty="0" err="1"/>
-              <a:t>action</a:t>
-            </a:r>
-            <a:r>
-              <a:rPr lang="it-IT" sz="2000" dirty="0"/>
-              <a:t> </a:t>
-            </a:r>
-            <a:r>
-              <a:rPr lang="it-IT" sz="2000" dirty="0" err="1"/>
-              <a:t>install</a:t>
-            </a:r>
-            <a:r>
-              <a:rPr lang="it-IT" sz="2000" dirty="0"/>
-              <a:t> (up to date)</a:t>
-            </a:r>
-          </a:p>
-          <a:p>
-            <a:pPr>
-              <a:lnSpc>
-                <a:spcPct val="80000"/>
-              </a:lnSpc>
-            </a:pPr>
-            <a:r>
-              <a:rPr lang="it-IT" sz="2000" dirty="0"/>
-              <a:t> * </a:t>
-            </a:r>
-            <a:r>
-              <a:rPr lang="it-IT" sz="2000" dirty="0" err="1"/>
-              <a:t>apache_vhost</a:t>
-            </a:r>
-            <a:r>
-              <a:rPr lang="it-IT" sz="2000" dirty="0"/>
-              <a:t>[welcome] </a:t>
-            </a:r>
-            <a:r>
-              <a:rPr lang="it-IT" sz="2000" dirty="0" err="1"/>
-              <a:t>action</a:t>
-            </a:r>
-            <a:r>
-              <a:rPr lang="it-IT" sz="2000" dirty="0"/>
-              <a:t> </a:t>
-            </a:r>
-            <a:r>
-              <a:rPr lang="it-IT" sz="2000" dirty="0" err="1"/>
-              <a:t>remove</a:t>
-            </a:r>
-            <a:endParaRPr lang="it-IT" sz="2000" dirty="0"/>
-          </a:p>
-          <a:p>
-            <a:pPr>
-              <a:lnSpc>
-                <a:spcPct val="80000"/>
-              </a:lnSpc>
-            </a:pPr>
-            <a:r>
-              <a:rPr lang="it-IT" sz="2000" dirty="0"/>
-              <a:t> (up to date)</a:t>
-            </a:r>
-          </a:p>
-          <a:p>
-            <a:pPr>
-              <a:lnSpc>
-                <a:spcPct val="80000"/>
-              </a:lnSpc>
-            </a:pPr>
-            <a:r>
-              <a:rPr lang="it-IT" sz="2000" dirty="0"/>
-              <a:t> (up to date)</a:t>
-            </a:r>
-            <a:endParaRPr lang="en-US" sz="2000" dirty="0"/>
-          </a:p>
-          <a:p>
-            <a:pPr>
-              <a:lnSpc>
-                <a:spcPct val="80000"/>
-              </a:lnSpc>
-            </a:pPr>
-            <a:r>
-              <a:rPr lang="it-IT" sz="2000" dirty="0"/>
-              <a:t>     (up to date)</a:t>
-            </a:r>
-          </a:p>
-          <a:p>
-            <a:pPr>
-              <a:lnSpc>
-                <a:spcPct val="80000"/>
-              </a:lnSpc>
-            </a:pPr>
-            <a:endParaRPr lang="it-IT" sz="2000" dirty="0"/>
-          </a:p>
-          <a:p>
-            <a:pPr>
-              <a:lnSpc>
-                <a:spcPct val="80000"/>
-              </a:lnSpc>
-            </a:pPr>
-            <a:r>
-              <a:rPr lang="it-IT" sz="2000" dirty="0"/>
-              <a:t> (up to date)</a:t>
-            </a:r>
-            <a:endParaRPr lang="en-US" sz="2000" dirty="0"/>
-          </a:p>
-          <a:p>
-            <a:pPr>
-              <a:lnSpc>
-                <a:spcPct val="80000"/>
-              </a:lnSpc>
-            </a:pPr>
-            <a:r>
-              <a:rPr lang="it-IT" sz="2000" dirty="0"/>
-              <a:t> (up to date)</a:t>
-            </a:r>
-            <a:endParaRPr lang="en-US" sz="2000" dirty="0"/>
-          </a:p>
-          <a:p>
-            <a:pPr>
-              <a:lnSpc>
-                <a:spcPct val="80000"/>
-              </a:lnSpc>
-            </a:pPr>
-            <a:r>
-              <a:rPr lang="it-IT" sz="2000" dirty="0"/>
-              <a:t> (up to date)</a:t>
-            </a:r>
-            <a:endParaRPr lang="en-US" sz="2000" dirty="0"/>
-          </a:p>
-          <a:p>
-            <a:pPr>
-              <a:lnSpc>
-                <a:spcPct val="80000"/>
-              </a:lnSpc>
-            </a:pPr>
-            <a:r>
               <a:rPr lang="en-US" sz="2000" dirty="0"/>
-              <a:t>    </a:t>
-            </a:r>
-            <a:r>
-              <a:rPr lang="it-IT" sz="2000" dirty="0"/>
-              <a:t> (up to date)</a:t>
-            </a:r>
-            <a:endParaRPr lang="en-US" sz="2000" dirty="0"/>
+              <a:t>/test/recipes/default` for testing</a:t>
+            </a:r>
           </a:p>
           <a:p>
             <a:pPr>
@@ -16091,6 +15704,118 @@
             <a:endParaRPr lang="en-US" sz="2000" dirty="0"/>
           </a:p>
           <a:p>
+            <a:pPr>
+              <a:lnSpc>
+                <a:spcPct val="80000"/>
+              </a:lnSpc>
+            </a:pPr>
+            <a:r>
+              <a:rPr lang="en-US" sz="2000" dirty="0"/>
+              <a:t>Target:  </a:t>
+            </a:r>
+            <a:r>
+              <a:rPr lang="en-US" sz="2000" dirty="0" err="1"/>
+              <a:t>ssh</a:t>
+            </a:r>
+            <a:r>
+              <a:rPr lang="en-US" sz="2000" dirty="0"/>
+              <a:t>://vagrant@127.0.0.1:2222</a:t>
+            </a:r>
+          </a:p>
+          <a:p>
+            <a:pPr>
+              <a:lnSpc>
+                <a:spcPct val="80000"/>
+              </a:lnSpc>
+            </a:pPr>
+            <a:endParaRPr lang="en-US" sz="2000" dirty="0"/>
+          </a:p>
+          <a:p>
+            <a:pPr>
+              <a:lnSpc>
+                <a:spcPct val="80000"/>
+              </a:lnSpc>
+            </a:pPr>
+            <a:r>
+              <a:rPr lang="en-US" sz="2000" dirty="0"/>
+              <a:t>  ✔  Command curl http://</a:t>
+            </a:r>
+            <a:r>
+              <a:rPr lang="en-US" sz="2000" dirty="0" err="1"/>
+              <a:t>localhost</a:t>
+            </a:r>
+            <a:r>
+              <a:rPr lang="en-US" sz="2000" dirty="0"/>
+              <a:t> </a:t>
+            </a:r>
+            <a:r>
+              <a:rPr lang="en-US" sz="2000" dirty="0" err="1"/>
+              <a:t>stdout</a:t>
+            </a:r>
+            <a:r>
+              <a:rPr lang="en-US" sz="2000" dirty="0"/>
+              <a:t> should match /Welcome home/</a:t>
+            </a:r>
+          </a:p>
+          <a:p>
+            <a:pPr>
+              <a:lnSpc>
+                <a:spcPct val="80000"/>
+              </a:lnSpc>
+            </a:pPr>
+            <a:r>
+              <a:rPr lang="en-US" sz="2000" dirty="0"/>
+              <a:t>  ✔  Command curl http://localhost:8080 </a:t>
+            </a:r>
+            <a:r>
+              <a:rPr lang="en-US" sz="2000" dirty="0" err="1"/>
+              <a:t>stdout</a:t>
+            </a:r>
+            <a:r>
+              <a:rPr lang="en-US" sz="2000" dirty="0"/>
+              <a:t> should match /Welcome admins/</a:t>
+            </a:r>
+          </a:p>
+          <a:p>
+            <a:pPr>
+              <a:lnSpc>
+                <a:spcPct val="80000"/>
+              </a:lnSpc>
+            </a:pPr>
+            <a:endParaRPr lang="en-US" sz="2000" dirty="0"/>
+          </a:p>
+          <a:p>
+            <a:pPr>
+              <a:lnSpc>
+                <a:spcPct val="80000"/>
+              </a:lnSpc>
+            </a:pPr>
+            <a:r>
+              <a:rPr lang="en-US" sz="2000" dirty="0"/>
+              <a:t>Summary: 2 successful, 0 failures, 0 skipped</a:t>
+            </a:r>
+          </a:p>
+          <a:p>
+            <a:pPr>
+              <a:lnSpc>
+                <a:spcPct val="80000"/>
+              </a:lnSpc>
+            </a:pPr>
+            <a:r>
+              <a:rPr lang="en-US" sz="2000" dirty="0"/>
+              <a:t>       Finished verifying &lt;default-centos-67&gt; (0m0.77s).</a:t>
+            </a:r>
+          </a:p>
+          <a:p>
+            <a:pPr>
+              <a:lnSpc>
+                <a:spcPct val="80000"/>
+              </a:lnSpc>
+            </a:pPr>
+            <a:r>
+              <a:rPr lang="en-US" sz="2000" dirty="0"/>
+              <a:t>-----&gt; Kitchen is finished. (2m42.37s)</a:t>
+            </a:r>
             <a:endParaRPr lang="en-US" sz="2000" dirty="0"/>
           </a:p>
         </p:txBody>
@@ -16466,15 +16191,7 @@
             </a:pPr>
             <a:r>
               <a:rPr lang="en-US" dirty="0" smtClean="0"/>
-              <a:t>Set a </a:t>
-            </a:r>
-            <a:r>
-              <a:rPr lang="en-US" dirty="0" smtClean="0"/>
-              <a:t>custom resource's </a:t>
-            </a:r>
-            <a:r>
-              <a:rPr lang="en-US" dirty="0" smtClean="0"/>
-              <a:t>name to a property</a:t>
+              <a:t>Set a custom resource's name to a property</a:t>
             </a:r>
           </a:p>
           <a:p>
@@ -16486,7 +16203,6 @@
               <a:rPr lang="en-US" dirty="0" smtClean="0"/>
               <a:t>Set a default value for a custom resource property</a:t>
             </a:r>
-            <a:endParaRPr lang="en-US" dirty="0" smtClean="0"/>
           </a:p>
           <a:p>
             <a:pPr marL="457200" indent="-457200">
@@ -16904,15 +16620,7 @@
             </a:r>
             <a:r>
               <a:rPr lang="en-US" dirty="0" smtClean="0"/>
-              <a:t> </a:t>
-            </a:r>
-            <a:r>
-              <a:rPr lang="en-US" dirty="0" smtClean="0"/>
-              <a:t>'users' </a:t>
-            </a:r>
-            <a:r>
-              <a:rPr lang="en-US" dirty="0" smtClean="0"/>
-              <a:t>do</a:t>
+              <a:t> 'users' do</a:t>
             </a:r>
           </a:p>
           <a:p>
@@ -17048,7 +16756,7 @@
           <a:lstStyle/>
           <a:p>
             <a:r>
-              <a:rPr lang="en-US" dirty="0" smtClean="0"/>
+              <a:rPr lang="en-US" dirty="0"/>
               <a:t>..........</a:t>
             </a:r>
           </a:p>
@@ -17058,28 +16766,14 @@
           <a:p>
             <a:r>
               <a:rPr lang="en-US" dirty="0"/>
-              <a:t>Finished in 2.8 seconds (files took 4.67 seconds to load</a:t>
-            </a:r>
-            <a:r>
-              <a:rPr lang="en-US" dirty="0" smtClean="0"/>
-              <a:t>)</a:t>
-            </a:r>
-          </a:p>
-          <a:p>
-            <a:r>
-              <a:rPr lang="en-US" dirty="0" smtClean="0"/>
-              <a:t>10 </a:t>
-            </a:r>
+              <a:t>Finished in 1.22 seconds (files took 2.56 seconds to load)</a:t>
+            </a:r>
+          </a:p>
+          <a:p>
             <a:r>
               <a:rPr lang="en-US" dirty="0"/>
-              <a:t>examples, 0 failures</a:t>
-            </a:r>
-            <a:endParaRPr lang="en-US" dirty="0" smtClean="0"/>
-          </a:p>
-          <a:p>
-            <a:endParaRPr lang="en-US" dirty="0"/>
-          </a:p>
-          <a:p>
+              <a:t>10 examples, 0 failures</a:t>
+            </a:r>
             <a:endParaRPr lang="en-US" dirty="0"/>
           </a:p>
         </p:txBody>
@@ -17189,7 +16883,7 @@
             </a:pPr>
             <a:r>
               <a:rPr lang="en-US" sz="2000" dirty="0"/>
-              <a:t>Synchronizing Cookbooks:</a:t>
+              <a:t>-----&gt; Verifying &lt;default-centos-67&gt;...</a:t>
             </a:r>
           </a:p>
           <a:p>
@@ -17199,267 +16893,25 @@
               </a:lnSpc>
             </a:pPr>
             <a:r>
-              <a:rPr lang="it-IT" sz="2000" dirty="0"/>
-              <a:t> - apache (0.1.0)</a:t>
-            </a:r>
-          </a:p>
-          <a:p>
-            <a:pPr>
-              <a:lnSpc>
-                <a:spcPct val="80000"/>
-              </a:lnSpc>
-            </a:pPr>
-            <a:r>
-              <a:rPr lang="it-IT" sz="2000" dirty="0" err="1"/>
-              <a:t>Installing</a:t>
-            </a:r>
-            <a:r>
-              <a:rPr lang="it-IT" sz="2000" dirty="0"/>
-              <a:t> </a:t>
-            </a:r>
-            <a:r>
-              <a:rPr lang="it-IT" sz="2000" dirty="0" err="1"/>
-              <a:t>Cookbook</a:t>
-            </a:r>
-            <a:r>
-              <a:rPr lang="it-IT" sz="2000" dirty="0"/>
-              <a:t> </a:t>
-            </a:r>
-            <a:r>
-              <a:rPr lang="it-IT" sz="2000" dirty="0" err="1"/>
-              <a:t>Gems</a:t>
-            </a:r>
-            <a:r>
-              <a:rPr lang="it-IT" sz="2000" dirty="0"/>
-              <a:t>:</a:t>
-            </a:r>
-          </a:p>
-          <a:p>
-            <a:pPr>
-              <a:lnSpc>
-                <a:spcPct val="80000"/>
-              </a:lnSpc>
-            </a:pPr>
-            <a:r>
-              <a:rPr lang="it-IT" sz="2000" dirty="0" err="1"/>
-              <a:t>Compiling</a:t>
-            </a:r>
-            <a:r>
-              <a:rPr lang="it-IT" sz="2000" dirty="0"/>
-              <a:t> </a:t>
-            </a:r>
-            <a:r>
-              <a:rPr lang="it-IT" sz="2000" dirty="0" err="1"/>
-              <a:t>Cookbooks</a:t>
-            </a:r>
-            <a:r>
-              <a:rPr lang="it-IT" sz="2000" dirty="0"/>
-              <a:t>...</a:t>
-            </a:r>
-          </a:p>
-          <a:p>
-            <a:pPr>
-              <a:lnSpc>
-                <a:spcPct val="80000"/>
-              </a:lnSpc>
-            </a:pPr>
-            <a:r>
-              <a:rPr lang="it-IT" sz="2000" dirty="0" err="1"/>
-              <a:t>Converging</a:t>
-            </a:r>
-            <a:r>
-              <a:rPr lang="it-IT" sz="2000" dirty="0"/>
-              <a:t> 5 </a:t>
-            </a:r>
-            <a:r>
-              <a:rPr lang="it-IT" sz="2000" dirty="0" err="1"/>
-              <a:t>resources</a:t>
-            </a:r>
-            <a:endParaRPr lang="it-IT" sz="2000" dirty="0"/>
-          </a:p>
-          <a:p>
-            <a:pPr>
-              <a:lnSpc>
-                <a:spcPct val="80000"/>
-              </a:lnSpc>
-            </a:pPr>
-            <a:r>
-              <a:rPr lang="it-IT" sz="2000" dirty="0" err="1"/>
-              <a:t>Recipe</a:t>
-            </a:r>
-            <a:r>
-              <a:rPr lang="it-IT" sz="2000" dirty="0"/>
-              <a:t>: apache::default</a:t>
-            </a:r>
-          </a:p>
-          <a:p>
-            <a:pPr>
-              <a:lnSpc>
-                <a:spcPct val="80000"/>
-              </a:lnSpc>
-            </a:pPr>
-            <a:r>
-              <a:rPr lang="it-IT" sz="2000" dirty="0"/>
-              <a:t> * </a:t>
-            </a:r>
-            <a:r>
-              <a:rPr lang="it-IT" sz="2000" dirty="0" err="1"/>
-              <a:t>yum_package</a:t>
-            </a:r>
-            <a:r>
-              <a:rPr lang="it-IT" sz="2000" dirty="0"/>
-              <a:t>[</a:t>
-            </a:r>
-            <a:r>
-              <a:rPr lang="it-IT" sz="2000" dirty="0" err="1"/>
+              <a:rPr lang="en-US" sz="2000" dirty="0"/>
+              <a:t>       Use `/Users/</a:t>
+            </a:r>
+            <a:r>
+              <a:rPr lang="en-US" sz="2000" dirty="0" err="1"/>
+              <a:t>franklinwebber</a:t>
+            </a:r>
+            <a:r>
+              <a:rPr lang="en-US" sz="2000" dirty="0"/>
+              <a:t>/scratch/</a:t>
+            </a:r>
+            <a:r>
+              <a:rPr lang="en-US" sz="2000" dirty="0" err="1"/>
               <a:t>httpd</a:t>
             </a:r>
             <a:r>
-              <a:rPr lang="it-IT" sz="2000" dirty="0"/>
-              <a:t>] </a:t>
-            </a:r>
-            <a:r>
-              <a:rPr lang="it-IT" sz="2000" dirty="0" err="1"/>
-              <a:t>action</a:t>
-            </a:r>
-            <a:r>
-              <a:rPr lang="it-IT" sz="2000" dirty="0"/>
-              <a:t> </a:t>
-            </a:r>
-            <a:r>
-              <a:rPr lang="it-IT" sz="2000" dirty="0" err="1"/>
-              <a:t>install</a:t>
-            </a:r>
-            <a:r>
-              <a:rPr lang="it-IT" sz="2000" dirty="0"/>
-              <a:t> (up to date)</a:t>
-            </a:r>
-          </a:p>
-          <a:p>
-            <a:pPr>
-              <a:lnSpc>
-                <a:spcPct val="80000"/>
-              </a:lnSpc>
-            </a:pPr>
-            <a:r>
-              <a:rPr lang="it-IT" sz="2000" dirty="0"/>
-              <a:t> * </a:t>
-            </a:r>
-            <a:r>
-              <a:rPr lang="it-IT" sz="2000" dirty="0" err="1"/>
-              <a:t>apache_vhost</a:t>
-            </a:r>
-            <a:r>
-              <a:rPr lang="it-IT" sz="2000" dirty="0"/>
-              <a:t>[welcome] </a:t>
-            </a:r>
-            <a:r>
-              <a:rPr lang="it-IT" sz="2000" dirty="0" err="1"/>
-              <a:t>action</a:t>
-            </a:r>
-            <a:r>
-              <a:rPr lang="it-IT" sz="2000" dirty="0"/>
-              <a:t> </a:t>
-            </a:r>
-            <a:r>
-              <a:rPr lang="it-IT" sz="2000" dirty="0" err="1"/>
-              <a:t>remove</a:t>
-            </a:r>
-            <a:endParaRPr lang="it-IT" sz="2000" dirty="0"/>
-          </a:p>
-          <a:p>
-            <a:pPr>
-              <a:lnSpc>
-                <a:spcPct val="80000"/>
-              </a:lnSpc>
-            </a:pPr>
-            <a:r>
-              <a:rPr lang="it-IT" sz="2000" dirty="0"/>
-              <a:t> (up to date)</a:t>
-            </a:r>
-          </a:p>
-          <a:p>
-            <a:pPr>
-              <a:lnSpc>
-                <a:spcPct val="80000"/>
-              </a:lnSpc>
-            </a:pPr>
-            <a:r>
-              <a:rPr lang="it-IT" sz="2000" dirty="0"/>
-              <a:t> (up to date)</a:t>
-            </a:r>
-            <a:endParaRPr lang="en-US" sz="2000" dirty="0"/>
-          </a:p>
-          <a:p>
-            <a:pPr>
-              <a:lnSpc>
-                <a:spcPct val="80000"/>
-              </a:lnSpc>
-            </a:pPr>
-            <a:r>
-              <a:rPr lang="it-IT" sz="2000" dirty="0"/>
-              <a:t>     (up to date)</a:t>
-            </a:r>
-          </a:p>
-          <a:p>
-            <a:pPr>
-              <a:lnSpc>
-                <a:spcPct val="80000"/>
-              </a:lnSpc>
-            </a:pPr>
-            <a:endParaRPr lang="it-IT" sz="2000" dirty="0"/>
-          </a:p>
-          <a:p>
-            <a:pPr>
-              <a:lnSpc>
-                <a:spcPct val="80000"/>
-              </a:lnSpc>
-            </a:pPr>
-            <a:r>
-              <a:rPr lang="it-IT" sz="2000" dirty="0"/>
-              <a:t> (up to date)</a:t>
-            </a:r>
-            <a:endParaRPr lang="en-US" sz="2000" dirty="0"/>
-          </a:p>
-          <a:p>
-            <a:pPr>
-              <a:lnSpc>
-                <a:spcPct val="80000"/>
-              </a:lnSpc>
-            </a:pPr>
-            <a:r>
-              <a:rPr lang="it-IT" sz="2000" dirty="0"/>
-              <a:t> (up to date)</a:t>
-            </a:r>
-            <a:endParaRPr lang="en-US" sz="2000" dirty="0"/>
-          </a:p>
-          <a:p>
-            <a:pPr>
-              <a:lnSpc>
-                <a:spcPct val="80000"/>
-              </a:lnSpc>
-            </a:pPr>
-            <a:r>
-              <a:rPr lang="it-IT" sz="2000" dirty="0"/>
-              <a:t> (up to date)</a:t>
-            </a:r>
-            <a:endParaRPr lang="en-US" sz="2000" dirty="0"/>
-          </a:p>
-          <a:p>
-            <a:pPr>
-              <a:lnSpc>
-                <a:spcPct val="80000"/>
-              </a:lnSpc>
-            </a:pPr>
-            <a:r>
               <a:rPr lang="en-US" sz="2000" dirty="0"/>
-              <a:t>    </a:t>
-            </a:r>
-            <a:r>
-              <a:rPr lang="it-IT" sz="2000" dirty="0"/>
-              <a:t> (up to date)</a:t>
-            </a:r>
-            <a:endParaRPr lang="en-US" sz="2000" dirty="0"/>
+              <a:t>/test/recipes/default` for testing</a:t>
+            </a:r>
           </a:p>
           <a:p>
             <a:pPr>
@@ -17470,6 +16922,118 @@
             <a:endParaRPr lang="en-US" sz="2000" dirty="0"/>
           </a:p>
           <a:p>
+            <a:pPr>
+              <a:lnSpc>
+                <a:spcPct val="80000"/>
+              </a:lnSpc>
+            </a:pPr>
+            <a:r>
+              <a:rPr lang="en-US" sz="2000" dirty="0"/>
+              <a:t>Target:  </a:t>
+            </a:r>
+            <a:r>
+              <a:rPr lang="en-US" sz="2000" dirty="0" err="1"/>
+              <a:t>ssh</a:t>
+            </a:r>
+            <a:r>
+              <a:rPr lang="en-US" sz="2000" dirty="0"/>
+              <a:t>://vagrant@127.0.0.1:2222</a:t>
+            </a:r>
+          </a:p>
+          <a:p>
+            <a:pPr>
+              <a:lnSpc>
+                <a:spcPct val="80000"/>
+              </a:lnSpc>
+            </a:pPr>
+            <a:endParaRPr lang="en-US" sz="2000" dirty="0"/>
+          </a:p>
+          <a:p>
+            <a:pPr>
+              <a:lnSpc>
+                <a:spcPct val="80000"/>
+              </a:lnSpc>
+            </a:pPr>
+            <a:r>
+              <a:rPr lang="en-US" sz="2000" dirty="0"/>
+              <a:t>  ✔  Command curl http://</a:t>
+            </a:r>
+            <a:r>
+              <a:rPr lang="en-US" sz="2000" dirty="0" err="1"/>
+              <a:t>localhost</a:t>
+            </a:r>
+            <a:r>
+              <a:rPr lang="en-US" sz="2000" dirty="0"/>
+              <a:t> </a:t>
+            </a:r>
+            <a:r>
+              <a:rPr lang="en-US" sz="2000" dirty="0" err="1"/>
+              <a:t>stdout</a:t>
+            </a:r>
+            <a:r>
+              <a:rPr lang="en-US" sz="2000" dirty="0"/>
+              <a:t> should match /Welcome home/</a:t>
+            </a:r>
+          </a:p>
+          <a:p>
+            <a:pPr>
+              <a:lnSpc>
+                <a:spcPct val="80000"/>
+              </a:lnSpc>
+            </a:pPr>
+            <a:r>
+              <a:rPr lang="en-US" sz="2000" dirty="0"/>
+              <a:t>  ✔  Command curl http://localhost:8080 </a:t>
+            </a:r>
+            <a:r>
+              <a:rPr lang="en-US" sz="2000" dirty="0" err="1"/>
+              <a:t>stdout</a:t>
+            </a:r>
+            <a:r>
+              <a:rPr lang="en-US" sz="2000" dirty="0"/>
+              <a:t> should match /Welcome admins/</a:t>
+            </a:r>
+          </a:p>
+          <a:p>
+            <a:pPr>
+              <a:lnSpc>
+                <a:spcPct val="80000"/>
+              </a:lnSpc>
+            </a:pPr>
+            <a:endParaRPr lang="en-US" sz="2000" dirty="0"/>
+          </a:p>
+          <a:p>
+            <a:pPr>
+              <a:lnSpc>
+                <a:spcPct val="80000"/>
+              </a:lnSpc>
+            </a:pPr>
+            <a:r>
+              <a:rPr lang="en-US" sz="2000" dirty="0"/>
+              <a:t>Summary: 2 successful, 0 failures, 0 skipped</a:t>
+            </a:r>
+          </a:p>
+          <a:p>
+            <a:pPr>
+              <a:lnSpc>
+                <a:spcPct val="80000"/>
+              </a:lnSpc>
+            </a:pPr>
+            <a:r>
+              <a:rPr lang="en-US" sz="2000" dirty="0"/>
+              <a:t>       Finished verifying &lt;default-centos-67&gt; (0m0.77s).</a:t>
+            </a:r>
+          </a:p>
+          <a:p>
+            <a:pPr>
+              <a:lnSpc>
+                <a:spcPct val="80000"/>
+              </a:lnSpc>
+            </a:pPr>
+            <a:r>
+              <a:rPr lang="en-US" sz="2000" dirty="0"/>
+              <a:t>-----&gt; Kitchen is finished. (2m42.37s)</a:t>
+            </a:r>
             <a:endParaRPr lang="en-US" sz="2000" dirty="0"/>
           </a:p>
         </p:txBody>
@@ -17753,11 +17317,7 @@
           <a:p>
             <a:r>
               <a:rPr lang="en-US" dirty="0" smtClean="0"/>
-              <a:t>Defining a notification in a resource within a custom resource creates a fragile relationship. One that we want to </a:t>
-            </a:r>
-            <a:r>
-              <a:rPr lang="en-US" dirty="0" smtClean="0"/>
-              <a:t>address by removing any notifications to outside resources.</a:t>
+              <a:t>Defining a notification in a resource within a custom resource creates a fragile relationship. One that we want to address by removing any notifications to outside resources.</a:t>
             </a:r>
             <a:endParaRPr lang="en-US" dirty="0"/>
           </a:p>
@@ -18604,7 +18164,7 @@
           <a:lstStyle/>
           <a:p>
             <a:r>
-              <a:rPr lang="en-US" dirty="0" smtClean="0"/>
+              <a:rPr lang="en-US" dirty="0"/>
               <a:t>..........</a:t>
             </a:r>
           </a:p>
@@ -18614,28 +18174,14 @@
           <a:p>
             <a:r>
               <a:rPr lang="en-US" dirty="0"/>
-              <a:t>Finished in 2.8 seconds (files took 4.67 seconds to load</a:t>
-            </a:r>
-            <a:r>
-              <a:rPr lang="en-US" dirty="0" smtClean="0"/>
-              <a:t>)</a:t>
-            </a:r>
-          </a:p>
-          <a:p>
-            <a:r>
-              <a:rPr lang="en-US" dirty="0" smtClean="0"/>
-              <a:t>10 </a:t>
-            </a:r>
+              <a:t>Finished in 1.22 seconds (files took 2.56 seconds to load)</a:t>
+            </a:r>
+          </a:p>
+          <a:p>
             <a:r>
               <a:rPr lang="en-US" dirty="0"/>
-              <a:t>examples, 0 failures</a:t>
-            </a:r>
-            <a:endParaRPr lang="en-US" dirty="0" smtClean="0"/>
-          </a:p>
-          <a:p>
-            <a:endParaRPr lang="en-US" dirty="0"/>
-          </a:p>
-          <a:p>
+              <a:t>10 examples, 0 failures</a:t>
+            </a:r>
             <a:endParaRPr lang="en-US" dirty="0"/>
           </a:p>
         </p:txBody>
@@ -18898,7 +18444,7 @@
             </a:pPr>
             <a:r>
               <a:rPr lang="en-US" sz="2000" dirty="0"/>
-              <a:t>Synchronizing Cookbooks:</a:t>
+              <a:t>-----&gt; Verifying &lt;default-centos-67&gt;...</a:t>
             </a:r>
           </a:p>
           <a:p>
@@ -18908,267 +18454,25 @@
               </a:lnSpc>
             </a:pPr>
             <a:r>
-              <a:rPr lang="it-IT" sz="2000" dirty="0"/>
-              <a:t> - apache (0.1.0)</a:t>
-            </a:r>
-          </a:p>
-          <a:p>
-            <a:pPr>
-              <a:lnSpc>
-                <a:spcPct val="80000"/>
-              </a:lnSpc>
-            </a:pPr>
-            <a:r>
-              <a:rPr lang="it-IT" sz="2000" dirty="0" err="1"/>
-              <a:t>Installing</a:t>
-            </a:r>
-            <a:r>
-              <a:rPr lang="it-IT" sz="2000" dirty="0"/>
-              <a:t> </a:t>
-            </a:r>
-            <a:r>
-              <a:rPr lang="it-IT" sz="2000" dirty="0" err="1"/>
-              <a:t>Cookbook</a:t>
-            </a:r>
-            <a:r>
-              <a:rPr lang="it-IT" sz="2000" dirty="0"/>
-              <a:t> </a:t>
-            </a:r>
-            <a:r>
-              <a:rPr lang="it-IT" sz="2000" dirty="0" err="1"/>
-              <a:t>Gems</a:t>
-            </a:r>
-            <a:r>
-              <a:rPr lang="it-IT" sz="2000" dirty="0"/>
-              <a:t>:</a:t>
-            </a:r>
-          </a:p>
-          <a:p>
-            <a:pPr>
-              <a:lnSpc>
-                <a:spcPct val="80000"/>
-              </a:lnSpc>
-            </a:pPr>
-            <a:r>
-              <a:rPr lang="it-IT" sz="2000" dirty="0" err="1"/>
-              <a:t>Compiling</a:t>
-            </a:r>
-            <a:r>
-              <a:rPr lang="it-IT" sz="2000" dirty="0"/>
-              <a:t> </a:t>
-            </a:r>
-            <a:r>
-              <a:rPr lang="it-IT" sz="2000" dirty="0" err="1"/>
-              <a:t>Cookbooks</a:t>
-            </a:r>
-            <a:r>
-              <a:rPr lang="it-IT" sz="2000" dirty="0"/>
-              <a:t>...</a:t>
-            </a:r>
-          </a:p>
-          <a:p>
-            <a:pPr>
-              <a:lnSpc>
-                <a:spcPct val="80000"/>
-              </a:lnSpc>
-            </a:pPr>
-            <a:r>
-              <a:rPr lang="it-IT" sz="2000" dirty="0" err="1"/>
-              <a:t>Converging</a:t>
-            </a:r>
-            <a:r>
-              <a:rPr lang="it-IT" sz="2000" dirty="0"/>
-              <a:t> 5 </a:t>
-            </a:r>
-            <a:r>
-              <a:rPr lang="it-IT" sz="2000" dirty="0" err="1"/>
-              <a:t>resources</a:t>
-            </a:r>
-            <a:endParaRPr lang="it-IT" sz="2000" dirty="0"/>
-          </a:p>
-          <a:p>
-            <a:pPr>
-              <a:lnSpc>
-                <a:spcPct val="80000"/>
-              </a:lnSpc>
-            </a:pPr>
-            <a:r>
-              <a:rPr lang="it-IT" sz="2000" dirty="0" err="1"/>
-              <a:t>Recipe</a:t>
-            </a:r>
-            <a:r>
-              <a:rPr lang="it-IT" sz="2000" dirty="0"/>
-              <a:t>: apache::default</a:t>
-            </a:r>
-          </a:p>
-          <a:p>
-            <a:pPr>
-              <a:lnSpc>
-                <a:spcPct val="80000"/>
-              </a:lnSpc>
-            </a:pPr>
-            <a:r>
-              <a:rPr lang="it-IT" sz="2000" dirty="0"/>
-              <a:t> * </a:t>
-            </a:r>
-            <a:r>
-              <a:rPr lang="it-IT" sz="2000" dirty="0" err="1"/>
-              <a:t>yum_package</a:t>
-            </a:r>
-            <a:r>
-              <a:rPr lang="it-IT" sz="2000" dirty="0"/>
-              <a:t>[</a:t>
-            </a:r>
-            <a:r>
-              <a:rPr lang="it-IT" sz="2000" dirty="0" err="1"/>
+              <a:rPr lang="en-US" sz="2000" dirty="0"/>
+              <a:t>       Use `/Users/</a:t>
+            </a:r>
+            <a:r>
+              <a:rPr lang="en-US" sz="2000" dirty="0" err="1"/>
+              <a:t>franklinwebber</a:t>
+            </a:r>
+            <a:r>
+              <a:rPr lang="en-US" sz="2000" dirty="0"/>
+              <a:t>/scratch/</a:t>
+            </a:r>
+            <a:r>
+              <a:rPr lang="en-US" sz="2000" dirty="0" err="1"/>
               <a:t>httpd</a:t>
             </a:r>
             <a:r>
-              <a:rPr lang="it-IT" sz="2000" dirty="0"/>
-              <a:t>] </a:t>
-            </a:r>
-            <a:r>
-              <a:rPr lang="it-IT" sz="2000" dirty="0" err="1"/>
-              <a:t>action</a:t>
-            </a:r>
-            <a:r>
-              <a:rPr lang="it-IT" sz="2000" dirty="0"/>
-              <a:t> </a:t>
-            </a:r>
-            <a:r>
-              <a:rPr lang="it-IT" sz="2000" dirty="0" err="1"/>
-              <a:t>install</a:t>
-            </a:r>
-            <a:r>
-              <a:rPr lang="it-IT" sz="2000" dirty="0"/>
-              <a:t> (up to date)</a:t>
-            </a:r>
-          </a:p>
-          <a:p>
-            <a:pPr>
-              <a:lnSpc>
-                <a:spcPct val="80000"/>
-              </a:lnSpc>
-            </a:pPr>
-            <a:r>
-              <a:rPr lang="it-IT" sz="2000" dirty="0"/>
-              <a:t> * </a:t>
-            </a:r>
-            <a:r>
-              <a:rPr lang="it-IT" sz="2000" dirty="0" err="1"/>
-              <a:t>apache_vhost</a:t>
-            </a:r>
-            <a:r>
-              <a:rPr lang="it-IT" sz="2000" dirty="0"/>
-              <a:t>[welcome] </a:t>
-            </a:r>
-            <a:r>
-              <a:rPr lang="it-IT" sz="2000" dirty="0" err="1"/>
-              <a:t>action</a:t>
-            </a:r>
-            <a:r>
-              <a:rPr lang="it-IT" sz="2000" dirty="0"/>
-              <a:t> </a:t>
-            </a:r>
-            <a:r>
-              <a:rPr lang="it-IT" sz="2000" dirty="0" err="1"/>
-              <a:t>remove</a:t>
-            </a:r>
-            <a:endParaRPr lang="it-IT" sz="2000" dirty="0"/>
-          </a:p>
-          <a:p>
-            <a:pPr>
-              <a:lnSpc>
-                <a:spcPct val="80000"/>
-              </a:lnSpc>
-            </a:pPr>
-            <a:r>
-              <a:rPr lang="it-IT" sz="2000" dirty="0"/>
-              <a:t> (up to date)</a:t>
-            </a:r>
-          </a:p>
-          <a:p>
-            <a:pPr>
-              <a:lnSpc>
-                <a:spcPct val="80000"/>
-              </a:lnSpc>
-            </a:pPr>
-            <a:r>
-              <a:rPr lang="it-IT" sz="2000" dirty="0"/>
-              <a:t> (up to date)</a:t>
-            </a:r>
-            <a:endParaRPr lang="en-US" sz="2000" dirty="0"/>
-          </a:p>
-          <a:p>
-            <a:pPr>
-              <a:lnSpc>
-                <a:spcPct val="80000"/>
-              </a:lnSpc>
-            </a:pPr>
-            <a:r>
-              <a:rPr lang="it-IT" sz="2000" dirty="0"/>
-              <a:t>     (up to date)</a:t>
-            </a:r>
-          </a:p>
-          <a:p>
-            <a:pPr>
-              <a:lnSpc>
-                <a:spcPct val="80000"/>
-              </a:lnSpc>
-            </a:pPr>
-            <a:endParaRPr lang="it-IT" sz="2000" dirty="0"/>
-          </a:p>
-          <a:p>
-            <a:pPr>
-              <a:lnSpc>
-                <a:spcPct val="80000"/>
-              </a:lnSpc>
-            </a:pPr>
-            <a:r>
-              <a:rPr lang="it-IT" sz="2000" dirty="0"/>
-              <a:t> (up to date)</a:t>
-            </a:r>
-            <a:endParaRPr lang="en-US" sz="2000" dirty="0"/>
-          </a:p>
-          <a:p>
-            <a:pPr>
-              <a:lnSpc>
-                <a:spcPct val="80000"/>
-              </a:lnSpc>
-            </a:pPr>
-            <a:r>
-              <a:rPr lang="it-IT" sz="2000" dirty="0"/>
-              <a:t> (up to date)</a:t>
-            </a:r>
-            <a:endParaRPr lang="en-US" sz="2000" dirty="0"/>
-          </a:p>
-          <a:p>
-            <a:pPr>
-              <a:lnSpc>
-                <a:spcPct val="80000"/>
-              </a:lnSpc>
-            </a:pPr>
-            <a:r>
-              <a:rPr lang="it-IT" sz="2000" dirty="0"/>
-              <a:t> (up to date)</a:t>
-            </a:r>
-            <a:endParaRPr lang="en-US" sz="2000" dirty="0"/>
-          </a:p>
-          <a:p>
-            <a:pPr>
-              <a:lnSpc>
-                <a:spcPct val="80000"/>
-              </a:lnSpc>
-            </a:pPr>
-            <a:r>
               <a:rPr lang="en-US" sz="2000" dirty="0"/>
-              <a:t>    </a:t>
-            </a:r>
-            <a:r>
-              <a:rPr lang="it-IT" sz="2000" dirty="0"/>
-              <a:t> (up to date)</a:t>
-            </a:r>
-            <a:endParaRPr lang="en-US" sz="2000" dirty="0"/>
+              <a:t>/test/recipes/default` for testing</a:t>
+            </a:r>
           </a:p>
           <a:p>
             <a:pPr>
@@ -19179,6 +18483,118 @@
             <a:endParaRPr lang="en-US" sz="2000" dirty="0"/>
           </a:p>
           <a:p>
+            <a:pPr>
+              <a:lnSpc>
+                <a:spcPct val="80000"/>
+              </a:lnSpc>
+            </a:pPr>
+            <a:r>
+              <a:rPr lang="en-US" sz="2000" dirty="0"/>
+              <a:t>Target:  </a:t>
+            </a:r>
+            <a:r>
+              <a:rPr lang="en-US" sz="2000" dirty="0" err="1"/>
+              <a:t>ssh</a:t>
+            </a:r>
+            <a:r>
+              <a:rPr lang="en-US" sz="2000" dirty="0"/>
+              <a:t>://vagrant@127.0.0.1:2222</a:t>
+            </a:r>
+          </a:p>
+          <a:p>
+            <a:pPr>
+              <a:lnSpc>
+                <a:spcPct val="80000"/>
+              </a:lnSpc>
+            </a:pPr>
+            <a:endParaRPr lang="en-US" sz="2000" dirty="0"/>
+          </a:p>
+          <a:p>
+            <a:pPr>
+              <a:lnSpc>
+                <a:spcPct val="80000"/>
+              </a:lnSpc>
+            </a:pPr>
+            <a:r>
+              <a:rPr lang="en-US" sz="2000" dirty="0"/>
+              <a:t>  ✔  Command curl http://</a:t>
+            </a:r>
+            <a:r>
+              <a:rPr lang="en-US" sz="2000" dirty="0" err="1"/>
+              <a:t>localhost</a:t>
+            </a:r>
+            <a:r>
+              <a:rPr lang="en-US" sz="2000" dirty="0"/>
+              <a:t> </a:t>
+            </a:r>
+            <a:r>
+              <a:rPr lang="en-US" sz="2000" dirty="0" err="1"/>
+              <a:t>stdout</a:t>
+            </a:r>
+            <a:r>
+              <a:rPr lang="en-US" sz="2000" dirty="0"/>
+              <a:t> should match /Welcome home/</a:t>
+            </a:r>
+          </a:p>
+          <a:p>
+            <a:pPr>
+              <a:lnSpc>
+                <a:spcPct val="80000"/>
+              </a:lnSpc>
+            </a:pPr>
+            <a:r>
+              <a:rPr lang="en-US" sz="2000" dirty="0"/>
+              <a:t>  ✔  Command curl http://localhost:8080 </a:t>
+            </a:r>
+            <a:r>
+              <a:rPr lang="en-US" sz="2000" dirty="0" err="1"/>
+              <a:t>stdout</a:t>
+            </a:r>
+            <a:r>
+              <a:rPr lang="en-US" sz="2000" dirty="0"/>
+              <a:t> should match /Welcome admins/</a:t>
+            </a:r>
+          </a:p>
+          <a:p>
+            <a:pPr>
+              <a:lnSpc>
+                <a:spcPct val="80000"/>
+              </a:lnSpc>
+            </a:pPr>
+            <a:endParaRPr lang="en-US" sz="2000" dirty="0"/>
+          </a:p>
+          <a:p>
+            <a:pPr>
+              <a:lnSpc>
+                <a:spcPct val="80000"/>
+              </a:lnSpc>
+            </a:pPr>
+            <a:r>
+              <a:rPr lang="en-US" sz="2000" dirty="0"/>
+              <a:t>Summary: 2 successful, 0 failures, 0 skipped</a:t>
+            </a:r>
+          </a:p>
+          <a:p>
+            <a:pPr>
+              <a:lnSpc>
+                <a:spcPct val="80000"/>
+              </a:lnSpc>
+            </a:pPr>
+            <a:r>
+              <a:rPr lang="en-US" sz="2000" dirty="0"/>
+              <a:t>       Finished verifying &lt;default-centos-67&gt; (0m0.77s).</a:t>
+            </a:r>
+          </a:p>
+          <a:p>
+            <a:pPr>
+              <a:lnSpc>
+                <a:spcPct val="80000"/>
+              </a:lnSpc>
+            </a:pPr>
+            <a:r>
+              <a:rPr lang="en-US" sz="2000" dirty="0"/>
+              <a:t>-----&gt; Kitchen is finished. (2m42.37s)</a:t>
+            </a:r>
             <a:endParaRPr lang="en-US" sz="2000" dirty="0"/>
           </a:p>
         </p:txBody>
@@ -20431,7 +19847,7 @@
           <a:lstStyle/>
           <a:p>
             <a:r>
-              <a:rPr lang="en-US" dirty="0" smtClean="0"/>
+              <a:rPr lang="en-US" dirty="0"/>
               <a:t>..........</a:t>
             </a:r>
           </a:p>
@@ -20441,28 +19857,14 @@
           <a:p>
             <a:r>
               <a:rPr lang="en-US" dirty="0"/>
-              <a:t>Finished in 2.8 seconds (files took 4.67 seconds to load</a:t>
-            </a:r>
-            <a:r>
-              <a:rPr lang="en-US" dirty="0" smtClean="0"/>
-              <a:t>)</a:t>
-            </a:r>
-          </a:p>
-          <a:p>
-            <a:r>
-              <a:rPr lang="en-US" dirty="0" smtClean="0"/>
-              <a:t>10 </a:t>
-            </a:r>
+              <a:t>Finished in 1.22 seconds (files took 2.56 seconds to load)</a:t>
+            </a:r>
+          </a:p>
+          <a:p>
             <a:r>
               <a:rPr lang="en-US" dirty="0"/>
-              <a:t>examples, 0 failures</a:t>
-            </a:r>
-            <a:endParaRPr lang="en-US" dirty="0" smtClean="0"/>
-          </a:p>
-          <a:p>
-            <a:endParaRPr lang="en-US" dirty="0"/>
-          </a:p>
-          <a:p>
+              <a:t>10 examples, 0 failures</a:t>
+            </a:r>
             <a:endParaRPr lang="en-US" dirty="0"/>
           </a:p>
         </p:txBody>

</xml_diff>